<commit_message>
Videogame to game change
</commit_message>
<xml_diff>
--- a/PPT/Intro.pptx
+++ b/PPT/Intro.pptx
@@ -255,7 +255,7 @@
           <a:p>
             <a:fld id="{5578FD48-7BBA-4787-8980-5DFB65E0734D}" type="datetimeFigureOut">
               <a:rPr lang="en-US" smtClean="0"/>
-              <a:t>12/31/2020</a:t>
+              <a:t>1/12/2021</a:t>
             </a:fld>
             <a:endParaRPr lang="en-US"/>
           </a:p>
@@ -674,7 +674,7 @@
             <a:fld id="{1D8BD707-D9CF-40AE-B4C6-C98DA3205C09}" type="datetimeFigureOut">
               <a:rPr lang="en-US" smtClean="0"/>
               <a:pPr/>
-              <a:t>12/31/2020</a:t>
+              <a:t>1/12/2021</a:t>
             </a:fld>
             <a:endParaRPr lang="en-US"/>
           </a:p>
@@ -991,7 +991,7 @@
             <a:fld id="{1D8BD707-D9CF-40AE-B4C6-C98DA3205C09}" type="datetimeFigureOut">
               <a:rPr lang="en-US" smtClean="0"/>
               <a:pPr/>
-              <a:t>12/31/2020</a:t>
+              <a:t>1/12/2021</a:t>
             </a:fld>
             <a:endParaRPr lang="en-US"/>
           </a:p>
@@ -1167,7 +1167,7 @@
             <a:fld id="{1D8BD707-D9CF-40AE-B4C6-C98DA3205C09}" type="datetimeFigureOut">
               <a:rPr lang="en-US" smtClean="0"/>
               <a:pPr/>
-              <a:t>12/31/2020</a:t>
+              <a:t>1/12/2021</a:t>
             </a:fld>
             <a:endParaRPr lang="en-US"/>
           </a:p>
@@ -1287,7 +1287,7 @@
             <a:fld id="{1D8BD707-D9CF-40AE-B4C6-C98DA3205C09}" type="datetimeFigureOut">
               <a:rPr lang="en-US" smtClean="0"/>
               <a:pPr/>
-              <a:t>12/31/2020</a:t>
+              <a:t>1/12/2021</a:t>
             </a:fld>
             <a:endParaRPr lang="en-US"/>
           </a:p>
@@ -1587,7 +1587,7 @@
             <a:fld id="{1D8BD707-D9CF-40AE-B4C6-C98DA3205C09}" type="datetimeFigureOut">
               <a:rPr lang="en-US" smtClean="0"/>
               <a:pPr/>
-              <a:t>12/31/2020</a:t>
+              <a:t>1/12/2021</a:t>
             </a:fld>
             <a:endParaRPr lang="en-US"/>
           </a:p>
@@ -1882,7 +1882,7 @@
             <a:fld id="{1D8BD707-D9CF-40AE-B4C6-C98DA3205C09}" type="datetimeFigureOut">
               <a:rPr lang="en-US" smtClean="0"/>
               <a:pPr/>
-              <a:t>12/31/2020</a:t>
+              <a:t>1/12/2021</a:t>
             </a:fld>
             <a:endParaRPr lang="en-US"/>
           </a:p>
@@ -2312,7 +2312,7 @@
             <a:fld id="{1D8BD707-D9CF-40AE-B4C6-C98DA3205C09}" type="datetimeFigureOut">
               <a:rPr lang="en-US" smtClean="0"/>
               <a:pPr/>
-              <a:t>12/31/2020</a:t>
+              <a:t>1/12/2021</a:t>
             </a:fld>
             <a:endParaRPr lang="en-US"/>
           </a:p>
@@ -2432,7 +2432,7 @@
             <a:fld id="{1D8BD707-D9CF-40AE-B4C6-C98DA3205C09}" type="datetimeFigureOut">
               <a:rPr lang="en-US" smtClean="0"/>
               <a:pPr/>
-              <a:t>12/31/2020</a:t>
+              <a:t>1/12/2021</a:t>
             </a:fld>
             <a:endParaRPr lang="en-US"/>
           </a:p>
@@ -2524,7 +2524,7 @@
             <a:fld id="{1D8BD707-D9CF-40AE-B4C6-C98DA3205C09}" type="datetimeFigureOut">
               <a:rPr lang="en-US" smtClean="0"/>
               <a:pPr/>
-              <a:t>12/31/2020</a:t>
+              <a:t>1/12/2021</a:t>
             </a:fld>
             <a:endParaRPr lang="en-US"/>
           </a:p>
@@ -2776,7 +2776,7 @@
             <a:fld id="{1D8BD707-D9CF-40AE-B4C6-C98DA3205C09}" type="datetimeFigureOut">
               <a:rPr lang="en-US" smtClean="0"/>
               <a:pPr/>
-              <a:t>12/31/2020</a:t>
+              <a:t>1/12/2021</a:t>
             </a:fld>
             <a:endParaRPr lang="en-US"/>
           </a:p>
@@ -3294,7 +3294,7 @@
             <a:fld id="{1D8BD707-D9CF-40AE-B4C6-C98DA3205C09}" type="datetimeFigureOut">
               <a:rPr lang="en-US" smtClean="0"/>
               <a:pPr/>
-              <a:t>12/31/2020</a:t>
+              <a:t>1/12/2021</a:t>
             </a:fld>
             <a:endParaRPr lang="en-US"/>
           </a:p>
@@ -3526,7 +3526,7 @@
             <a:fld id="{1D8BD707-D9CF-40AE-B4C6-C98DA3205C09}" type="datetimeFigureOut">
               <a:rPr lang="en-US" smtClean="0"/>
               <a:pPr/>
-              <a:t>12/31/2020</a:t>
+              <a:t>1/12/2021</a:t>
             </a:fld>
             <a:endParaRPr lang="en-US"/>
           </a:p>
@@ -4109,15 +4109,7 @@
             </a:br>
             <a:r>
               <a:rPr lang="en-US" dirty="0"/>
-              <a:t>2D </a:t>
-            </a:r>
-            <a:r>
-              <a:rPr lang="en-US" dirty="0" err="1"/>
-              <a:t>VideoGame</a:t>
-            </a:r>
-            <a:r>
-              <a:rPr lang="en-US" dirty="0"/>
-              <a:t> Development</a:t>
+              <a:t>2D Game Development</a:t>
             </a:r>
           </a:p>
         </p:txBody>

</xml_diff>

<commit_message>
Update for 2022 Workshop
</commit_message>
<xml_diff>
--- a/PPT/Intro.pptx
+++ b/PPT/Intro.pptx
@@ -21,11 +21,11 @@
     <p:sldId id="258" r:id="rId12"/>
     <p:sldId id="302" r:id="rId13"/>
     <p:sldId id="288" r:id="rId14"/>
-    <p:sldId id="290" r:id="rId15"/>
-    <p:sldId id="277" r:id="rId16"/>
-    <p:sldId id="291" r:id="rId17"/>
-    <p:sldId id="279" r:id="rId18"/>
-    <p:sldId id="292" r:id="rId19"/>
+    <p:sldId id="277" r:id="rId15"/>
+    <p:sldId id="291" r:id="rId16"/>
+    <p:sldId id="292" r:id="rId17"/>
+    <p:sldId id="290" r:id="rId18"/>
+    <p:sldId id="279" r:id="rId19"/>
     <p:sldId id="281" r:id="rId20"/>
     <p:sldId id="283" r:id="rId21"/>
     <p:sldId id="282" r:id="rId22"/>
@@ -145,11 +145,11 @@
             <p14:sldId id="258"/>
             <p14:sldId id="302"/>
             <p14:sldId id="288"/>
-            <p14:sldId id="290"/>
             <p14:sldId id="277"/>
             <p14:sldId id="291"/>
+            <p14:sldId id="292"/>
+            <p14:sldId id="290"/>
             <p14:sldId id="279"/>
-            <p14:sldId id="292"/>
             <p14:sldId id="281"/>
             <p14:sldId id="283"/>
             <p14:sldId id="282"/>
@@ -257,7 +257,7 @@
           <a:p>
             <a:fld id="{5578FD48-7BBA-4787-8980-5DFB65E0734D}" type="datetimeFigureOut">
               <a:rPr lang="en-US" smtClean="0"/>
-              <a:t>5/20/2022</a:t>
+              <a:t>5/22/2022</a:t>
             </a:fld>
             <a:endParaRPr lang="en-US"/>
           </a:p>
@@ -1195,7 +1195,7 @@
             <a:fld id="{1D8BD707-D9CF-40AE-B4C6-C98DA3205C09}" type="datetimeFigureOut">
               <a:rPr lang="en-US" smtClean="0"/>
               <a:pPr/>
-              <a:t>5/20/2022</a:t>
+              <a:t>5/22/2022</a:t>
             </a:fld>
             <a:endParaRPr lang="en-US"/>
           </a:p>
@@ -1512,7 +1512,7 @@
             <a:fld id="{1D8BD707-D9CF-40AE-B4C6-C98DA3205C09}" type="datetimeFigureOut">
               <a:rPr lang="en-US" smtClean="0"/>
               <a:pPr/>
-              <a:t>5/20/2022</a:t>
+              <a:t>5/22/2022</a:t>
             </a:fld>
             <a:endParaRPr lang="en-US"/>
           </a:p>
@@ -1688,7 +1688,7 @@
             <a:fld id="{1D8BD707-D9CF-40AE-B4C6-C98DA3205C09}" type="datetimeFigureOut">
               <a:rPr lang="en-US" smtClean="0"/>
               <a:pPr/>
-              <a:t>5/20/2022</a:t>
+              <a:t>5/22/2022</a:t>
             </a:fld>
             <a:endParaRPr lang="en-US"/>
           </a:p>
@@ -1808,7 +1808,7 @@
             <a:fld id="{1D8BD707-D9CF-40AE-B4C6-C98DA3205C09}" type="datetimeFigureOut">
               <a:rPr lang="en-US" smtClean="0"/>
               <a:pPr/>
-              <a:t>5/20/2022</a:t>
+              <a:t>5/22/2022</a:t>
             </a:fld>
             <a:endParaRPr lang="en-US"/>
           </a:p>
@@ -2108,7 +2108,7 @@
             <a:fld id="{1D8BD707-D9CF-40AE-B4C6-C98DA3205C09}" type="datetimeFigureOut">
               <a:rPr lang="en-US" smtClean="0"/>
               <a:pPr/>
-              <a:t>5/20/2022</a:t>
+              <a:t>5/22/2022</a:t>
             </a:fld>
             <a:endParaRPr lang="en-US"/>
           </a:p>
@@ -2403,7 +2403,7 @@
             <a:fld id="{1D8BD707-D9CF-40AE-B4C6-C98DA3205C09}" type="datetimeFigureOut">
               <a:rPr lang="en-US" smtClean="0"/>
               <a:pPr/>
-              <a:t>5/20/2022</a:t>
+              <a:t>5/22/2022</a:t>
             </a:fld>
             <a:endParaRPr lang="en-US"/>
           </a:p>
@@ -2833,7 +2833,7 @@
             <a:fld id="{1D8BD707-D9CF-40AE-B4C6-C98DA3205C09}" type="datetimeFigureOut">
               <a:rPr lang="en-US" smtClean="0"/>
               <a:pPr/>
-              <a:t>5/20/2022</a:t>
+              <a:t>5/22/2022</a:t>
             </a:fld>
             <a:endParaRPr lang="en-US"/>
           </a:p>
@@ -2953,7 +2953,7 @@
             <a:fld id="{1D8BD707-D9CF-40AE-B4C6-C98DA3205C09}" type="datetimeFigureOut">
               <a:rPr lang="en-US" smtClean="0"/>
               <a:pPr/>
-              <a:t>5/20/2022</a:t>
+              <a:t>5/22/2022</a:t>
             </a:fld>
             <a:endParaRPr lang="en-US"/>
           </a:p>
@@ -3045,7 +3045,7 @@
             <a:fld id="{1D8BD707-D9CF-40AE-B4C6-C98DA3205C09}" type="datetimeFigureOut">
               <a:rPr lang="en-US" smtClean="0"/>
               <a:pPr/>
-              <a:t>5/20/2022</a:t>
+              <a:t>5/22/2022</a:t>
             </a:fld>
             <a:endParaRPr lang="en-US"/>
           </a:p>
@@ -3297,7 +3297,7 @@
             <a:fld id="{1D8BD707-D9CF-40AE-B4C6-C98DA3205C09}" type="datetimeFigureOut">
               <a:rPr lang="en-US" smtClean="0"/>
               <a:pPr/>
-              <a:t>5/20/2022</a:t>
+              <a:t>5/22/2022</a:t>
             </a:fld>
             <a:endParaRPr lang="en-US"/>
           </a:p>
@@ -3815,7 +3815,7 @@
             <a:fld id="{1D8BD707-D9CF-40AE-B4C6-C98DA3205C09}" type="datetimeFigureOut">
               <a:rPr lang="en-US" smtClean="0"/>
               <a:pPr/>
-              <a:t>5/20/2022</a:t>
+              <a:t>5/22/2022</a:t>
             </a:fld>
             <a:endParaRPr lang="en-US"/>
           </a:p>
@@ -4047,7 +4047,7 @@
             <a:fld id="{1D8BD707-D9CF-40AE-B4C6-C98DA3205C09}" type="datetimeFigureOut">
               <a:rPr lang="en-US" smtClean="0"/>
               <a:pPr/>
-              <a:t>5/20/2022</a:t>
+              <a:t>5/22/2022</a:t>
             </a:fld>
             <a:endParaRPr lang="en-US"/>
           </a:p>
@@ -4591,7 +4591,7 @@
           <a:p>
             <a:r>
               <a:rPr lang="en-US" dirty="0"/>
-              <a:t>Summer 2021</a:t>
+              <a:t>Summer 2022</a:t>
             </a:r>
           </a:p>
         </p:txBody>
@@ -4801,7 +4801,7 @@
             <a:pPr lvl="1"/>
             <a:r>
               <a:rPr lang="en-US" altLang="zh-TW" dirty="0"/>
-              <a:t>More recently: Video games for non-entertainment purposes, AR/VR collaboration</a:t>
+              <a:t>More recently: Video games for non-entertainment purposes, remote AR/VR collaboration</a:t>
             </a:r>
           </a:p>
         </p:txBody>
@@ -7436,6 +7436,2110 @@
           <a:p>
             <a:r>
               <a:rPr lang="en-US" dirty="0"/>
+              <a:t>Part </a:t>
+            </a:r>
+            <a:r>
+              <a:rPr lang="en-US"/>
+              <a:t>I (29</a:t>
+            </a:r>
+            <a:r>
+              <a:rPr lang="en-US" baseline="30000"/>
+              <a:t>th</a:t>
+            </a:r>
+            <a:r>
+              <a:rPr lang="en-US"/>
+              <a:t> </a:t>
+            </a:r>
+            <a:r>
+              <a:rPr lang="en-US" dirty="0"/>
+              <a:t>May): Game Engine and Game Components</a:t>
+            </a:r>
+          </a:p>
+        </p:txBody>
+      </p:sp>
+      <p:sp>
+        <p:nvSpPr>
+          <p:cNvPr id="3" name="Content Placeholder 2"/>
+          <p:cNvSpPr>
+            <a:spLocks noGrp="1"/>
+          </p:cNvSpPr>
+          <p:nvPr>
+            <p:ph sz="quarter" idx="13"/>
+          </p:nvPr>
+        </p:nvSpPr>
+        <p:spPr/>
+        <p:txBody>
+          <a:bodyPr>
+            <a:normAutofit/>
+          </a:bodyPr>
+          <a:lstStyle/>
+          <a:p>
+            <a:r>
+              <a:rPr lang="en-US" b="1" dirty="0"/>
+              <a:t>Learn</a:t>
+            </a:r>
+            <a:r>
+              <a:rPr lang="en-US" dirty="0"/>
+              <a:t>: Intro + Environment + Game Engine + a little about Programming Model</a:t>
+            </a:r>
+          </a:p>
+          <a:p>
+            <a:r>
+              <a:rPr lang="en-US" dirty="0"/>
+              <a:t>Assignment: due a week from today (1pm on Sunday 5</a:t>
+            </a:r>
+            <a:r>
+              <a:rPr lang="en-US" baseline="30000" dirty="0"/>
+              <a:t>th</a:t>
+            </a:r>
+            <a:r>
+              <a:rPr lang="en-US" dirty="0"/>
+              <a:t> June)</a:t>
+            </a:r>
+          </a:p>
+          <a:p>
+            <a:pPr lvl="1"/>
+            <a:r>
+              <a:rPr lang="en-US" b="1" dirty="0">
+                <a:solidFill>
+                  <a:srgbClr val="FFFF00"/>
+                </a:solidFill>
+              </a:rPr>
+              <a:t>Short Quiz: </a:t>
+            </a:r>
+            <a:r>
+              <a:rPr lang="en-US" dirty="0"/>
+              <a:t>on the Game Engine (should take 10-20 minutes)</a:t>
+            </a:r>
+          </a:p>
+          <a:p>
+            <a:pPr lvl="2"/>
+            <a:r>
+              <a:rPr lang="en-US" dirty="0"/>
+              <a:t>Quiz on </a:t>
+            </a:r>
+            <a:r>
+              <a:rPr lang="en-US" dirty="0" err="1"/>
+              <a:t>LumiNUS</a:t>
+            </a:r>
+            <a:r>
+              <a:rPr lang="en-US" dirty="0"/>
+              <a:t> to be open after today’s class.</a:t>
+            </a:r>
+          </a:p>
+          <a:p>
+            <a:pPr lvl="1"/>
+            <a:r>
+              <a:rPr lang="en-US" b="1" dirty="0">
+                <a:solidFill>
+                  <a:srgbClr val="FFFF00"/>
+                </a:solidFill>
+              </a:rPr>
+              <a:t>Small Coding Exercise: </a:t>
+            </a:r>
+            <a:r>
+              <a:rPr lang="en-US" dirty="0"/>
+              <a:t>Exercise 1 (should take about an hour) </a:t>
+            </a:r>
+          </a:p>
+          <a:p>
+            <a:pPr lvl="2"/>
+            <a:r>
+              <a:rPr lang="en-US" dirty="0"/>
+              <a:t>Submit to </a:t>
+            </a:r>
+            <a:r>
+              <a:rPr lang="en-US" dirty="0" err="1"/>
+              <a:t>LumiNUS</a:t>
+            </a:r>
+            <a:endParaRPr lang="en-US" dirty="0"/>
+          </a:p>
+          <a:p>
+            <a:pPr lvl="2"/>
+            <a:r>
+              <a:rPr lang="en-US" dirty="0">
+                <a:solidFill>
+                  <a:srgbClr val="FFFF00"/>
+                </a:solidFill>
+                <a:highlight>
+                  <a:srgbClr val="FF0000"/>
+                </a:highlight>
+              </a:rPr>
+              <a:t>Submit: EXE build + Source Code</a:t>
+            </a:r>
+            <a:endParaRPr lang="en-US" dirty="0"/>
+          </a:p>
+          <a:p>
+            <a:r>
+              <a:rPr lang="en-US" dirty="0"/>
+              <a:t>If you don’t practice, you won’t learn, really!</a:t>
+            </a:r>
+            <a:endParaRPr lang="en-US" b="1" dirty="0">
+              <a:solidFill>
+                <a:srgbClr val="FFFF00"/>
+              </a:solidFill>
+            </a:endParaRPr>
+          </a:p>
+        </p:txBody>
+      </p:sp>
+    </p:spTree>
+    <p:extLst>
+      <p:ext uri="{BB962C8B-B14F-4D97-AF65-F5344CB8AC3E}">
+        <p14:creationId xmlns:p14="http://schemas.microsoft.com/office/powerpoint/2010/main" val="4149015376"/>
+      </p:ext>
+    </p:extLst>
+  </p:cSld>
+  <p:clrMapOvr>
+    <a:masterClrMapping/>
+  </p:clrMapOvr>
+  <p:timing>
+    <p:tnLst>
+      <p:par>
+        <p:cTn id="1" dur="indefinite" restart="never" nodeType="tmRoot">
+          <p:childTnLst>
+            <p:seq concurrent="1" nextAc="seek">
+              <p:cTn id="2" dur="indefinite" nodeType="mainSeq">
+                <p:childTnLst>
+                  <p:par>
+                    <p:cTn id="3" fill="hold">
+                      <p:stCondLst>
+                        <p:cond delay="indefinite"/>
+                      </p:stCondLst>
+                      <p:childTnLst>
+                        <p:par>
+                          <p:cTn id="4" fill="hold">
+                            <p:stCondLst>
+                              <p:cond delay="0"/>
+                            </p:stCondLst>
+                            <p:childTnLst>
+                              <p:par>
+                                <p:cTn id="5" presetID="1" presetClass="entr" presetSubtype="0" fill="hold" grpId="0" nodeType="clickEffect">
+                                  <p:stCondLst>
+                                    <p:cond delay="0"/>
+                                  </p:stCondLst>
+                                  <p:childTnLst>
+                                    <p:set>
+                                      <p:cBhvr>
+                                        <p:cTn id="6" dur="1" fill="hold">
+                                          <p:stCondLst>
+                                            <p:cond delay="0"/>
+                                          </p:stCondLst>
+                                        </p:cTn>
+                                        <p:tgtEl>
+                                          <p:spTgt spid="3">
+                                            <p:txEl>
+                                              <p:pRg st="0" end="0"/>
+                                            </p:txEl>
+                                          </p:spTgt>
+                                        </p:tgtEl>
+                                        <p:attrNameLst>
+                                          <p:attrName>style.visibility</p:attrName>
+                                        </p:attrNameLst>
+                                      </p:cBhvr>
+                                      <p:to>
+                                        <p:strVal val="visible"/>
+                                      </p:to>
+                                    </p:set>
+                                  </p:childTnLst>
+                                </p:cTn>
+                              </p:par>
+                            </p:childTnLst>
+                          </p:cTn>
+                        </p:par>
+                      </p:childTnLst>
+                    </p:cTn>
+                  </p:par>
+                  <p:par>
+                    <p:cTn id="7" fill="hold">
+                      <p:stCondLst>
+                        <p:cond delay="indefinite"/>
+                      </p:stCondLst>
+                      <p:childTnLst>
+                        <p:par>
+                          <p:cTn id="8" fill="hold">
+                            <p:stCondLst>
+                              <p:cond delay="0"/>
+                            </p:stCondLst>
+                            <p:childTnLst>
+                              <p:par>
+                                <p:cTn id="9" presetID="1" presetClass="entr" presetSubtype="0" fill="hold" grpId="0" nodeType="clickEffect">
+                                  <p:stCondLst>
+                                    <p:cond delay="0"/>
+                                  </p:stCondLst>
+                                  <p:childTnLst>
+                                    <p:set>
+                                      <p:cBhvr>
+                                        <p:cTn id="10" dur="1" fill="hold">
+                                          <p:stCondLst>
+                                            <p:cond delay="0"/>
+                                          </p:stCondLst>
+                                        </p:cTn>
+                                        <p:tgtEl>
+                                          <p:spTgt spid="3">
+                                            <p:txEl>
+                                              <p:pRg st="1" end="1"/>
+                                            </p:txEl>
+                                          </p:spTgt>
+                                        </p:tgtEl>
+                                        <p:attrNameLst>
+                                          <p:attrName>style.visibility</p:attrName>
+                                        </p:attrNameLst>
+                                      </p:cBhvr>
+                                      <p:to>
+                                        <p:strVal val="visible"/>
+                                      </p:to>
+                                    </p:set>
+                                  </p:childTnLst>
+                                </p:cTn>
+                              </p:par>
+                              <p:par>
+                                <p:cTn id="11" presetID="1" presetClass="entr" presetSubtype="0" fill="hold" grpId="0" nodeType="withEffect">
+                                  <p:stCondLst>
+                                    <p:cond delay="0"/>
+                                  </p:stCondLst>
+                                  <p:childTnLst>
+                                    <p:set>
+                                      <p:cBhvr>
+                                        <p:cTn id="12" dur="1" fill="hold">
+                                          <p:stCondLst>
+                                            <p:cond delay="0"/>
+                                          </p:stCondLst>
+                                        </p:cTn>
+                                        <p:tgtEl>
+                                          <p:spTgt spid="3">
+                                            <p:txEl>
+                                              <p:pRg st="2" end="2"/>
+                                            </p:txEl>
+                                          </p:spTgt>
+                                        </p:tgtEl>
+                                        <p:attrNameLst>
+                                          <p:attrName>style.visibility</p:attrName>
+                                        </p:attrNameLst>
+                                      </p:cBhvr>
+                                      <p:to>
+                                        <p:strVal val="visible"/>
+                                      </p:to>
+                                    </p:set>
+                                  </p:childTnLst>
+                                </p:cTn>
+                              </p:par>
+                              <p:par>
+                                <p:cTn id="13" presetID="1" presetClass="entr" presetSubtype="0" fill="hold" grpId="0" nodeType="withEffect">
+                                  <p:stCondLst>
+                                    <p:cond delay="0"/>
+                                  </p:stCondLst>
+                                  <p:childTnLst>
+                                    <p:set>
+                                      <p:cBhvr>
+                                        <p:cTn id="14" dur="1" fill="hold">
+                                          <p:stCondLst>
+                                            <p:cond delay="0"/>
+                                          </p:stCondLst>
+                                        </p:cTn>
+                                        <p:tgtEl>
+                                          <p:spTgt spid="3">
+                                            <p:txEl>
+                                              <p:pRg st="3" end="3"/>
+                                            </p:txEl>
+                                          </p:spTgt>
+                                        </p:tgtEl>
+                                        <p:attrNameLst>
+                                          <p:attrName>style.visibility</p:attrName>
+                                        </p:attrNameLst>
+                                      </p:cBhvr>
+                                      <p:to>
+                                        <p:strVal val="visible"/>
+                                      </p:to>
+                                    </p:set>
+                                  </p:childTnLst>
+                                </p:cTn>
+                              </p:par>
+                              <p:par>
+                                <p:cTn id="15" presetID="1" presetClass="entr" presetSubtype="0" fill="hold" grpId="0" nodeType="withEffect">
+                                  <p:stCondLst>
+                                    <p:cond delay="0"/>
+                                  </p:stCondLst>
+                                  <p:childTnLst>
+                                    <p:set>
+                                      <p:cBhvr>
+                                        <p:cTn id="16" dur="1" fill="hold">
+                                          <p:stCondLst>
+                                            <p:cond delay="0"/>
+                                          </p:stCondLst>
+                                        </p:cTn>
+                                        <p:tgtEl>
+                                          <p:spTgt spid="3">
+                                            <p:txEl>
+                                              <p:pRg st="4" end="4"/>
+                                            </p:txEl>
+                                          </p:spTgt>
+                                        </p:tgtEl>
+                                        <p:attrNameLst>
+                                          <p:attrName>style.visibility</p:attrName>
+                                        </p:attrNameLst>
+                                      </p:cBhvr>
+                                      <p:to>
+                                        <p:strVal val="visible"/>
+                                      </p:to>
+                                    </p:set>
+                                  </p:childTnLst>
+                                </p:cTn>
+                              </p:par>
+                              <p:par>
+                                <p:cTn id="17" presetID="1" presetClass="entr" presetSubtype="0" fill="hold" grpId="0" nodeType="withEffect">
+                                  <p:stCondLst>
+                                    <p:cond delay="0"/>
+                                  </p:stCondLst>
+                                  <p:childTnLst>
+                                    <p:set>
+                                      <p:cBhvr>
+                                        <p:cTn id="18" dur="1" fill="hold">
+                                          <p:stCondLst>
+                                            <p:cond delay="0"/>
+                                          </p:stCondLst>
+                                        </p:cTn>
+                                        <p:tgtEl>
+                                          <p:spTgt spid="3">
+                                            <p:txEl>
+                                              <p:pRg st="5" end="5"/>
+                                            </p:txEl>
+                                          </p:spTgt>
+                                        </p:tgtEl>
+                                        <p:attrNameLst>
+                                          <p:attrName>style.visibility</p:attrName>
+                                        </p:attrNameLst>
+                                      </p:cBhvr>
+                                      <p:to>
+                                        <p:strVal val="visible"/>
+                                      </p:to>
+                                    </p:set>
+                                  </p:childTnLst>
+                                </p:cTn>
+                              </p:par>
+                              <p:par>
+                                <p:cTn id="19" presetID="1" presetClass="entr" presetSubtype="0" fill="hold" grpId="0" nodeType="withEffect">
+                                  <p:stCondLst>
+                                    <p:cond delay="0"/>
+                                  </p:stCondLst>
+                                  <p:childTnLst>
+                                    <p:set>
+                                      <p:cBhvr>
+                                        <p:cTn id="20" dur="1" fill="hold">
+                                          <p:stCondLst>
+                                            <p:cond delay="0"/>
+                                          </p:stCondLst>
+                                        </p:cTn>
+                                        <p:tgtEl>
+                                          <p:spTgt spid="3">
+                                            <p:txEl>
+                                              <p:pRg st="6" end="6"/>
+                                            </p:txEl>
+                                          </p:spTgt>
+                                        </p:tgtEl>
+                                        <p:attrNameLst>
+                                          <p:attrName>style.visibility</p:attrName>
+                                        </p:attrNameLst>
+                                      </p:cBhvr>
+                                      <p:to>
+                                        <p:strVal val="visible"/>
+                                      </p:to>
+                                    </p:set>
+                                  </p:childTnLst>
+                                </p:cTn>
+                              </p:par>
+                            </p:childTnLst>
+                          </p:cTn>
+                        </p:par>
+                      </p:childTnLst>
+                    </p:cTn>
+                  </p:par>
+                  <p:par>
+                    <p:cTn id="21" fill="hold">
+                      <p:stCondLst>
+                        <p:cond delay="indefinite"/>
+                      </p:stCondLst>
+                      <p:childTnLst>
+                        <p:par>
+                          <p:cTn id="22" fill="hold">
+                            <p:stCondLst>
+                              <p:cond delay="0"/>
+                            </p:stCondLst>
+                            <p:childTnLst>
+                              <p:par>
+                                <p:cTn id="23" presetID="1" presetClass="entr" presetSubtype="0" fill="hold" grpId="0" nodeType="clickEffect">
+                                  <p:stCondLst>
+                                    <p:cond delay="0"/>
+                                  </p:stCondLst>
+                                  <p:childTnLst>
+                                    <p:set>
+                                      <p:cBhvr>
+                                        <p:cTn id="24" dur="1" fill="hold">
+                                          <p:stCondLst>
+                                            <p:cond delay="0"/>
+                                          </p:stCondLst>
+                                        </p:cTn>
+                                        <p:tgtEl>
+                                          <p:spTgt spid="3">
+                                            <p:txEl>
+                                              <p:pRg st="7" end="7"/>
+                                            </p:txEl>
+                                          </p:spTgt>
+                                        </p:tgtEl>
+                                        <p:attrNameLst>
+                                          <p:attrName>style.visibility</p:attrName>
+                                        </p:attrNameLst>
+                                      </p:cBhvr>
+                                      <p:to>
+                                        <p:strVal val="visible"/>
+                                      </p:to>
+                                    </p:set>
+                                  </p:childTnLst>
+                                </p:cTn>
+                              </p:par>
+                            </p:childTnLst>
+                          </p:cTn>
+                        </p:par>
+                      </p:childTnLst>
+                    </p:cTn>
+                  </p:par>
+                </p:childTnLst>
+              </p:cTn>
+              <p:prevCondLst>
+                <p:cond evt="onPrev" delay="0">
+                  <p:tgtEl>
+                    <p:sldTgt/>
+                  </p:tgtEl>
+                </p:cond>
+              </p:prevCondLst>
+              <p:nextCondLst>
+                <p:cond evt="onNext" delay="0">
+                  <p:tgtEl>
+                    <p:sldTgt/>
+                  </p:tgtEl>
+                </p:cond>
+              </p:nextCondLst>
+            </p:seq>
+          </p:childTnLst>
+        </p:cTn>
+      </p:par>
+    </p:tnLst>
+    <p:bldLst>
+      <p:bldP spid="3" grpId="0" uiExpand="1" build="p"/>
+    </p:bldLst>
+  </p:timing>
+</p:sld>
+</file>
+
+<file path=ppt/slides/slide15.xml><?xml version="1.0" encoding="utf-8"?>
+<p:sld xmlns:a="http://schemas.openxmlformats.org/drawingml/2006/main" xmlns:r="http://schemas.openxmlformats.org/officeDocument/2006/relationships" xmlns:p="http://schemas.openxmlformats.org/presentationml/2006/main">
+  <p:cSld>
+    <p:spTree>
+      <p:nvGrpSpPr>
+        <p:cNvPr id="1" name=""/>
+        <p:cNvGrpSpPr/>
+        <p:nvPr/>
+      </p:nvGrpSpPr>
+      <p:grpSpPr>
+        <a:xfrm>
+          <a:off x="0" y="0"/>
+          <a:ext cx="0" cy="0"/>
+          <a:chOff x="0" y="0"/>
+          <a:chExt cx="0" cy="0"/>
+        </a:xfrm>
+      </p:grpSpPr>
+      <p:sp>
+        <p:nvSpPr>
+          <p:cNvPr id="2" name="Title 1"/>
+          <p:cNvSpPr>
+            <a:spLocks noGrp="1"/>
+          </p:cNvSpPr>
+          <p:nvPr>
+            <p:ph type="title"/>
+          </p:nvPr>
+        </p:nvSpPr>
+        <p:spPr/>
+        <p:txBody>
+          <a:bodyPr/>
+          <a:lstStyle/>
+          <a:p>
+            <a:r>
+              <a:rPr lang="en-US" dirty="0"/>
+              <a:t>Part II (July 2022): Build an Awesome Game</a:t>
+            </a:r>
+          </a:p>
+        </p:txBody>
+      </p:sp>
+      <p:sp>
+        <p:nvSpPr>
+          <p:cNvPr id="3" name="Content Placeholder 2"/>
+          <p:cNvSpPr>
+            <a:spLocks noGrp="1"/>
+          </p:cNvSpPr>
+          <p:nvPr>
+            <p:ph sz="quarter" idx="13"/>
+          </p:nvPr>
+        </p:nvSpPr>
+        <p:spPr/>
+        <p:txBody>
+          <a:bodyPr>
+            <a:normAutofit fontScale="62500" lnSpcReduction="20000"/>
+          </a:bodyPr>
+          <a:lstStyle/>
+          <a:p>
+            <a:r>
+              <a:rPr lang="en-US" b="1" dirty="0"/>
+              <a:t>Meetings: </a:t>
+            </a:r>
+            <a:r>
+              <a:rPr lang="en-US" dirty="0"/>
+              <a:t>Every day at 9:00am, until we are done.</a:t>
+            </a:r>
+            <a:endParaRPr lang="en-US" b="1" dirty="0"/>
+          </a:p>
+          <a:p>
+            <a:r>
+              <a:rPr lang="en-US" b="1" dirty="0"/>
+              <a:t>Top priorities in the first 3 to 4 days: </a:t>
+            </a:r>
+          </a:p>
+          <a:p>
+            <a:pPr lvl="1"/>
+            <a:r>
+              <a:rPr lang="en-US" b="1" dirty="0" err="1">
+                <a:solidFill>
+                  <a:srgbClr val="FFFF00"/>
+                </a:solidFill>
+              </a:rPr>
+              <a:t>Matery</a:t>
+            </a:r>
+            <a:r>
+              <a:rPr lang="en-US" b="1" dirty="0">
+                <a:solidFill>
+                  <a:srgbClr val="FFFF00"/>
+                </a:solidFill>
+              </a:rPr>
+              <a:t> of game engine  + Familiarity with real-time interactive applications + Form Teams!! </a:t>
+            </a:r>
+          </a:p>
+          <a:p>
+            <a:pPr lvl="2"/>
+            <a:r>
+              <a:rPr lang="en-US" dirty="0"/>
+              <a:t>Intro to yourself and your interests for forming groups (e.g., from 2019: </a:t>
+            </a:r>
+            <a:r>
+              <a:rPr lang="en-US" dirty="0">
+                <a:hlinkClick r:id="rId2"/>
+              </a:rPr>
+              <a:t>Student-1</a:t>
+            </a:r>
+            <a:r>
+              <a:rPr lang="en-US" dirty="0"/>
+              <a:t>, </a:t>
+            </a:r>
+            <a:r>
+              <a:rPr lang="en-US" dirty="0">
+                <a:hlinkClick r:id="rId3"/>
+              </a:rPr>
+              <a:t>Student-2</a:t>
+            </a:r>
+            <a:r>
+              <a:rPr lang="en-US" dirty="0"/>
+              <a:t>, </a:t>
+            </a:r>
+            <a:r>
+              <a:rPr lang="en-US" dirty="0">
+                <a:hlinkClick r:id="rId4"/>
+              </a:rPr>
+              <a:t>Student-3</a:t>
+            </a:r>
+            <a:r>
+              <a:rPr lang="en-US" dirty="0"/>
+              <a:t>)</a:t>
+            </a:r>
+            <a:endParaRPr lang="en-US" b="1" dirty="0">
+              <a:solidFill>
+                <a:srgbClr val="FFFF00"/>
+              </a:solidFill>
+            </a:endParaRPr>
+          </a:p>
+          <a:p>
+            <a:pPr lvl="1"/>
+            <a:r>
+              <a:rPr lang="en-US" b="1" dirty="0"/>
+              <a:t>Learn:</a:t>
+            </a:r>
+            <a:endParaRPr lang="en-US" dirty="0"/>
+          </a:p>
+          <a:p>
+            <a:pPr lvl="2"/>
+            <a:r>
+              <a:rPr lang="en-US" b="1" dirty="0"/>
+              <a:t>Learn</a:t>
+            </a:r>
+            <a:r>
+              <a:rPr lang="en-US" dirty="0"/>
+              <a:t>: Game Objects, Camera, UI, Game Manager, Effects, Autonomous Behaviors (AI)</a:t>
+            </a:r>
+          </a:p>
+          <a:p>
+            <a:pPr lvl="2"/>
+            <a:r>
+              <a:rPr lang="en-US" dirty="0"/>
+              <a:t>Practice: </a:t>
+            </a:r>
+          </a:p>
+          <a:p>
+            <a:pPr lvl="3"/>
+            <a:r>
+              <a:rPr lang="en-US" dirty="0"/>
+              <a:t>Build a simple interactive application</a:t>
+            </a:r>
+          </a:p>
+          <a:p>
+            <a:pPr lvl="3"/>
+            <a:r>
+              <a:rPr lang="en-US" dirty="0"/>
+              <a:t>Build a simple game (group project)</a:t>
+            </a:r>
+          </a:p>
+          <a:p>
+            <a:r>
+              <a:rPr lang="en-US" b="1" dirty="0"/>
+              <a:t>Last 10 days</a:t>
+            </a:r>
+            <a:r>
+              <a:rPr lang="en-US" dirty="0"/>
+              <a:t>: Final Project Development and Progress Demo</a:t>
+            </a:r>
+          </a:p>
+          <a:p>
+            <a:pPr lvl="1"/>
+            <a:r>
+              <a:rPr lang="en-US" dirty="0"/>
+              <a:t>How to brainstorm + what is a fun game</a:t>
+            </a:r>
+          </a:p>
+          <a:p>
+            <a:pPr lvl="1"/>
+            <a:r>
+              <a:rPr lang="en-US" b="1" dirty="0">
+                <a:solidFill>
+                  <a:srgbClr val="FFFF00"/>
+                </a:solidFill>
+              </a:rPr>
+              <a:t>Presentation: </a:t>
+            </a:r>
+            <a:r>
+              <a:rPr lang="en-US" dirty="0"/>
+              <a:t>Your final game</a:t>
+            </a:r>
+            <a:endParaRPr lang="en-US" b="1" dirty="0">
+              <a:solidFill>
+                <a:srgbClr val="FFFF00"/>
+              </a:solidFill>
+            </a:endParaRPr>
+          </a:p>
+          <a:p>
+            <a:pPr lvl="1"/>
+            <a:r>
+              <a:rPr lang="en-US" b="1" dirty="0">
+                <a:solidFill>
+                  <a:srgbClr val="FFFF00"/>
+                </a:solidFill>
+              </a:rPr>
+              <a:t>Presentation: </a:t>
+            </a:r>
+            <a:r>
+              <a:rPr lang="en-US" dirty="0"/>
+              <a:t>Game prototype demo</a:t>
+            </a:r>
+            <a:endParaRPr lang="en-US" b="1" dirty="0">
+              <a:solidFill>
+                <a:srgbClr val="FFFF00"/>
+              </a:solidFill>
+            </a:endParaRPr>
+          </a:p>
+          <a:p>
+            <a:pPr lvl="1"/>
+            <a:r>
+              <a:rPr lang="en-US" b="1" dirty="0">
+                <a:solidFill>
+                  <a:srgbClr val="FFFF00"/>
+                </a:solidFill>
+              </a:rPr>
+              <a:t>Presentation + Everyone plays everyone else’s games</a:t>
+            </a:r>
+            <a:r>
+              <a:rPr lang="en-US" dirty="0"/>
+              <a:t>: Alpha game playtest</a:t>
+            </a:r>
+            <a:endParaRPr lang="en-US" b="1" dirty="0">
+              <a:solidFill>
+                <a:srgbClr val="FFFF00"/>
+              </a:solidFill>
+            </a:endParaRPr>
+          </a:p>
+          <a:p>
+            <a:pPr lvl="1"/>
+            <a:r>
+              <a:rPr lang="en-US" b="1" dirty="0">
+                <a:solidFill>
+                  <a:srgbClr val="FFFF00"/>
+                </a:solidFill>
+              </a:rPr>
+              <a:t>Presentation + Everyone plays everyone else’s games: </a:t>
+            </a:r>
+            <a:r>
+              <a:rPr lang="en-US" dirty="0"/>
+              <a:t>Beta game playtest</a:t>
+            </a:r>
+          </a:p>
+          <a:p>
+            <a:pPr lvl="1"/>
+            <a:r>
+              <a:rPr lang="en-US" b="1" dirty="0">
+                <a:solidFill>
+                  <a:srgbClr val="FFFF00"/>
+                </a:solidFill>
+              </a:rPr>
+              <a:t>Presentation + Whole class plays!</a:t>
+            </a:r>
+          </a:p>
+        </p:txBody>
+      </p:sp>
+    </p:spTree>
+    <p:extLst>
+      <p:ext uri="{BB962C8B-B14F-4D97-AF65-F5344CB8AC3E}">
+        <p14:creationId xmlns:p14="http://schemas.microsoft.com/office/powerpoint/2010/main" val="1191935823"/>
+      </p:ext>
+    </p:extLst>
+  </p:cSld>
+  <p:clrMapOvr>
+    <a:masterClrMapping/>
+  </p:clrMapOvr>
+  <p:timing>
+    <p:tnLst>
+      <p:par>
+        <p:cTn id="1" dur="indefinite" restart="never" nodeType="tmRoot">
+          <p:childTnLst>
+            <p:seq concurrent="1" nextAc="seek">
+              <p:cTn id="2" dur="indefinite" nodeType="mainSeq">
+                <p:childTnLst>
+                  <p:par>
+                    <p:cTn id="3" fill="hold">
+                      <p:stCondLst>
+                        <p:cond delay="indefinite"/>
+                      </p:stCondLst>
+                      <p:childTnLst>
+                        <p:par>
+                          <p:cTn id="4" fill="hold">
+                            <p:stCondLst>
+                              <p:cond delay="0"/>
+                            </p:stCondLst>
+                            <p:childTnLst>
+                              <p:par>
+                                <p:cTn id="5" presetID="1" presetClass="entr" presetSubtype="0" fill="hold" grpId="0" nodeType="clickEffect">
+                                  <p:stCondLst>
+                                    <p:cond delay="0"/>
+                                  </p:stCondLst>
+                                  <p:childTnLst>
+                                    <p:set>
+                                      <p:cBhvr>
+                                        <p:cTn id="6" dur="1" fill="hold">
+                                          <p:stCondLst>
+                                            <p:cond delay="0"/>
+                                          </p:stCondLst>
+                                        </p:cTn>
+                                        <p:tgtEl>
+                                          <p:spTgt spid="3">
+                                            <p:txEl>
+                                              <p:pRg st="0" end="0"/>
+                                            </p:txEl>
+                                          </p:spTgt>
+                                        </p:tgtEl>
+                                        <p:attrNameLst>
+                                          <p:attrName>style.visibility</p:attrName>
+                                        </p:attrNameLst>
+                                      </p:cBhvr>
+                                      <p:to>
+                                        <p:strVal val="visible"/>
+                                      </p:to>
+                                    </p:set>
+                                  </p:childTnLst>
+                                </p:cTn>
+                              </p:par>
+                            </p:childTnLst>
+                          </p:cTn>
+                        </p:par>
+                      </p:childTnLst>
+                    </p:cTn>
+                  </p:par>
+                  <p:par>
+                    <p:cTn id="7" fill="hold">
+                      <p:stCondLst>
+                        <p:cond delay="indefinite"/>
+                      </p:stCondLst>
+                      <p:childTnLst>
+                        <p:par>
+                          <p:cTn id="8" fill="hold">
+                            <p:stCondLst>
+                              <p:cond delay="0"/>
+                            </p:stCondLst>
+                            <p:childTnLst>
+                              <p:par>
+                                <p:cTn id="9" presetID="1" presetClass="entr" presetSubtype="0" fill="hold" grpId="0" nodeType="clickEffect">
+                                  <p:stCondLst>
+                                    <p:cond delay="0"/>
+                                  </p:stCondLst>
+                                  <p:childTnLst>
+                                    <p:set>
+                                      <p:cBhvr>
+                                        <p:cTn id="10" dur="1" fill="hold">
+                                          <p:stCondLst>
+                                            <p:cond delay="0"/>
+                                          </p:stCondLst>
+                                        </p:cTn>
+                                        <p:tgtEl>
+                                          <p:spTgt spid="3">
+                                            <p:txEl>
+                                              <p:pRg st="1" end="1"/>
+                                            </p:txEl>
+                                          </p:spTgt>
+                                        </p:tgtEl>
+                                        <p:attrNameLst>
+                                          <p:attrName>style.visibility</p:attrName>
+                                        </p:attrNameLst>
+                                      </p:cBhvr>
+                                      <p:to>
+                                        <p:strVal val="visible"/>
+                                      </p:to>
+                                    </p:set>
+                                  </p:childTnLst>
+                                </p:cTn>
+                              </p:par>
+                              <p:par>
+                                <p:cTn id="11" presetID="1" presetClass="entr" presetSubtype="0" fill="hold" grpId="0" nodeType="withEffect">
+                                  <p:stCondLst>
+                                    <p:cond delay="0"/>
+                                  </p:stCondLst>
+                                  <p:childTnLst>
+                                    <p:set>
+                                      <p:cBhvr>
+                                        <p:cTn id="12" dur="1" fill="hold">
+                                          <p:stCondLst>
+                                            <p:cond delay="0"/>
+                                          </p:stCondLst>
+                                        </p:cTn>
+                                        <p:tgtEl>
+                                          <p:spTgt spid="3">
+                                            <p:txEl>
+                                              <p:pRg st="2" end="2"/>
+                                            </p:txEl>
+                                          </p:spTgt>
+                                        </p:tgtEl>
+                                        <p:attrNameLst>
+                                          <p:attrName>style.visibility</p:attrName>
+                                        </p:attrNameLst>
+                                      </p:cBhvr>
+                                      <p:to>
+                                        <p:strVal val="visible"/>
+                                      </p:to>
+                                    </p:set>
+                                  </p:childTnLst>
+                                </p:cTn>
+                              </p:par>
+                              <p:par>
+                                <p:cTn id="13" presetID="1" presetClass="entr" presetSubtype="0" fill="hold" grpId="0" nodeType="withEffect">
+                                  <p:stCondLst>
+                                    <p:cond delay="0"/>
+                                  </p:stCondLst>
+                                  <p:childTnLst>
+                                    <p:set>
+                                      <p:cBhvr>
+                                        <p:cTn id="14" dur="1" fill="hold">
+                                          <p:stCondLst>
+                                            <p:cond delay="0"/>
+                                          </p:stCondLst>
+                                        </p:cTn>
+                                        <p:tgtEl>
+                                          <p:spTgt spid="3">
+                                            <p:txEl>
+                                              <p:pRg st="3" end="3"/>
+                                            </p:txEl>
+                                          </p:spTgt>
+                                        </p:tgtEl>
+                                        <p:attrNameLst>
+                                          <p:attrName>style.visibility</p:attrName>
+                                        </p:attrNameLst>
+                                      </p:cBhvr>
+                                      <p:to>
+                                        <p:strVal val="visible"/>
+                                      </p:to>
+                                    </p:set>
+                                  </p:childTnLst>
+                                </p:cTn>
+                              </p:par>
+                              <p:par>
+                                <p:cTn id="15" presetID="1" presetClass="entr" presetSubtype="0" fill="hold" grpId="0" nodeType="withEffect">
+                                  <p:stCondLst>
+                                    <p:cond delay="0"/>
+                                  </p:stCondLst>
+                                  <p:childTnLst>
+                                    <p:set>
+                                      <p:cBhvr>
+                                        <p:cTn id="16" dur="1" fill="hold">
+                                          <p:stCondLst>
+                                            <p:cond delay="0"/>
+                                          </p:stCondLst>
+                                        </p:cTn>
+                                        <p:tgtEl>
+                                          <p:spTgt spid="3">
+                                            <p:txEl>
+                                              <p:pRg st="4" end="4"/>
+                                            </p:txEl>
+                                          </p:spTgt>
+                                        </p:tgtEl>
+                                        <p:attrNameLst>
+                                          <p:attrName>style.visibility</p:attrName>
+                                        </p:attrNameLst>
+                                      </p:cBhvr>
+                                      <p:to>
+                                        <p:strVal val="visible"/>
+                                      </p:to>
+                                    </p:set>
+                                  </p:childTnLst>
+                                </p:cTn>
+                              </p:par>
+                              <p:par>
+                                <p:cTn id="17" presetID="1" presetClass="entr" presetSubtype="0" fill="hold" grpId="0" nodeType="withEffect">
+                                  <p:stCondLst>
+                                    <p:cond delay="0"/>
+                                  </p:stCondLst>
+                                  <p:childTnLst>
+                                    <p:set>
+                                      <p:cBhvr>
+                                        <p:cTn id="18" dur="1" fill="hold">
+                                          <p:stCondLst>
+                                            <p:cond delay="0"/>
+                                          </p:stCondLst>
+                                        </p:cTn>
+                                        <p:tgtEl>
+                                          <p:spTgt spid="3">
+                                            <p:txEl>
+                                              <p:pRg st="5" end="5"/>
+                                            </p:txEl>
+                                          </p:spTgt>
+                                        </p:tgtEl>
+                                        <p:attrNameLst>
+                                          <p:attrName>style.visibility</p:attrName>
+                                        </p:attrNameLst>
+                                      </p:cBhvr>
+                                      <p:to>
+                                        <p:strVal val="visible"/>
+                                      </p:to>
+                                    </p:set>
+                                  </p:childTnLst>
+                                </p:cTn>
+                              </p:par>
+                              <p:par>
+                                <p:cTn id="19" presetID="1" presetClass="entr" presetSubtype="0" fill="hold" grpId="0" nodeType="withEffect">
+                                  <p:stCondLst>
+                                    <p:cond delay="0"/>
+                                  </p:stCondLst>
+                                  <p:childTnLst>
+                                    <p:set>
+                                      <p:cBhvr>
+                                        <p:cTn id="20" dur="1" fill="hold">
+                                          <p:stCondLst>
+                                            <p:cond delay="0"/>
+                                          </p:stCondLst>
+                                        </p:cTn>
+                                        <p:tgtEl>
+                                          <p:spTgt spid="3">
+                                            <p:txEl>
+                                              <p:pRg st="6" end="6"/>
+                                            </p:txEl>
+                                          </p:spTgt>
+                                        </p:tgtEl>
+                                        <p:attrNameLst>
+                                          <p:attrName>style.visibility</p:attrName>
+                                        </p:attrNameLst>
+                                      </p:cBhvr>
+                                      <p:to>
+                                        <p:strVal val="visible"/>
+                                      </p:to>
+                                    </p:set>
+                                  </p:childTnLst>
+                                </p:cTn>
+                              </p:par>
+                              <p:par>
+                                <p:cTn id="21" presetID="1" presetClass="entr" presetSubtype="0" fill="hold" grpId="0" nodeType="withEffect">
+                                  <p:stCondLst>
+                                    <p:cond delay="0"/>
+                                  </p:stCondLst>
+                                  <p:childTnLst>
+                                    <p:set>
+                                      <p:cBhvr>
+                                        <p:cTn id="22" dur="1" fill="hold">
+                                          <p:stCondLst>
+                                            <p:cond delay="0"/>
+                                          </p:stCondLst>
+                                        </p:cTn>
+                                        <p:tgtEl>
+                                          <p:spTgt spid="3">
+                                            <p:txEl>
+                                              <p:pRg st="7" end="7"/>
+                                            </p:txEl>
+                                          </p:spTgt>
+                                        </p:tgtEl>
+                                        <p:attrNameLst>
+                                          <p:attrName>style.visibility</p:attrName>
+                                        </p:attrNameLst>
+                                      </p:cBhvr>
+                                      <p:to>
+                                        <p:strVal val="visible"/>
+                                      </p:to>
+                                    </p:set>
+                                  </p:childTnLst>
+                                </p:cTn>
+                              </p:par>
+                              <p:par>
+                                <p:cTn id="23" presetID="1" presetClass="entr" presetSubtype="0" fill="hold" grpId="0" nodeType="withEffect">
+                                  <p:stCondLst>
+                                    <p:cond delay="0"/>
+                                  </p:stCondLst>
+                                  <p:childTnLst>
+                                    <p:set>
+                                      <p:cBhvr>
+                                        <p:cTn id="24" dur="1" fill="hold">
+                                          <p:stCondLst>
+                                            <p:cond delay="0"/>
+                                          </p:stCondLst>
+                                        </p:cTn>
+                                        <p:tgtEl>
+                                          <p:spTgt spid="3">
+                                            <p:txEl>
+                                              <p:pRg st="8" end="8"/>
+                                            </p:txEl>
+                                          </p:spTgt>
+                                        </p:tgtEl>
+                                        <p:attrNameLst>
+                                          <p:attrName>style.visibility</p:attrName>
+                                        </p:attrNameLst>
+                                      </p:cBhvr>
+                                      <p:to>
+                                        <p:strVal val="visible"/>
+                                      </p:to>
+                                    </p:set>
+                                  </p:childTnLst>
+                                </p:cTn>
+                              </p:par>
+                            </p:childTnLst>
+                          </p:cTn>
+                        </p:par>
+                      </p:childTnLst>
+                    </p:cTn>
+                  </p:par>
+                  <p:par>
+                    <p:cTn id="25" fill="hold">
+                      <p:stCondLst>
+                        <p:cond delay="indefinite"/>
+                      </p:stCondLst>
+                      <p:childTnLst>
+                        <p:par>
+                          <p:cTn id="26" fill="hold">
+                            <p:stCondLst>
+                              <p:cond delay="0"/>
+                            </p:stCondLst>
+                            <p:childTnLst>
+                              <p:par>
+                                <p:cTn id="27" presetID="1" presetClass="entr" presetSubtype="0" fill="hold" grpId="0" nodeType="clickEffect">
+                                  <p:stCondLst>
+                                    <p:cond delay="0"/>
+                                  </p:stCondLst>
+                                  <p:childTnLst>
+                                    <p:set>
+                                      <p:cBhvr>
+                                        <p:cTn id="28" dur="1" fill="hold">
+                                          <p:stCondLst>
+                                            <p:cond delay="0"/>
+                                          </p:stCondLst>
+                                        </p:cTn>
+                                        <p:tgtEl>
+                                          <p:spTgt spid="3">
+                                            <p:txEl>
+                                              <p:pRg st="9" end="9"/>
+                                            </p:txEl>
+                                          </p:spTgt>
+                                        </p:tgtEl>
+                                        <p:attrNameLst>
+                                          <p:attrName>style.visibility</p:attrName>
+                                        </p:attrNameLst>
+                                      </p:cBhvr>
+                                      <p:to>
+                                        <p:strVal val="visible"/>
+                                      </p:to>
+                                    </p:set>
+                                  </p:childTnLst>
+                                </p:cTn>
+                              </p:par>
+                              <p:par>
+                                <p:cTn id="29" presetID="1" presetClass="entr" presetSubtype="0" fill="hold" grpId="0" nodeType="withEffect">
+                                  <p:stCondLst>
+                                    <p:cond delay="0"/>
+                                  </p:stCondLst>
+                                  <p:childTnLst>
+                                    <p:set>
+                                      <p:cBhvr>
+                                        <p:cTn id="30" dur="1" fill="hold">
+                                          <p:stCondLst>
+                                            <p:cond delay="0"/>
+                                          </p:stCondLst>
+                                        </p:cTn>
+                                        <p:tgtEl>
+                                          <p:spTgt spid="3">
+                                            <p:txEl>
+                                              <p:pRg st="10" end="10"/>
+                                            </p:txEl>
+                                          </p:spTgt>
+                                        </p:tgtEl>
+                                        <p:attrNameLst>
+                                          <p:attrName>style.visibility</p:attrName>
+                                        </p:attrNameLst>
+                                      </p:cBhvr>
+                                      <p:to>
+                                        <p:strVal val="visible"/>
+                                      </p:to>
+                                    </p:set>
+                                  </p:childTnLst>
+                                </p:cTn>
+                              </p:par>
+                            </p:childTnLst>
+                          </p:cTn>
+                        </p:par>
+                      </p:childTnLst>
+                    </p:cTn>
+                  </p:par>
+                  <p:par>
+                    <p:cTn id="31" fill="hold">
+                      <p:stCondLst>
+                        <p:cond delay="indefinite"/>
+                      </p:stCondLst>
+                      <p:childTnLst>
+                        <p:par>
+                          <p:cTn id="32" fill="hold">
+                            <p:stCondLst>
+                              <p:cond delay="0"/>
+                            </p:stCondLst>
+                            <p:childTnLst>
+                              <p:par>
+                                <p:cTn id="33" presetID="1" presetClass="entr" presetSubtype="0" fill="hold" grpId="0" nodeType="clickEffect">
+                                  <p:stCondLst>
+                                    <p:cond delay="0"/>
+                                  </p:stCondLst>
+                                  <p:childTnLst>
+                                    <p:set>
+                                      <p:cBhvr>
+                                        <p:cTn id="34" dur="1" fill="hold">
+                                          <p:stCondLst>
+                                            <p:cond delay="0"/>
+                                          </p:stCondLst>
+                                        </p:cTn>
+                                        <p:tgtEl>
+                                          <p:spTgt spid="3">
+                                            <p:txEl>
+                                              <p:pRg st="11" end="11"/>
+                                            </p:txEl>
+                                          </p:spTgt>
+                                        </p:tgtEl>
+                                        <p:attrNameLst>
+                                          <p:attrName>style.visibility</p:attrName>
+                                        </p:attrNameLst>
+                                      </p:cBhvr>
+                                      <p:to>
+                                        <p:strVal val="visible"/>
+                                      </p:to>
+                                    </p:set>
+                                  </p:childTnLst>
+                                </p:cTn>
+                              </p:par>
+                            </p:childTnLst>
+                          </p:cTn>
+                        </p:par>
+                      </p:childTnLst>
+                    </p:cTn>
+                  </p:par>
+                  <p:par>
+                    <p:cTn id="35" fill="hold">
+                      <p:stCondLst>
+                        <p:cond delay="indefinite"/>
+                      </p:stCondLst>
+                      <p:childTnLst>
+                        <p:par>
+                          <p:cTn id="36" fill="hold">
+                            <p:stCondLst>
+                              <p:cond delay="0"/>
+                            </p:stCondLst>
+                            <p:childTnLst>
+                              <p:par>
+                                <p:cTn id="37" presetID="1" presetClass="entr" presetSubtype="0" fill="hold" grpId="0" nodeType="clickEffect">
+                                  <p:stCondLst>
+                                    <p:cond delay="0"/>
+                                  </p:stCondLst>
+                                  <p:childTnLst>
+                                    <p:set>
+                                      <p:cBhvr>
+                                        <p:cTn id="38" dur="1" fill="hold">
+                                          <p:stCondLst>
+                                            <p:cond delay="0"/>
+                                          </p:stCondLst>
+                                        </p:cTn>
+                                        <p:tgtEl>
+                                          <p:spTgt spid="3">
+                                            <p:txEl>
+                                              <p:pRg st="12" end="12"/>
+                                            </p:txEl>
+                                          </p:spTgt>
+                                        </p:tgtEl>
+                                        <p:attrNameLst>
+                                          <p:attrName>style.visibility</p:attrName>
+                                        </p:attrNameLst>
+                                      </p:cBhvr>
+                                      <p:to>
+                                        <p:strVal val="visible"/>
+                                      </p:to>
+                                    </p:set>
+                                  </p:childTnLst>
+                                </p:cTn>
+                              </p:par>
+                            </p:childTnLst>
+                          </p:cTn>
+                        </p:par>
+                      </p:childTnLst>
+                    </p:cTn>
+                  </p:par>
+                  <p:par>
+                    <p:cTn id="39" fill="hold">
+                      <p:stCondLst>
+                        <p:cond delay="indefinite"/>
+                      </p:stCondLst>
+                      <p:childTnLst>
+                        <p:par>
+                          <p:cTn id="40" fill="hold">
+                            <p:stCondLst>
+                              <p:cond delay="0"/>
+                            </p:stCondLst>
+                            <p:childTnLst>
+                              <p:par>
+                                <p:cTn id="41" presetID="1" presetClass="entr" presetSubtype="0" fill="hold" grpId="0" nodeType="clickEffect">
+                                  <p:stCondLst>
+                                    <p:cond delay="0"/>
+                                  </p:stCondLst>
+                                  <p:childTnLst>
+                                    <p:set>
+                                      <p:cBhvr>
+                                        <p:cTn id="42" dur="1" fill="hold">
+                                          <p:stCondLst>
+                                            <p:cond delay="0"/>
+                                          </p:stCondLst>
+                                        </p:cTn>
+                                        <p:tgtEl>
+                                          <p:spTgt spid="3">
+                                            <p:txEl>
+                                              <p:pRg st="13" end="13"/>
+                                            </p:txEl>
+                                          </p:spTgt>
+                                        </p:tgtEl>
+                                        <p:attrNameLst>
+                                          <p:attrName>style.visibility</p:attrName>
+                                        </p:attrNameLst>
+                                      </p:cBhvr>
+                                      <p:to>
+                                        <p:strVal val="visible"/>
+                                      </p:to>
+                                    </p:set>
+                                  </p:childTnLst>
+                                </p:cTn>
+                              </p:par>
+                            </p:childTnLst>
+                          </p:cTn>
+                        </p:par>
+                      </p:childTnLst>
+                    </p:cTn>
+                  </p:par>
+                  <p:par>
+                    <p:cTn id="43" fill="hold">
+                      <p:stCondLst>
+                        <p:cond delay="indefinite"/>
+                      </p:stCondLst>
+                      <p:childTnLst>
+                        <p:par>
+                          <p:cTn id="44" fill="hold">
+                            <p:stCondLst>
+                              <p:cond delay="0"/>
+                            </p:stCondLst>
+                            <p:childTnLst>
+                              <p:par>
+                                <p:cTn id="45" presetID="1" presetClass="entr" presetSubtype="0" fill="hold" grpId="0" nodeType="clickEffect">
+                                  <p:stCondLst>
+                                    <p:cond delay="0"/>
+                                  </p:stCondLst>
+                                  <p:childTnLst>
+                                    <p:set>
+                                      <p:cBhvr>
+                                        <p:cTn id="46" dur="1" fill="hold">
+                                          <p:stCondLst>
+                                            <p:cond delay="0"/>
+                                          </p:stCondLst>
+                                        </p:cTn>
+                                        <p:tgtEl>
+                                          <p:spTgt spid="3">
+                                            <p:txEl>
+                                              <p:pRg st="14" end="14"/>
+                                            </p:txEl>
+                                          </p:spTgt>
+                                        </p:tgtEl>
+                                        <p:attrNameLst>
+                                          <p:attrName>style.visibility</p:attrName>
+                                        </p:attrNameLst>
+                                      </p:cBhvr>
+                                      <p:to>
+                                        <p:strVal val="visible"/>
+                                      </p:to>
+                                    </p:set>
+                                  </p:childTnLst>
+                                </p:cTn>
+                              </p:par>
+                            </p:childTnLst>
+                          </p:cTn>
+                        </p:par>
+                      </p:childTnLst>
+                    </p:cTn>
+                  </p:par>
+                  <p:par>
+                    <p:cTn id="47" fill="hold">
+                      <p:stCondLst>
+                        <p:cond delay="indefinite"/>
+                      </p:stCondLst>
+                      <p:childTnLst>
+                        <p:par>
+                          <p:cTn id="48" fill="hold">
+                            <p:stCondLst>
+                              <p:cond delay="0"/>
+                            </p:stCondLst>
+                            <p:childTnLst>
+                              <p:par>
+                                <p:cTn id="49" presetID="1" presetClass="entr" presetSubtype="0" fill="hold" grpId="0" nodeType="clickEffect">
+                                  <p:stCondLst>
+                                    <p:cond delay="0"/>
+                                  </p:stCondLst>
+                                  <p:childTnLst>
+                                    <p:set>
+                                      <p:cBhvr>
+                                        <p:cTn id="50" dur="1" fill="hold">
+                                          <p:stCondLst>
+                                            <p:cond delay="0"/>
+                                          </p:stCondLst>
+                                        </p:cTn>
+                                        <p:tgtEl>
+                                          <p:spTgt spid="3">
+                                            <p:txEl>
+                                              <p:pRg st="15" end="15"/>
+                                            </p:txEl>
+                                          </p:spTgt>
+                                        </p:tgtEl>
+                                        <p:attrNameLst>
+                                          <p:attrName>style.visibility</p:attrName>
+                                        </p:attrNameLst>
+                                      </p:cBhvr>
+                                      <p:to>
+                                        <p:strVal val="visible"/>
+                                      </p:to>
+                                    </p:set>
+                                  </p:childTnLst>
+                                </p:cTn>
+                              </p:par>
+                            </p:childTnLst>
+                          </p:cTn>
+                        </p:par>
+                      </p:childTnLst>
+                    </p:cTn>
+                  </p:par>
+                </p:childTnLst>
+              </p:cTn>
+              <p:prevCondLst>
+                <p:cond evt="onPrev" delay="0">
+                  <p:tgtEl>
+                    <p:sldTgt/>
+                  </p:tgtEl>
+                </p:cond>
+              </p:prevCondLst>
+              <p:nextCondLst>
+                <p:cond evt="onNext" delay="0">
+                  <p:tgtEl>
+                    <p:sldTgt/>
+                  </p:tgtEl>
+                </p:cond>
+              </p:nextCondLst>
+            </p:seq>
+          </p:childTnLst>
+        </p:cTn>
+      </p:par>
+    </p:tnLst>
+    <p:bldLst>
+      <p:bldP spid="3" grpId="0" uiExpand="1" build="p"/>
+    </p:bldLst>
+  </p:timing>
+</p:sld>
+</file>
+
+<file path=ppt/slides/slide16.xml><?xml version="1.0" encoding="utf-8"?>
+<p:sld xmlns:a="http://schemas.openxmlformats.org/drawingml/2006/main" xmlns:r="http://schemas.openxmlformats.org/officeDocument/2006/relationships" xmlns:p="http://schemas.openxmlformats.org/presentationml/2006/main">
+  <p:cSld>
+    <p:spTree>
+      <p:nvGrpSpPr>
+        <p:cNvPr id="1" name=""/>
+        <p:cNvGrpSpPr/>
+        <p:nvPr/>
+      </p:nvGrpSpPr>
+      <p:grpSpPr>
+        <a:xfrm>
+          <a:off x="0" y="0"/>
+          <a:ext cx="0" cy="0"/>
+          <a:chOff x="0" y="0"/>
+          <a:chExt cx="0" cy="0"/>
+        </a:xfrm>
+      </p:grpSpPr>
+      <p:sp>
+        <p:nvSpPr>
+          <p:cNvPr id="2" name="Title 1"/>
+          <p:cNvSpPr>
+            <a:spLocks noGrp="1"/>
+          </p:cNvSpPr>
+          <p:nvPr>
+            <p:ph type="title"/>
+          </p:nvPr>
+        </p:nvSpPr>
+        <p:spPr/>
+        <p:txBody>
+          <a:bodyPr/>
+          <a:lstStyle/>
+          <a:p>
+            <a:r>
+              <a:rPr lang="en-US" dirty="0"/>
+              <a:t>How </a:t>
+            </a:r>
+            <a:r>
+              <a:rPr lang="en-US"/>
+              <a:t>you Will be </a:t>
+            </a:r>
+            <a:r>
+              <a:rPr lang="en-US" dirty="0"/>
+              <a:t>Evaluated</a:t>
+            </a:r>
+          </a:p>
+        </p:txBody>
+      </p:sp>
+      <p:pic>
+        <p:nvPicPr>
+          <p:cNvPr id="5" name="Picture 4">
+            <a:extLst>
+              <a:ext uri="{FF2B5EF4-FFF2-40B4-BE49-F238E27FC236}">
+                <a16:creationId xmlns:a16="http://schemas.microsoft.com/office/drawing/2014/main" id="{7109FDA6-2876-46A5-B7D7-758666AFF5EA}"/>
+              </a:ext>
+            </a:extLst>
+          </p:cNvPr>
+          <p:cNvPicPr>
+            <a:picLocks noChangeAspect="1"/>
+          </p:cNvPicPr>
+          <p:nvPr/>
+        </p:nvPicPr>
+        <p:blipFill>
+          <a:blip r:embed="rId2"/>
+          <a:stretch>
+            <a:fillRect/>
+          </a:stretch>
+        </p:blipFill>
+        <p:spPr>
+          <a:xfrm>
+            <a:off x="1219200" y="1401804"/>
+            <a:ext cx="6898562" cy="5395842"/>
+          </a:xfrm>
+          <a:prstGeom prst="rect">
+            <a:avLst/>
+          </a:prstGeom>
+        </p:spPr>
+      </p:pic>
+      <p:sp>
+        <p:nvSpPr>
+          <p:cNvPr id="6" name="Rectangle 5">
+            <a:extLst>
+              <a:ext uri="{FF2B5EF4-FFF2-40B4-BE49-F238E27FC236}">
+                <a16:creationId xmlns:a16="http://schemas.microsoft.com/office/drawing/2014/main" id="{395F68BA-564D-4328-A17A-2DBF4483FF3B}"/>
+              </a:ext>
+            </a:extLst>
+          </p:cNvPr>
+          <p:cNvSpPr/>
+          <p:nvPr/>
+        </p:nvSpPr>
+        <p:spPr>
+          <a:xfrm>
+            <a:off x="5029200" y="4114800"/>
+            <a:ext cx="533400" cy="1828800"/>
+          </a:xfrm>
+          <a:prstGeom prst="rect">
+            <a:avLst/>
+          </a:prstGeom>
+          <a:noFill/>
+          <a:ln w="44450">
+            <a:solidFill>
+              <a:srgbClr val="FF0000"/>
+            </a:solidFill>
+          </a:ln>
+        </p:spPr>
+        <p:style>
+          <a:lnRef idx="2">
+            <a:schemeClr val="accent1">
+              <a:shade val="50000"/>
+            </a:schemeClr>
+          </a:lnRef>
+          <a:fillRef idx="1">
+            <a:schemeClr val="accent1"/>
+          </a:fillRef>
+          <a:effectRef idx="0">
+            <a:schemeClr val="accent1"/>
+          </a:effectRef>
+          <a:fontRef idx="minor">
+            <a:schemeClr val="lt1"/>
+          </a:fontRef>
+        </p:style>
+        <p:txBody>
+          <a:bodyPr rtlCol="0" anchor="ctr"/>
+          <a:lstStyle/>
+          <a:p>
+            <a:pPr algn="ctr"/>
+            <a:endParaRPr lang="en-US"/>
+          </a:p>
+        </p:txBody>
+      </p:sp>
+      <p:sp>
+        <p:nvSpPr>
+          <p:cNvPr id="7" name="Rectangle 6">
+            <a:extLst>
+              <a:ext uri="{FF2B5EF4-FFF2-40B4-BE49-F238E27FC236}">
+                <a16:creationId xmlns:a16="http://schemas.microsoft.com/office/drawing/2014/main" id="{F832376C-D270-42C8-B6EF-DB901E163E9A}"/>
+              </a:ext>
+            </a:extLst>
+          </p:cNvPr>
+          <p:cNvSpPr/>
+          <p:nvPr/>
+        </p:nvSpPr>
+        <p:spPr>
+          <a:xfrm>
+            <a:off x="1219200" y="1524000"/>
+            <a:ext cx="6898562" cy="914400"/>
+          </a:xfrm>
+          <a:prstGeom prst="rect">
+            <a:avLst/>
+          </a:prstGeom>
+          <a:noFill/>
+          <a:ln w="44450">
+            <a:solidFill>
+              <a:srgbClr val="FF0000"/>
+            </a:solidFill>
+          </a:ln>
+        </p:spPr>
+        <p:style>
+          <a:lnRef idx="2">
+            <a:schemeClr val="accent1">
+              <a:shade val="50000"/>
+            </a:schemeClr>
+          </a:lnRef>
+          <a:fillRef idx="1">
+            <a:schemeClr val="accent1"/>
+          </a:fillRef>
+          <a:effectRef idx="0">
+            <a:schemeClr val="accent1"/>
+          </a:effectRef>
+          <a:fontRef idx="minor">
+            <a:schemeClr val="lt1"/>
+          </a:fontRef>
+        </p:style>
+        <p:txBody>
+          <a:bodyPr rtlCol="0" anchor="ctr"/>
+          <a:lstStyle/>
+          <a:p>
+            <a:pPr algn="ctr"/>
+            <a:endParaRPr lang="en-US"/>
+          </a:p>
+        </p:txBody>
+      </p:sp>
+      <p:sp>
+        <p:nvSpPr>
+          <p:cNvPr id="8" name="Rectangle 7">
+            <a:extLst>
+              <a:ext uri="{FF2B5EF4-FFF2-40B4-BE49-F238E27FC236}">
+                <a16:creationId xmlns:a16="http://schemas.microsoft.com/office/drawing/2014/main" id="{15939D8B-AC03-422F-900B-BECC89780817}"/>
+              </a:ext>
+            </a:extLst>
+          </p:cNvPr>
+          <p:cNvSpPr/>
+          <p:nvPr/>
+        </p:nvSpPr>
+        <p:spPr>
+          <a:xfrm>
+            <a:off x="2590800" y="2819400"/>
+            <a:ext cx="1981200" cy="746166"/>
+          </a:xfrm>
+          <a:prstGeom prst="rect">
+            <a:avLst/>
+          </a:prstGeom>
+          <a:noFill/>
+          <a:ln w="44450">
+            <a:solidFill>
+              <a:srgbClr val="FF0000"/>
+            </a:solidFill>
+          </a:ln>
+        </p:spPr>
+        <p:style>
+          <a:lnRef idx="2">
+            <a:schemeClr val="accent1">
+              <a:shade val="50000"/>
+            </a:schemeClr>
+          </a:lnRef>
+          <a:fillRef idx="1">
+            <a:schemeClr val="accent1"/>
+          </a:fillRef>
+          <a:effectRef idx="0">
+            <a:schemeClr val="accent1"/>
+          </a:effectRef>
+          <a:fontRef idx="minor">
+            <a:schemeClr val="lt1"/>
+          </a:fontRef>
+        </p:style>
+        <p:txBody>
+          <a:bodyPr rtlCol="0" anchor="ctr"/>
+          <a:lstStyle/>
+          <a:p>
+            <a:pPr algn="ctr"/>
+            <a:endParaRPr lang="en-US"/>
+          </a:p>
+        </p:txBody>
+      </p:sp>
+      <p:sp>
+        <p:nvSpPr>
+          <p:cNvPr id="9" name="Rectangle 8">
+            <a:extLst>
+              <a:ext uri="{FF2B5EF4-FFF2-40B4-BE49-F238E27FC236}">
+                <a16:creationId xmlns:a16="http://schemas.microsoft.com/office/drawing/2014/main" id="{CDBA1400-6445-417D-AECD-3D2A2D328CF2}"/>
+              </a:ext>
+            </a:extLst>
+          </p:cNvPr>
+          <p:cNvSpPr/>
+          <p:nvPr/>
+        </p:nvSpPr>
+        <p:spPr>
+          <a:xfrm>
+            <a:off x="1981200" y="6051480"/>
+            <a:ext cx="2209800" cy="746166"/>
+          </a:xfrm>
+          <a:prstGeom prst="rect">
+            <a:avLst/>
+          </a:prstGeom>
+          <a:noFill/>
+          <a:ln w="44450">
+            <a:solidFill>
+              <a:srgbClr val="FF0000"/>
+            </a:solidFill>
+          </a:ln>
+        </p:spPr>
+        <p:style>
+          <a:lnRef idx="2">
+            <a:schemeClr val="accent1">
+              <a:shade val="50000"/>
+            </a:schemeClr>
+          </a:lnRef>
+          <a:fillRef idx="1">
+            <a:schemeClr val="accent1"/>
+          </a:fillRef>
+          <a:effectRef idx="0">
+            <a:schemeClr val="accent1"/>
+          </a:effectRef>
+          <a:fontRef idx="minor">
+            <a:schemeClr val="lt1"/>
+          </a:fontRef>
+        </p:style>
+        <p:txBody>
+          <a:bodyPr rtlCol="0" anchor="ctr"/>
+          <a:lstStyle/>
+          <a:p>
+            <a:pPr algn="ctr"/>
+            <a:endParaRPr lang="en-US"/>
+          </a:p>
+        </p:txBody>
+      </p:sp>
+      <p:sp>
+        <p:nvSpPr>
+          <p:cNvPr id="10" name="Rectangle 9">
+            <a:extLst>
+              <a:ext uri="{FF2B5EF4-FFF2-40B4-BE49-F238E27FC236}">
+                <a16:creationId xmlns:a16="http://schemas.microsoft.com/office/drawing/2014/main" id="{B1CAE152-55F1-4152-B069-C8F1B246FE9B}"/>
+              </a:ext>
+            </a:extLst>
+          </p:cNvPr>
+          <p:cNvSpPr/>
+          <p:nvPr/>
+        </p:nvSpPr>
+        <p:spPr>
+          <a:xfrm>
+            <a:off x="3733800" y="3810000"/>
+            <a:ext cx="533400" cy="2135459"/>
+          </a:xfrm>
+          <a:prstGeom prst="rect">
+            <a:avLst/>
+          </a:prstGeom>
+          <a:noFill/>
+          <a:ln w="44450">
+            <a:solidFill>
+              <a:srgbClr val="FF0000"/>
+            </a:solidFill>
+          </a:ln>
+        </p:spPr>
+        <p:style>
+          <a:lnRef idx="2">
+            <a:schemeClr val="accent1">
+              <a:shade val="50000"/>
+            </a:schemeClr>
+          </a:lnRef>
+          <a:fillRef idx="1">
+            <a:schemeClr val="accent1"/>
+          </a:fillRef>
+          <a:effectRef idx="0">
+            <a:schemeClr val="accent1"/>
+          </a:effectRef>
+          <a:fontRef idx="minor">
+            <a:schemeClr val="lt1"/>
+          </a:fontRef>
+        </p:style>
+        <p:txBody>
+          <a:bodyPr rtlCol="0" anchor="ctr"/>
+          <a:lstStyle/>
+          <a:p>
+            <a:pPr algn="ctr"/>
+            <a:endParaRPr lang="en-US"/>
+          </a:p>
+        </p:txBody>
+      </p:sp>
+    </p:spTree>
+    <p:extLst>
+      <p:ext uri="{BB962C8B-B14F-4D97-AF65-F5344CB8AC3E}">
+        <p14:creationId xmlns:p14="http://schemas.microsoft.com/office/powerpoint/2010/main" val="125524613"/>
+      </p:ext>
+    </p:extLst>
+  </p:cSld>
+  <p:clrMapOvr>
+    <a:masterClrMapping/>
+  </p:clrMapOvr>
+  <p:timing>
+    <p:tnLst>
+      <p:par>
+        <p:cTn id="1" dur="indefinite" restart="never" nodeType="tmRoot">
+          <p:childTnLst>
+            <p:seq concurrent="1" nextAc="seek">
+              <p:cTn id="2" dur="indefinite" nodeType="mainSeq">
+                <p:childTnLst>
+                  <p:par>
+                    <p:cTn id="3" fill="hold">
+                      <p:stCondLst>
+                        <p:cond delay="indefinite"/>
+                      </p:stCondLst>
+                      <p:childTnLst>
+                        <p:par>
+                          <p:cTn id="4" fill="hold">
+                            <p:stCondLst>
+                              <p:cond delay="0"/>
+                            </p:stCondLst>
+                            <p:childTnLst>
+                              <p:par>
+                                <p:cTn id="5" presetID="1" presetClass="entr" presetSubtype="0" fill="hold" grpId="0" nodeType="clickEffect">
+                                  <p:stCondLst>
+                                    <p:cond delay="0"/>
+                                  </p:stCondLst>
+                                  <p:childTnLst>
+                                    <p:set>
+                                      <p:cBhvr>
+                                        <p:cTn id="6" dur="1" fill="hold">
+                                          <p:stCondLst>
+                                            <p:cond delay="0"/>
+                                          </p:stCondLst>
+                                        </p:cTn>
+                                        <p:tgtEl>
+                                          <p:spTgt spid="7"/>
+                                        </p:tgtEl>
+                                        <p:attrNameLst>
+                                          <p:attrName>style.visibility</p:attrName>
+                                        </p:attrNameLst>
+                                      </p:cBhvr>
+                                      <p:to>
+                                        <p:strVal val="visible"/>
+                                      </p:to>
+                                    </p:set>
+                                  </p:childTnLst>
+                                </p:cTn>
+                              </p:par>
+                            </p:childTnLst>
+                          </p:cTn>
+                        </p:par>
+                      </p:childTnLst>
+                    </p:cTn>
+                  </p:par>
+                  <p:par>
+                    <p:cTn id="7" fill="hold">
+                      <p:stCondLst>
+                        <p:cond delay="indefinite"/>
+                      </p:stCondLst>
+                      <p:childTnLst>
+                        <p:par>
+                          <p:cTn id="8" fill="hold">
+                            <p:stCondLst>
+                              <p:cond delay="0"/>
+                            </p:stCondLst>
+                            <p:childTnLst>
+                              <p:par>
+                                <p:cTn id="9" presetID="1" presetClass="entr" presetSubtype="0" fill="hold" grpId="0" nodeType="clickEffect">
+                                  <p:stCondLst>
+                                    <p:cond delay="0"/>
+                                  </p:stCondLst>
+                                  <p:childTnLst>
+                                    <p:set>
+                                      <p:cBhvr>
+                                        <p:cTn id="10" dur="1" fill="hold">
+                                          <p:stCondLst>
+                                            <p:cond delay="0"/>
+                                          </p:stCondLst>
+                                        </p:cTn>
+                                        <p:tgtEl>
+                                          <p:spTgt spid="8"/>
+                                        </p:tgtEl>
+                                        <p:attrNameLst>
+                                          <p:attrName>style.visibility</p:attrName>
+                                        </p:attrNameLst>
+                                      </p:cBhvr>
+                                      <p:to>
+                                        <p:strVal val="visible"/>
+                                      </p:to>
+                                    </p:set>
+                                  </p:childTnLst>
+                                </p:cTn>
+                              </p:par>
+                            </p:childTnLst>
+                          </p:cTn>
+                        </p:par>
+                      </p:childTnLst>
+                    </p:cTn>
+                  </p:par>
+                  <p:par>
+                    <p:cTn id="11" fill="hold">
+                      <p:stCondLst>
+                        <p:cond delay="indefinite"/>
+                      </p:stCondLst>
+                      <p:childTnLst>
+                        <p:par>
+                          <p:cTn id="12" fill="hold">
+                            <p:stCondLst>
+                              <p:cond delay="0"/>
+                            </p:stCondLst>
+                            <p:childTnLst>
+                              <p:par>
+                                <p:cTn id="13" presetID="1" presetClass="entr" presetSubtype="0" fill="hold" grpId="0" nodeType="clickEffect">
+                                  <p:stCondLst>
+                                    <p:cond delay="0"/>
+                                  </p:stCondLst>
+                                  <p:childTnLst>
+                                    <p:set>
+                                      <p:cBhvr>
+                                        <p:cTn id="14" dur="1" fill="hold">
+                                          <p:stCondLst>
+                                            <p:cond delay="0"/>
+                                          </p:stCondLst>
+                                        </p:cTn>
+                                        <p:tgtEl>
+                                          <p:spTgt spid="10"/>
+                                        </p:tgtEl>
+                                        <p:attrNameLst>
+                                          <p:attrName>style.visibility</p:attrName>
+                                        </p:attrNameLst>
+                                      </p:cBhvr>
+                                      <p:to>
+                                        <p:strVal val="visible"/>
+                                      </p:to>
+                                    </p:set>
+                                  </p:childTnLst>
+                                </p:cTn>
+                              </p:par>
+                            </p:childTnLst>
+                          </p:cTn>
+                        </p:par>
+                      </p:childTnLst>
+                    </p:cTn>
+                  </p:par>
+                  <p:par>
+                    <p:cTn id="15" fill="hold">
+                      <p:stCondLst>
+                        <p:cond delay="indefinite"/>
+                      </p:stCondLst>
+                      <p:childTnLst>
+                        <p:par>
+                          <p:cTn id="16" fill="hold">
+                            <p:stCondLst>
+                              <p:cond delay="0"/>
+                            </p:stCondLst>
+                            <p:childTnLst>
+                              <p:par>
+                                <p:cTn id="17" presetID="1" presetClass="entr" presetSubtype="0" fill="hold" grpId="0" nodeType="clickEffect">
+                                  <p:stCondLst>
+                                    <p:cond delay="0"/>
+                                  </p:stCondLst>
+                                  <p:childTnLst>
+                                    <p:set>
+                                      <p:cBhvr>
+                                        <p:cTn id="18" dur="1" fill="hold">
+                                          <p:stCondLst>
+                                            <p:cond delay="0"/>
+                                          </p:stCondLst>
+                                        </p:cTn>
+                                        <p:tgtEl>
+                                          <p:spTgt spid="6"/>
+                                        </p:tgtEl>
+                                        <p:attrNameLst>
+                                          <p:attrName>style.visibility</p:attrName>
+                                        </p:attrNameLst>
+                                      </p:cBhvr>
+                                      <p:to>
+                                        <p:strVal val="visible"/>
+                                      </p:to>
+                                    </p:set>
+                                  </p:childTnLst>
+                                </p:cTn>
+                              </p:par>
+                            </p:childTnLst>
+                          </p:cTn>
+                        </p:par>
+                      </p:childTnLst>
+                    </p:cTn>
+                  </p:par>
+                  <p:par>
+                    <p:cTn id="19" fill="hold">
+                      <p:stCondLst>
+                        <p:cond delay="indefinite"/>
+                      </p:stCondLst>
+                      <p:childTnLst>
+                        <p:par>
+                          <p:cTn id="20" fill="hold">
+                            <p:stCondLst>
+                              <p:cond delay="0"/>
+                            </p:stCondLst>
+                            <p:childTnLst>
+                              <p:par>
+                                <p:cTn id="21" presetID="1" presetClass="entr" presetSubtype="0" fill="hold" grpId="0" nodeType="clickEffect">
+                                  <p:stCondLst>
+                                    <p:cond delay="0"/>
+                                  </p:stCondLst>
+                                  <p:childTnLst>
+                                    <p:set>
+                                      <p:cBhvr>
+                                        <p:cTn id="22" dur="1" fill="hold">
+                                          <p:stCondLst>
+                                            <p:cond delay="0"/>
+                                          </p:stCondLst>
+                                        </p:cTn>
+                                        <p:tgtEl>
+                                          <p:spTgt spid="9"/>
+                                        </p:tgtEl>
+                                        <p:attrNameLst>
+                                          <p:attrName>style.visibility</p:attrName>
+                                        </p:attrNameLst>
+                                      </p:cBhvr>
+                                      <p:to>
+                                        <p:strVal val="visible"/>
+                                      </p:to>
+                                    </p:set>
+                                  </p:childTnLst>
+                                </p:cTn>
+                              </p:par>
+                            </p:childTnLst>
+                          </p:cTn>
+                        </p:par>
+                      </p:childTnLst>
+                    </p:cTn>
+                  </p:par>
+                </p:childTnLst>
+              </p:cTn>
+              <p:prevCondLst>
+                <p:cond evt="onPrev" delay="0">
+                  <p:tgtEl>
+                    <p:sldTgt/>
+                  </p:tgtEl>
+                </p:cond>
+              </p:prevCondLst>
+              <p:nextCondLst>
+                <p:cond evt="onNext" delay="0">
+                  <p:tgtEl>
+                    <p:sldTgt/>
+                  </p:tgtEl>
+                </p:cond>
+              </p:nextCondLst>
+            </p:seq>
+          </p:childTnLst>
+        </p:cTn>
+      </p:par>
+    </p:tnLst>
+    <p:bldLst>
+      <p:bldP spid="6" grpId="0" animBg="1"/>
+      <p:bldP spid="7" grpId="0" animBg="1"/>
+      <p:bldP spid="8" grpId="0" animBg="1"/>
+      <p:bldP spid="9" grpId="0" animBg="1"/>
+      <p:bldP spid="10" grpId="0" animBg="1"/>
+    </p:bldLst>
+  </p:timing>
+</p:sld>
+</file>
+
+<file path=ppt/slides/slide17.xml><?xml version="1.0" encoding="utf-8"?>
+<p:sld xmlns:a="http://schemas.openxmlformats.org/drawingml/2006/main" xmlns:r="http://schemas.openxmlformats.org/officeDocument/2006/relationships" xmlns:p="http://schemas.openxmlformats.org/presentationml/2006/main">
+  <p:cSld>
+    <p:spTree>
+      <p:nvGrpSpPr>
+        <p:cNvPr id="1" name=""/>
+        <p:cNvGrpSpPr/>
+        <p:nvPr/>
+      </p:nvGrpSpPr>
+      <p:grpSpPr>
+        <a:xfrm>
+          <a:off x="0" y="0"/>
+          <a:ext cx="0" cy="0"/>
+          <a:chOff x="0" y="0"/>
+          <a:chExt cx="0" cy="0"/>
+        </a:xfrm>
+      </p:grpSpPr>
+      <p:sp>
+        <p:nvSpPr>
+          <p:cNvPr id="2" name="Title 1"/>
+          <p:cNvSpPr>
+            <a:spLocks noGrp="1"/>
+          </p:cNvSpPr>
+          <p:nvPr>
+            <p:ph type="title"/>
+          </p:nvPr>
+        </p:nvSpPr>
+        <p:spPr/>
+        <p:txBody>
+          <a:bodyPr/>
+          <a:lstStyle/>
+          <a:p>
+            <a:r>
+              <a:rPr lang="en-US" dirty="0"/>
               <a:t>While Taking this class …</a:t>
             </a:r>
           </a:p>
@@ -7951,1519 +10055,7 @@
 </p:sld>
 </file>
 
-<file path=ppt/slides/slide15.xml><?xml version="1.0" encoding="utf-8"?>
-<p:sld xmlns:a="http://schemas.openxmlformats.org/drawingml/2006/main" xmlns:r="http://schemas.openxmlformats.org/officeDocument/2006/relationships" xmlns:p="http://schemas.openxmlformats.org/presentationml/2006/main">
-  <p:cSld>
-    <p:spTree>
-      <p:nvGrpSpPr>
-        <p:cNvPr id="1" name=""/>
-        <p:cNvGrpSpPr/>
-        <p:nvPr/>
-      </p:nvGrpSpPr>
-      <p:grpSpPr>
-        <a:xfrm>
-          <a:off x="0" y="0"/>
-          <a:ext cx="0" cy="0"/>
-          <a:chOff x="0" y="0"/>
-          <a:chExt cx="0" cy="0"/>
-        </a:xfrm>
-      </p:grpSpPr>
-      <p:sp>
-        <p:nvSpPr>
-          <p:cNvPr id="2" name="Title 1"/>
-          <p:cNvSpPr>
-            <a:spLocks noGrp="1"/>
-          </p:cNvSpPr>
-          <p:nvPr>
-            <p:ph type="title"/>
-          </p:nvPr>
-        </p:nvSpPr>
-        <p:spPr/>
-        <p:txBody>
-          <a:bodyPr/>
-          <a:lstStyle/>
-          <a:p>
-            <a:r>
-              <a:rPr lang="en-US" dirty="0"/>
-              <a:t>Part </a:t>
-            </a:r>
-            <a:r>
-              <a:rPr lang="en-US"/>
-              <a:t>I (29</a:t>
-            </a:r>
-            <a:r>
-              <a:rPr lang="en-US" baseline="30000"/>
-              <a:t>th</a:t>
-            </a:r>
-            <a:r>
-              <a:rPr lang="en-US"/>
-              <a:t> </a:t>
-            </a:r>
-            <a:r>
-              <a:rPr lang="en-US" dirty="0"/>
-              <a:t>May): Game Engine and Game Components</a:t>
-            </a:r>
-          </a:p>
-        </p:txBody>
-      </p:sp>
-      <p:sp>
-        <p:nvSpPr>
-          <p:cNvPr id="3" name="Content Placeholder 2"/>
-          <p:cNvSpPr>
-            <a:spLocks noGrp="1"/>
-          </p:cNvSpPr>
-          <p:nvPr>
-            <p:ph sz="quarter" idx="13"/>
-          </p:nvPr>
-        </p:nvSpPr>
-        <p:spPr/>
-        <p:txBody>
-          <a:bodyPr>
-            <a:normAutofit/>
-          </a:bodyPr>
-          <a:lstStyle/>
-          <a:p>
-            <a:r>
-              <a:rPr lang="en-US" b="1" dirty="0"/>
-              <a:t>Session 1 (today, AM)</a:t>
-            </a:r>
-            <a:r>
-              <a:rPr lang="en-US" dirty="0"/>
-              <a:t>: Game Engine and Game Objects</a:t>
-            </a:r>
-            <a:endParaRPr lang="en-US" b="1" dirty="0">
-              <a:solidFill>
-                <a:srgbClr val="FFFF00"/>
-              </a:solidFill>
-            </a:endParaRPr>
-          </a:p>
-          <a:p>
-            <a:pPr lvl="1"/>
-            <a:r>
-              <a:rPr lang="en-US" b="1" dirty="0"/>
-              <a:t>Learn</a:t>
-            </a:r>
-            <a:r>
-              <a:rPr lang="en-US" dirty="0"/>
-              <a:t>: Intro + Environment + Game Engine/Objects Programming Model</a:t>
-            </a:r>
-          </a:p>
-          <a:p>
-            <a:pPr lvl="1"/>
-            <a:r>
-              <a:rPr lang="en-US" dirty="0"/>
-              <a:t>Assignment</a:t>
-            </a:r>
-            <a:r>
-              <a:rPr lang="en-US" b="1" dirty="0">
-                <a:solidFill>
-                  <a:srgbClr val="FFFF00"/>
-                </a:solidFill>
-              </a:rPr>
-              <a:t> + Short Quiz: </a:t>
-            </a:r>
-            <a:r>
-              <a:rPr lang="en-US" dirty="0"/>
-              <a:t>Hands-on with the Game Engine, due for PM class</a:t>
-            </a:r>
-          </a:p>
-          <a:p>
-            <a:pPr lvl="2"/>
-            <a:r>
-              <a:rPr lang="en-US" dirty="0"/>
-              <a:t>If you don’t practice, you won’t learn, really!</a:t>
-            </a:r>
-          </a:p>
-          <a:p>
-            <a:r>
-              <a:rPr lang="en-US" b="1" dirty="0"/>
-              <a:t>Session 2 (today, PM)</a:t>
-            </a:r>
-            <a:r>
-              <a:rPr lang="en-US" dirty="0"/>
-              <a:t>: Components in a Videogame</a:t>
-            </a:r>
-          </a:p>
-          <a:p>
-            <a:pPr lvl="1"/>
-            <a:r>
-              <a:rPr lang="en-US" b="1" dirty="0">
-                <a:solidFill>
-                  <a:srgbClr val="FFFF00"/>
-                </a:solidFill>
-              </a:rPr>
-              <a:t>Due: </a:t>
-            </a:r>
-            <a:r>
-              <a:rPr lang="en-US" dirty="0"/>
-              <a:t>programming assignment (not graded) + </a:t>
-            </a:r>
-            <a:r>
-              <a:rPr lang="en-US" b="1" dirty="0">
-                <a:solidFill>
-                  <a:srgbClr val="FFFF00"/>
-                </a:solidFill>
-              </a:rPr>
-              <a:t>Quiz (graded)</a:t>
-            </a:r>
-          </a:p>
-          <a:p>
-            <a:pPr lvl="1"/>
-            <a:r>
-              <a:rPr lang="en-US" b="1" dirty="0"/>
-              <a:t>Learn</a:t>
-            </a:r>
-            <a:r>
-              <a:rPr lang="en-US" dirty="0"/>
-              <a:t>: My solution to assignment 1</a:t>
-            </a:r>
-          </a:p>
-          <a:p>
-            <a:pPr lvl="1"/>
-            <a:r>
-              <a:rPr lang="en-US" b="1" dirty="0"/>
-              <a:t>Learn:</a:t>
-            </a:r>
-            <a:r>
-              <a:rPr lang="en-US" dirty="0"/>
-              <a:t> The World, Behaviors and Interactions</a:t>
-            </a:r>
-            <a:endParaRPr lang="en-US" dirty="0">
-              <a:solidFill>
-                <a:srgbClr val="FFFF00"/>
-              </a:solidFill>
-            </a:endParaRPr>
-          </a:p>
-          <a:p>
-            <a:pPr lvl="1"/>
-            <a:r>
-              <a:rPr lang="en-US" b="1" dirty="0">
-                <a:solidFill>
-                  <a:srgbClr val="FFFF00"/>
-                </a:solidFill>
-              </a:rPr>
-              <a:t>Assignment: </a:t>
-            </a:r>
-            <a:r>
-              <a:rPr lang="en-US" dirty="0"/>
-              <a:t>Programming Exercise 2 </a:t>
-            </a:r>
-          </a:p>
-          <a:p>
-            <a:pPr lvl="2"/>
-            <a:r>
-              <a:rPr lang="en-US" b="1" dirty="0">
-                <a:solidFill>
-                  <a:srgbClr val="FFFF00"/>
-                </a:solidFill>
-              </a:rPr>
-              <a:t>Due: coming Monday at 5am [</a:t>
-            </a:r>
-            <a:r>
-              <a:rPr lang="en-US" dirty="0">
-                <a:solidFill>
-                  <a:srgbClr val="FFFF00"/>
-                </a:solidFill>
-                <a:highlight>
-                  <a:srgbClr val="FF0000"/>
-                </a:highlight>
-              </a:rPr>
-              <a:t>Submit: EXE build</a:t>
-            </a:r>
-            <a:r>
-              <a:rPr lang="en-US" dirty="0">
-                <a:solidFill>
-                  <a:srgbClr val="FFFF00"/>
-                </a:solidFill>
-              </a:rPr>
-              <a:t>]</a:t>
-            </a:r>
-            <a:endParaRPr lang="en-US" b="1" dirty="0">
-              <a:solidFill>
-                <a:srgbClr val="FFFF00"/>
-              </a:solidFill>
-            </a:endParaRPr>
-          </a:p>
-        </p:txBody>
-      </p:sp>
-    </p:spTree>
-    <p:extLst>
-      <p:ext uri="{BB962C8B-B14F-4D97-AF65-F5344CB8AC3E}">
-        <p14:creationId xmlns:p14="http://schemas.microsoft.com/office/powerpoint/2010/main" val="4149015376"/>
-      </p:ext>
-    </p:extLst>
-  </p:cSld>
-  <p:clrMapOvr>
-    <a:masterClrMapping/>
-  </p:clrMapOvr>
-  <p:timing>
-    <p:tnLst>
-      <p:par>
-        <p:cTn id="1" dur="indefinite" restart="never" nodeType="tmRoot">
-          <p:childTnLst>
-            <p:seq concurrent="1" nextAc="seek">
-              <p:cTn id="2" dur="indefinite" nodeType="mainSeq">
-                <p:childTnLst>
-                  <p:par>
-                    <p:cTn id="3" fill="hold">
-                      <p:stCondLst>
-                        <p:cond delay="indefinite"/>
-                      </p:stCondLst>
-                      <p:childTnLst>
-                        <p:par>
-                          <p:cTn id="4" fill="hold">
-                            <p:stCondLst>
-                              <p:cond delay="0"/>
-                            </p:stCondLst>
-                            <p:childTnLst>
-                              <p:par>
-                                <p:cTn id="5" presetID="1" presetClass="entr" presetSubtype="0" fill="hold" grpId="0" nodeType="clickEffect">
-                                  <p:stCondLst>
-                                    <p:cond delay="0"/>
-                                  </p:stCondLst>
-                                  <p:childTnLst>
-                                    <p:set>
-                                      <p:cBhvr>
-                                        <p:cTn id="6" dur="1" fill="hold">
-                                          <p:stCondLst>
-                                            <p:cond delay="0"/>
-                                          </p:stCondLst>
-                                        </p:cTn>
-                                        <p:tgtEl>
-                                          <p:spTgt spid="3">
-                                            <p:txEl>
-                                              <p:pRg st="0" end="0"/>
-                                            </p:txEl>
-                                          </p:spTgt>
-                                        </p:tgtEl>
-                                        <p:attrNameLst>
-                                          <p:attrName>style.visibility</p:attrName>
-                                        </p:attrNameLst>
-                                      </p:cBhvr>
-                                      <p:to>
-                                        <p:strVal val="visible"/>
-                                      </p:to>
-                                    </p:set>
-                                  </p:childTnLst>
-                                </p:cTn>
-                              </p:par>
-                              <p:par>
-                                <p:cTn id="7" presetID="1" presetClass="entr" presetSubtype="0" fill="hold" grpId="0" nodeType="withEffect">
-                                  <p:stCondLst>
-                                    <p:cond delay="0"/>
-                                  </p:stCondLst>
-                                  <p:childTnLst>
-                                    <p:set>
-                                      <p:cBhvr>
-                                        <p:cTn id="8" dur="1" fill="hold">
-                                          <p:stCondLst>
-                                            <p:cond delay="0"/>
-                                          </p:stCondLst>
-                                        </p:cTn>
-                                        <p:tgtEl>
-                                          <p:spTgt spid="3">
-                                            <p:txEl>
-                                              <p:pRg st="1" end="1"/>
-                                            </p:txEl>
-                                          </p:spTgt>
-                                        </p:tgtEl>
-                                        <p:attrNameLst>
-                                          <p:attrName>style.visibility</p:attrName>
-                                        </p:attrNameLst>
-                                      </p:cBhvr>
-                                      <p:to>
-                                        <p:strVal val="visible"/>
-                                      </p:to>
-                                    </p:set>
-                                  </p:childTnLst>
-                                </p:cTn>
-                              </p:par>
-                              <p:par>
-                                <p:cTn id="9" presetID="1" presetClass="entr" presetSubtype="0" fill="hold" grpId="0" nodeType="withEffect">
-                                  <p:stCondLst>
-                                    <p:cond delay="0"/>
-                                  </p:stCondLst>
-                                  <p:childTnLst>
-                                    <p:set>
-                                      <p:cBhvr>
-                                        <p:cTn id="10" dur="1" fill="hold">
-                                          <p:stCondLst>
-                                            <p:cond delay="0"/>
-                                          </p:stCondLst>
-                                        </p:cTn>
-                                        <p:tgtEl>
-                                          <p:spTgt spid="3">
-                                            <p:txEl>
-                                              <p:pRg st="2" end="2"/>
-                                            </p:txEl>
-                                          </p:spTgt>
-                                        </p:tgtEl>
-                                        <p:attrNameLst>
-                                          <p:attrName>style.visibility</p:attrName>
-                                        </p:attrNameLst>
-                                      </p:cBhvr>
-                                      <p:to>
-                                        <p:strVal val="visible"/>
-                                      </p:to>
-                                    </p:set>
-                                  </p:childTnLst>
-                                </p:cTn>
-                              </p:par>
-                              <p:par>
-                                <p:cTn id="11" presetID="1" presetClass="entr" presetSubtype="0" fill="hold" grpId="0" nodeType="withEffect">
-                                  <p:stCondLst>
-                                    <p:cond delay="0"/>
-                                  </p:stCondLst>
-                                  <p:childTnLst>
-                                    <p:set>
-                                      <p:cBhvr>
-                                        <p:cTn id="12" dur="1" fill="hold">
-                                          <p:stCondLst>
-                                            <p:cond delay="0"/>
-                                          </p:stCondLst>
-                                        </p:cTn>
-                                        <p:tgtEl>
-                                          <p:spTgt spid="3">
-                                            <p:txEl>
-                                              <p:pRg st="3" end="3"/>
-                                            </p:txEl>
-                                          </p:spTgt>
-                                        </p:tgtEl>
-                                        <p:attrNameLst>
-                                          <p:attrName>style.visibility</p:attrName>
-                                        </p:attrNameLst>
-                                      </p:cBhvr>
-                                      <p:to>
-                                        <p:strVal val="visible"/>
-                                      </p:to>
-                                    </p:set>
-                                  </p:childTnLst>
-                                </p:cTn>
-                              </p:par>
-                            </p:childTnLst>
-                          </p:cTn>
-                        </p:par>
-                      </p:childTnLst>
-                    </p:cTn>
-                  </p:par>
-                  <p:par>
-                    <p:cTn id="13" fill="hold">
-                      <p:stCondLst>
-                        <p:cond delay="indefinite"/>
-                      </p:stCondLst>
-                      <p:childTnLst>
-                        <p:par>
-                          <p:cTn id="14" fill="hold">
-                            <p:stCondLst>
-                              <p:cond delay="0"/>
-                            </p:stCondLst>
-                            <p:childTnLst>
-                              <p:par>
-                                <p:cTn id="15" presetID="1" presetClass="entr" presetSubtype="0" fill="hold" grpId="0" nodeType="clickEffect">
-                                  <p:stCondLst>
-                                    <p:cond delay="0"/>
-                                  </p:stCondLst>
-                                  <p:childTnLst>
-                                    <p:set>
-                                      <p:cBhvr>
-                                        <p:cTn id="16" dur="1" fill="hold">
-                                          <p:stCondLst>
-                                            <p:cond delay="0"/>
-                                          </p:stCondLst>
-                                        </p:cTn>
-                                        <p:tgtEl>
-                                          <p:spTgt spid="3">
-                                            <p:txEl>
-                                              <p:pRg st="4" end="4"/>
-                                            </p:txEl>
-                                          </p:spTgt>
-                                        </p:tgtEl>
-                                        <p:attrNameLst>
-                                          <p:attrName>style.visibility</p:attrName>
-                                        </p:attrNameLst>
-                                      </p:cBhvr>
-                                      <p:to>
-                                        <p:strVal val="visible"/>
-                                      </p:to>
-                                    </p:set>
-                                  </p:childTnLst>
-                                </p:cTn>
-                              </p:par>
-                              <p:par>
-                                <p:cTn id="17" presetID="1" presetClass="entr" presetSubtype="0" fill="hold" grpId="0" nodeType="withEffect">
-                                  <p:stCondLst>
-                                    <p:cond delay="0"/>
-                                  </p:stCondLst>
-                                  <p:childTnLst>
-                                    <p:set>
-                                      <p:cBhvr>
-                                        <p:cTn id="18" dur="1" fill="hold">
-                                          <p:stCondLst>
-                                            <p:cond delay="0"/>
-                                          </p:stCondLst>
-                                        </p:cTn>
-                                        <p:tgtEl>
-                                          <p:spTgt spid="3">
-                                            <p:txEl>
-                                              <p:pRg st="5" end="5"/>
-                                            </p:txEl>
-                                          </p:spTgt>
-                                        </p:tgtEl>
-                                        <p:attrNameLst>
-                                          <p:attrName>style.visibility</p:attrName>
-                                        </p:attrNameLst>
-                                      </p:cBhvr>
-                                      <p:to>
-                                        <p:strVal val="visible"/>
-                                      </p:to>
-                                    </p:set>
-                                  </p:childTnLst>
-                                </p:cTn>
-                              </p:par>
-                              <p:par>
-                                <p:cTn id="19" presetID="1" presetClass="entr" presetSubtype="0" fill="hold" grpId="0" nodeType="withEffect">
-                                  <p:stCondLst>
-                                    <p:cond delay="0"/>
-                                  </p:stCondLst>
-                                  <p:childTnLst>
-                                    <p:set>
-                                      <p:cBhvr>
-                                        <p:cTn id="20" dur="1" fill="hold">
-                                          <p:stCondLst>
-                                            <p:cond delay="0"/>
-                                          </p:stCondLst>
-                                        </p:cTn>
-                                        <p:tgtEl>
-                                          <p:spTgt spid="3">
-                                            <p:txEl>
-                                              <p:pRg st="6" end="6"/>
-                                            </p:txEl>
-                                          </p:spTgt>
-                                        </p:tgtEl>
-                                        <p:attrNameLst>
-                                          <p:attrName>style.visibility</p:attrName>
-                                        </p:attrNameLst>
-                                      </p:cBhvr>
-                                      <p:to>
-                                        <p:strVal val="visible"/>
-                                      </p:to>
-                                    </p:set>
-                                  </p:childTnLst>
-                                </p:cTn>
-                              </p:par>
-                              <p:par>
-                                <p:cTn id="21" presetID="1" presetClass="entr" presetSubtype="0" fill="hold" grpId="0" nodeType="withEffect">
-                                  <p:stCondLst>
-                                    <p:cond delay="0"/>
-                                  </p:stCondLst>
-                                  <p:childTnLst>
-                                    <p:set>
-                                      <p:cBhvr>
-                                        <p:cTn id="22" dur="1" fill="hold">
-                                          <p:stCondLst>
-                                            <p:cond delay="0"/>
-                                          </p:stCondLst>
-                                        </p:cTn>
-                                        <p:tgtEl>
-                                          <p:spTgt spid="3">
-                                            <p:txEl>
-                                              <p:pRg st="7" end="7"/>
-                                            </p:txEl>
-                                          </p:spTgt>
-                                        </p:tgtEl>
-                                        <p:attrNameLst>
-                                          <p:attrName>style.visibility</p:attrName>
-                                        </p:attrNameLst>
-                                      </p:cBhvr>
-                                      <p:to>
-                                        <p:strVal val="visible"/>
-                                      </p:to>
-                                    </p:set>
-                                  </p:childTnLst>
-                                </p:cTn>
-                              </p:par>
-                              <p:par>
-                                <p:cTn id="23" presetID="1" presetClass="entr" presetSubtype="0" fill="hold" grpId="0" nodeType="withEffect">
-                                  <p:stCondLst>
-                                    <p:cond delay="0"/>
-                                  </p:stCondLst>
-                                  <p:childTnLst>
-                                    <p:set>
-                                      <p:cBhvr>
-                                        <p:cTn id="24" dur="1" fill="hold">
-                                          <p:stCondLst>
-                                            <p:cond delay="0"/>
-                                          </p:stCondLst>
-                                        </p:cTn>
-                                        <p:tgtEl>
-                                          <p:spTgt spid="3">
-                                            <p:txEl>
-                                              <p:pRg st="8" end="8"/>
-                                            </p:txEl>
-                                          </p:spTgt>
-                                        </p:tgtEl>
-                                        <p:attrNameLst>
-                                          <p:attrName>style.visibility</p:attrName>
-                                        </p:attrNameLst>
-                                      </p:cBhvr>
-                                      <p:to>
-                                        <p:strVal val="visible"/>
-                                      </p:to>
-                                    </p:set>
-                                  </p:childTnLst>
-                                </p:cTn>
-                              </p:par>
-                              <p:par>
-                                <p:cTn id="25" presetID="1" presetClass="entr" presetSubtype="0" fill="hold" grpId="0" nodeType="withEffect">
-                                  <p:stCondLst>
-                                    <p:cond delay="0"/>
-                                  </p:stCondLst>
-                                  <p:childTnLst>
-                                    <p:set>
-                                      <p:cBhvr>
-                                        <p:cTn id="26" dur="1" fill="hold">
-                                          <p:stCondLst>
-                                            <p:cond delay="0"/>
-                                          </p:stCondLst>
-                                        </p:cTn>
-                                        <p:tgtEl>
-                                          <p:spTgt spid="3">
-                                            <p:txEl>
-                                              <p:pRg st="9" end="9"/>
-                                            </p:txEl>
-                                          </p:spTgt>
-                                        </p:tgtEl>
-                                        <p:attrNameLst>
-                                          <p:attrName>style.visibility</p:attrName>
-                                        </p:attrNameLst>
-                                      </p:cBhvr>
-                                      <p:to>
-                                        <p:strVal val="visible"/>
-                                      </p:to>
-                                    </p:set>
-                                  </p:childTnLst>
-                                </p:cTn>
-                              </p:par>
-                            </p:childTnLst>
-                          </p:cTn>
-                        </p:par>
-                      </p:childTnLst>
-                    </p:cTn>
-                  </p:par>
-                </p:childTnLst>
-              </p:cTn>
-              <p:prevCondLst>
-                <p:cond evt="onPrev" delay="0">
-                  <p:tgtEl>
-                    <p:sldTgt/>
-                  </p:tgtEl>
-                </p:cond>
-              </p:prevCondLst>
-              <p:nextCondLst>
-                <p:cond evt="onNext" delay="0">
-                  <p:tgtEl>
-                    <p:sldTgt/>
-                  </p:tgtEl>
-                </p:cond>
-              </p:nextCondLst>
-            </p:seq>
-          </p:childTnLst>
-        </p:cTn>
-      </p:par>
-    </p:tnLst>
-    <p:bldLst>
-      <p:bldP spid="3" grpId="0" uiExpand="1" build="p"/>
-    </p:bldLst>
-  </p:timing>
-</p:sld>
-</file>
-
-<file path=ppt/slides/slide16.xml><?xml version="1.0" encoding="utf-8"?>
-<p:sld xmlns:a="http://schemas.openxmlformats.org/drawingml/2006/main" xmlns:r="http://schemas.openxmlformats.org/officeDocument/2006/relationships" xmlns:p="http://schemas.openxmlformats.org/presentationml/2006/main">
-  <p:cSld>
-    <p:spTree>
-      <p:nvGrpSpPr>
-        <p:cNvPr id="1" name=""/>
-        <p:cNvGrpSpPr/>
-        <p:nvPr/>
-      </p:nvGrpSpPr>
-      <p:grpSpPr>
-        <a:xfrm>
-          <a:off x="0" y="0"/>
-          <a:ext cx="0" cy="0"/>
-          <a:chOff x="0" y="0"/>
-          <a:chExt cx="0" cy="0"/>
-        </a:xfrm>
-      </p:grpSpPr>
-      <p:sp>
-        <p:nvSpPr>
-          <p:cNvPr id="2" name="Title 1"/>
-          <p:cNvSpPr>
-            <a:spLocks noGrp="1"/>
-          </p:cNvSpPr>
-          <p:nvPr>
-            <p:ph type="title"/>
-          </p:nvPr>
-        </p:nvSpPr>
-        <p:spPr/>
-        <p:txBody>
-          <a:bodyPr/>
-          <a:lstStyle/>
-          <a:p>
-            <a:r>
-              <a:rPr lang="en-US" dirty="0"/>
-              <a:t>Part II (July 2021): Build an Awesome Game</a:t>
-            </a:r>
-          </a:p>
-        </p:txBody>
-      </p:sp>
-      <p:sp>
-        <p:nvSpPr>
-          <p:cNvPr id="3" name="Content Placeholder 2"/>
-          <p:cNvSpPr>
-            <a:spLocks noGrp="1"/>
-          </p:cNvSpPr>
-          <p:nvPr>
-            <p:ph sz="quarter" idx="13"/>
-          </p:nvPr>
-        </p:nvSpPr>
-        <p:spPr/>
-        <p:txBody>
-          <a:bodyPr>
-            <a:normAutofit fontScale="85000" lnSpcReduction="10000"/>
-          </a:bodyPr>
-          <a:lstStyle/>
-          <a:p>
-            <a:r>
-              <a:rPr lang="en-US" b="1" dirty="0"/>
-              <a:t>Meetings: </a:t>
-            </a:r>
-            <a:r>
-              <a:rPr lang="en-US" dirty="0"/>
-              <a:t>Every day at 9:00am, until we are done.</a:t>
-            </a:r>
-            <a:endParaRPr lang="en-US" b="1" dirty="0"/>
-          </a:p>
-          <a:p>
-            <a:r>
-              <a:rPr lang="en-US" b="1" dirty="0"/>
-              <a:t>Top priority: </a:t>
-            </a:r>
-            <a:r>
-              <a:rPr lang="en-US" b="1" dirty="0">
-                <a:solidFill>
-                  <a:srgbClr val="FFFF00"/>
-                </a:solidFill>
-              </a:rPr>
-              <a:t>Form your groups!! </a:t>
-            </a:r>
-            <a:r>
-              <a:rPr lang="en-US" dirty="0"/>
-              <a:t>thinking about your game and final game requirements</a:t>
-            </a:r>
-          </a:p>
-          <a:p>
-            <a:pPr lvl="1"/>
-            <a:r>
-              <a:rPr lang="en-US" dirty="0"/>
-              <a:t>Intro to yourself and your interests for forming groups (e.g., from 2019: </a:t>
-            </a:r>
-            <a:r>
-              <a:rPr lang="en-US" dirty="0">
-                <a:hlinkClick r:id="rId2"/>
-              </a:rPr>
-              <a:t>Student-1</a:t>
-            </a:r>
-            <a:r>
-              <a:rPr lang="en-US" dirty="0"/>
-              <a:t>, </a:t>
-            </a:r>
-            <a:r>
-              <a:rPr lang="en-US" dirty="0">
-                <a:hlinkClick r:id="rId3"/>
-              </a:rPr>
-              <a:t>Student-2</a:t>
-            </a:r>
-            <a:r>
-              <a:rPr lang="en-US" dirty="0"/>
-              <a:t>, </a:t>
-            </a:r>
-            <a:r>
-              <a:rPr lang="en-US" dirty="0">
-                <a:hlinkClick r:id="rId4"/>
-              </a:rPr>
-              <a:t>Student-3</a:t>
-            </a:r>
-            <a:r>
-              <a:rPr lang="en-US" dirty="0"/>
-              <a:t>)</a:t>
-            </a:r>
-            <a:endParaRPr lang="en-US" b="1" dirty="0">
-              <a:solidFill>
-                <a:srgbClr val="FFFF00"/>
-              </a:solidFill>
-            </a:endParaRPr>
-          </a:p>
-          <a:p>
-            <a:r>
-              <a:rPr lang="en-US" b="1" dirty="0"/>
-              <a:t>Learn:</a:t>
-            </a:r>
-            <a:endParaRPr lang="en-US" dirty="0"/>
-          </a:p>
-          <a:p>
-            <a:pPr lvl="1"/>
-            <a:r>
-              <a:rPr lang="en-US" b="1" dirty="0"/>
-              <a:t>Learn</a:t>
-            </a:r>
-            <a:r>
-              <a:rPr lang="en-US" dirty="0"/>
-              <a:t>: Camera, UI, Game Manager, Effects, Autonomous Behaviors (AI)</a:t>
-            </a:r>
-          </a:p>
-          <a:p>
-            <a:pPr lvl="1"/>
-            <a:r>
-              <a:rPr lang="en-US" dirty="0"/>
-              <a:t>Practice: build a simple game (group project)</a:t>
-            </a:r>
-          </a:p>
-          <a:p>
-            <a:r>
-              <a:rPr lang="en-US" b="1" dirty="0"/>
-              <a:t>Last 10 days</a:t>
-            </a:r>
-            <a:r>
-              <a:rPr lang="en-US" dirty="0"/>
-              <a:t>: Final Project Development and Progress Demo</a:t>
-            </a:r>
-          </a:p>
-          <a:p>
-            <a:pPr lvl="1"/>
-            <a:r>
-              <a:rPr lang="en-US" dirty="0"/>
-              <a:t>How to brainstorm + what is a fun game</a:t>
-            </a:r>
-          </a:p>
-          <a:p>
-            <a:pPr lvl="1"/>
-            <a:r>
-              <a:rPr lang="en-US" b="1" dirty="0">
-                <a:solidFill>
-                  <a:srgbClr val="FFFF00"/>
-                </a:solidFill>
-              </a:rPr>
-              <a:t>Presentation: </a:t>
-            </a:r>
-            <a:r>
-              <a:rPr lang="en-US" dirty="0"/>
-              <a:t>Your final game</a:t>
-            </a:r>
-            <a:endParaRPr lang="en-US" b="1" dirty="0">
-              <a:solidFill>
-                <a:srgbClr val="FFFF00"/>
-              </a:solidFill>
-            </a:endParaRPr>
-          </a:p>
-          <a:p>
-            <a:pPr lvl="1"/>
-            <a:r>
-              <a:rPr lang="en-US" b="1" dirty="0">
-                <a:solidFill>
-                  <a:srgbClr val="FFFF00"/>
-                </a:solidFill>
-              </a:rPr>
-              <a:t>Presentation: </a:t>
-            </a:r>
-            <a:r>
-              <a:rPr lang="en-US" dirty="0"/>
-              <a:t>Game prototype demo</a:t>
-            </a:r>
-            <a:endParaRPr lang="en-US" b="1" dirty="0">
-              <a:solidFill>
-                <a:srgbClr val="FFFF00"/>
-              </a:solidFill>
-            </a:endParaRPr>
-          </a:p>
-          <a:p>
-            <a:pPr lvl="1"/>
-            <a:r>
-              <a:rPr lang="en-US" b="1" dirty="0">
-                <a:solidFill>
-                  <a:srgbClr val="FFFF00"/>
-                </a:solidFill>
-              </a:rPr>
-              <a:t>Presentation + Everyone plays everyone else’s games</a:t>
-            </a:r>
-            <a:r>
-              <a:rPr lang="en-US" dirty="0"/>
-              <a:t>: Alpha game playtest</a:t>
-            </a:r>
-            <a:endParaRPr lang="en-US" b="1" dirty="0">
-              <a:solidFill>
-                <a:srgbClr val="FFFF00"/>
-              </a:solidFill>
-            </a:endParaRPr>
-          </a:p>
-          <a:p>
-            <a:pPr lvl="1"/>
-            <a:r>
-              <a:rPr lang="en-US" b="1" dirty="0">
-                <a:solidFill>
-                  <a:srgbClr val="FFFF00"/>
-                </a:solidFill>
-              </a:rPr>
-              <a:t>Presentation + Everyone plays everyone else’s games: </a:t>
-            </a:r>
-            <a:r>
-              <a:rPr lang="en-US" dirty="0"/>
-              <a:t>Beta game playtest</a:t>
-            </a:r>
-          </a:p>
-          <a:p>
-            <a:pPr lvl="1"/>
-            <a:r>
-              <a:rPr lang="en-US" b="1" dirty="0">
-                <a:solidFill>
-                  <a:srgbClr val="FFFF00"/>
-                </a:solidFill>
-              </a:rPr>
-              <a:t>Presentation + Whole class plays!</a:t>
-            </a:r>
-          </a:p>
-        </p:txBody>
-      </p:sp>
-    </p:spTree>
-    <p:extLst>
-      <p:ext uri="{BB962C8B-B14F-4D97-AF65-F5344CB8AC3E}">
-        <p14:creationId xmlns:p14="http://schemas.microsoft.com/office/powerpoint/2010/main" val="1191935823"/>
-      </p:ext>
-    </p:extLst>
-  </p:cSld>
-  <p:clrMapOvr>
-    <a:masterClrMapping/>
-  </p:clrMapOvr>
-  <p:timing>
-    <p:tnLst>
-      <p:par>
-        <p:cTn id="1" dur="indefinite" restart="never" nodeType="tmRoot">
-          <p:childTnLst>
-            <p:seq concurrent="1" nextAc="seek">
-              <p:cTn id="2" dur="indefinite" nodeType="mainSeq">
-                <p:childTnLst>
-                  <p:par>
-                    <p:cTn id="3" fill="hold">
-                      <p:stCondLst>
-                        <p:cond delay="indefinite"/>
-                      </p:stCondLst>
-                      <p:childTnLst>
-                        <p:par>
-                          <p:cTn id="4" fill="hold">
-                            <p:stCondLst>
-                              <p:cond delay="0"/>
-                            </p:stCondLst>
-                            <p:childTnLst>
-                              <p:par>
-                                <p:cTn id="5" presetID="1" presetClass="entr" presetSubtype="0" fill="hold" grpId="0" nodeType="clickEffect">
-                                  <p:stCondLst>
-                                    <p:cond delay="0"/>
-                                  </p:stCondLst>
-                                  <p:childTnLst>
-                                    <p:set>
-                                      <p:cBhvr>
-                                        <p:cTn id="6" dur="1" fill="hold">
-                                          <p:stCondLst>
-                                            <p:cond delay="0"/>
-                                          </p:stCondLst>
-                                        </p:cTn>
-                                        <p:tgtEl>
-                                          <p:spTgt spid="3">
-                                            <p:txEl>
-                                              <p:pRg st="0" end="0"/>
-                                            </p:txEl>
-                                          </p:spTgt>
-                                        </p:tgtEl>
-                                        <p:attrNameLst>
-                                          <p:attrName>style.visibility</p:attrName>
-                                        </p:attrNameLst>
-                                      </p:cBhvr>
-                                      <p:to>
-                                        <p:strVal val="visible"/>
-                                      </p:to>
-                                    </p:set>
-                                  </p:childTnLst>
-                                </p:cTn>
-                              </p:par>
-                            </p:childTnLst>
-                          </p:cTn>
-                        </p:par>
-                      </p:childTnLst>
-                    </p:cTn>
-                  </p:par>
-                  <p:par>
-                    <p:cTn id="7" fill="hold">
-                      <p:stCondLst>
-                        <p:cond delay="indefinite"/>
-                      </p:stCondLst>
-                      <p:childTnLst>
-                        <p:par>
-                          <p:cTn id="8" fill="hold">
-                            <p:stCondLst>
-                              <p:cond delay="0"/>
-                            </p:stCondLst>
-                            <p:childTnLst>
-                              <p:par>
-                                <p:cTn id="9" presetID="1" presetClass="entr" presetSubtype="0" fill="hold" grpId="0" nodeType="clickEffect">
-                                  <p:stCondLst>
-                                    <p:cond delay="0"/>
-                                  </p:stCondLst>
-                                  <p:childTnLst>
-                                    <p:set>
-                                      <p:cBhvr>
-                                        <p:cTn id="10" dur="1" fill="hold">
-                                          <p:stCondLst>
-                                            <p:cond delay="0"/>
-                                          </p:stCondLst>
-                                        </p:cTn>
-                                        <p:tgtEl>
-                                          <p:spTgt spid="3">
-                                            <p:txEl>
-                                              <p:pRg st="1" end="1"/>
-                                            </p:txEl>
-                                          </p:spTgt>
-                                        </p:tgtEl>
-                                        <p:attrNameLst>
-                                          <p:attrName>style.visibility</p:attrName>
-                                        </p:attrNameLst>
-                                      </p:cBhvr>
-                                      <p:to>
-                                        <p:strVal val="visible"/>
-                                      </p:to>
-                                    </p:set>
-                                  </p:childTnLst>
-                                </p:cTn>
-                              </p:par>
-                              <p:par>
-                                <p:cTn id="11" presetID="1" presetClass="entr" presetSubtype="0" fill="hold" grpId="0" nodeType="withEffect">
-                                  <p:stCondLst>
-                                    <p:cond delay="0"/>
-                                  </p:stCondLst>
-                                  <p:childTnLst>
-                                    <p:set>
-                                      <p:cBhvr>
-                                        <p:cTn id="12" dur="1" fill="hold">
-                                          <p:stCondLst>
-                                            <p:cond delay="0"/>
-                                          </p:stCondLst>
-                                        </p:cTn>
-                                        <p:tgtEl>
-                                          <p:spTgt spid="3">
-                                            <p:txEl>
-                                              <p:pRg st="2" end="2"/>
-                                            </p:txEl>
-                                          </p:spTgt>
-                                        </p:tgtEl>
-                                        <p:attrNameLst>
-                                          <p:attrName>style.visibility</p:attrName>
-                                        </p:attrNameLst>
-                                      </p:cBhvr>
-                                      <p:to>
-                                        <p:strVal val="visible"/>
-                                      </p:to>
-                                    </p:set>
-                                  </p:childTnLst>
-                                </p:cTn>
-                              </p:par>
-                            </p:childTnLst>
-                          </p:cTn>
-                        </p:par>
-                      </p:childTnLst>
-                    </p:cTn>
-                  </p:par>
-                  <p:par>
-                    <p:cTn id="13" fill="hold">
-                      <p:stCondLst>
-                        <p:cond delay="indefinite"/>
-                      </p:stCondLst>
-                      <p:childTnLst>
-                        <p:par>
-                          <p:cTn id="14" fill="hold">
-                            <p:stCondLst>
-                              <p:cond delay="0"/>
-                            </p:stCondLst>
-                            <p:childTnLst>
-                              <p:par>
-                                <p:cTn id="15" presetID="1" presetClass="entr" presetSubtype="0" fill="hold" grpId="0" nodeType="clickEffect">
-                                  <p:stCondLst>
-                                    <p:cond delay="0"/>
-                                  </p:stCondLst>
-                                  <p:childTnLst>
-                                    <p:set>
-                                      <p:cBhvr>
-                                        <p:cTn id="16" dur="1" fill="hold">
-                                          <p:stCondLst>
-                                            <p:cond delay="0"/>
-                                          </p:stCondLst>
-                                        </p:cTn>
-                                        <p:tgtEl>
-                                          <p:spTgt spid="3">
-                                            <p:txEl>
-                                              <p:pRg st="3" end="3"/>
-                                            </p:txEl>
-                                          </p:spTgt>
-                                        </p:tgtEl>
-                                        <p:attrNameLst>
-                                          <p:attrName>style.visibility</p:attrName>
-                                        </p:attrNameLst>
-                                      </p:cBhvr>
-                                      <p:to>
-                                        <p:strVal val="visible"/>
-                                      </p:to>
-                                    </p:set>
-                                  </p:childTnLst>
-                                </p:cTn>
-                              </p:par>
-                            </p:childTnLst>
-                          </p:cTn>
-                        </p:par>
-                      </p:childTnLst>
-                    </p:cTn>
-                  </p:par>
-                  <p:par>
-                    <p:cTn id="17" fill="hold">
-                      <p:stCondLst>
-                        <p:cond delay="indefinite"/>
-                      </p:stCondLst>
-                      <p:childTnLst>
-                        <p:par>
-                          <p:cTn id="18" fill="hold">
-                            <p:stCondLst>
-                              <p:cond delay="0"/>
-                            </p:stCondLst>
-                            <p:childTnLst>
-                              <p:par>
-                                <p:cTn id="19" presetID="1" presetClass="entr" presetSubtype="0" fill="hold" grpId="0" nodeType="clickEffect">
-                                  <p:stCondLst>
-                                    <p:cond delay="0"/>
-                                  </p:stCondLst>
-                                  <p:childTnLst>
-                                    <p:set>
-                                      <p:cBhvr>
-                                        <p:cTn id="20" dur="1" fill="hold">
-                                          <p:stCondLst>
-                                            <p:cond delay="0"/>
-                                          </p:stCondLst>
-                                        </p:cTn>
-                                        <p:tgtEl>
-                                          <p:spTgt spid="3">
-                                            <p:txEl>
-                                              <p:pRg st="4" end="4"/>
-                                            </p:txEl>
-                                          </p:spTgt>
-                                        </p:tgtEl>
-                                        <p:attrNameLst>
-                                          <p:attrName>style.visibility</p:attrName>
-                                        </p:attrNameLst>
-                                      </p:cBhvr>
-                                      <p:to>
-                                        <p:strVal val="visible"/>
-                                      </p:to>
-                                    </p:set>
-                                  </p:childTnLst>
-                                </p:cTn>
-                              </p:par>
-                              <p:par>
-                                <p:cTn id="21" presetID="1" presetClass="entr" presetSubtype="0" fill="hold" grpId="0" nodeType="withEffect">
-                                  <p:stCondLst>
-                                    <p:cond delay="0"/>
-                                  </p:stCondLst>
-                                  <p:childTnLst>
-                                    <p:set>
-                                      <p:cBhvr>
-                                        <p:cTn id="22" dur="1" fill="hold">
-                                          <p:stCondLst>
-                                            <p:cond delay="0"/>
-                                          </p:stCondLst>
-                                        </p:cTn>
-                                        <p:tgtEl>
-                                          <p:spTgt spid="3">
-                                            <p:txEl>
-                                              <p:pRg st="5" end="5"/>
-                                            </p:txEl>
-                                          </p:spTgt>
-                                        </p:tgtEl>
-                                        <p:attrNameLst>
-                                          <p:attrName>style.visibility</p:attrName>
-                                        </p:attrNameLst>
-                                      </p:cBhvr>
-                                      <p:to>
-                                        <p:strVal val="visible"/>
-                                      </p:to>
-                                    </p:set>
-                                  </p:childTnLst>
-                                </p:cTn>
-                              </p:par>
-                            </p:childTnLst>
-                          </p:cTn>
-                        </p:par>
-                      </p:childTnLst>
-                    </p:cTn>
-                  </p:par>
-                  <p:par>
-                    <p:cTn id="23" fill="hold">
-                      <p:stCondLst>
-                        <p:cond delay="indefinite"/>
-                      </p:stCondLst>
-                      <p:childTnLst>
-                        <p:par>
-                          <p:cTn id="24" fill="hold">
-                            <p:stCondLst>
-                              <p:cond delay="0"/>
-                            </p:stCondLst>
-                            <p:childTnLst>
-                              <p:par>
-                                <p:cTn id="25" presetID="1" presetClass="entr" presetSubtype="0" fill="hold" grpId="0" nodeType="clickEffect">
-                                  <p:stCondLst>
-                                    <p:cond delay="0"/>
-                                  </p:stCondLst>
-                                  <p:childTnLst>
-                                    <p:set>
-                                      <p:cBhvr>
-                                        <p:cTn id="26" dur="1" fill="hold">
-                                          <p:stCondLst>
-                                            <p:cond delay="0"/>
-                                          </p:stCondLst>
-                                        </p:cTn>
-                                        <p:tgtEl>
-                                          <p:spTgt spid="3">
-                                            <p:txEl>
-                                              <p:pRg st="6" end="6"/>
-                                            </p:txEl>
-                                          </p:spTgt>
-                                        </p:tgtEl>
-                                        <p:attrNameLst>
-                                          <p:attrName>style.visibility</p:attrName>
-                                        </p:attrNameLst>
-                                      </p:cBhvr>
-                                      <p:to>
-                                        <p:strVal val="visible"/>
-                                      </p:to>
-                                    </p:set>
-                                  </p:childTnLst>
-                                </p:cTn>
-                              </p:par>
-                              <p:par>
-                                <p:cTn id="27" presetID="1" presetClass="entr" presetSubtype="0" fill="hold" grpId="0" nodeType="withEffect">
-                                  <p:stCondLst>
-                                    <p:cond delay="0"/>
-                                  </p:stCondLst>
-                                  <p:childTnLst>
-                                    <p:set>
-                                      <p:cBhvr>
-                                        <p:cTn id="28" dur="1" fill="hold">
-                                          <p:stCondLst>
-                                            <p:cond delay="0"/>
-                                          </p:stCondLst>
-                                        </p:cTn>
-                                        <p:tgtEl>
-                                          <p:spTgt spid="3">
-                                            <p:txEl>
-                                              <p:pRg st="7" end="7"/>
-                                            </p:txEl>
-                                          </p:spTgt>
-                                        </p:tgtEl>
-                                        <p:attrNameLst>
-                                          <p:attrName>style.visibility</p:attrName>
-                                        </p:attrNameLst>
-                                      </p:cBhvr>
-                                      <p:to>
-                                        <p:strVal val="visible"/>
-                                      </p:to>
-                                    </p:set>
-                                  </p:childTnLst>
-                                </p:cTn>
-                              </p:par>
-                            </p:childTnLst>
-                          </p:cTn>
-                        </p:par>
-                      </p:childTnLst>
-                    </p:cTn>
-                  </p:par>
-                  <p:par>
-                    <p:cTn id="29" fill="hold">
-                      <p:stCondLst>
-                        <p:cond delay="indefinite"/>
-                      </p:stCondLst>
-                      <p:childTnLst>
-                        <p:par>
-                          <p:cTn id="30" fill="hold">
-                            <p:stCondLst>
-                              <p:cond delay="0"/>
-                            </p:stCondLst>
-                            <p:childTnLst>
-                              <p:par>
-                                <p:cTn id="31" presetID="1" presetClass="entr" presetSubtype="0" fill="hold" grpId="0" nodeType="clickEffect">
-                                  <p:stCondLst>
-                                    <p:cond delay="0"/>
-                                  </p:stCondLst>
-                                  <p:childTnLst>
-                                    <p:set>
-                                      <p:cBhvr>
-                                        <p:cTn id="32" dur="1" fill="hold">
-                                          <p:stCondLst>
-                                            <p:cond delay="0"/>
-                                          </p:stCondLst>
-                                        </p:cTn>
-                                        <p:tgtEl>
-                                          <p:spTgt spid="3">
-                                            <p:txEl>
-                                              <p:pRg st="8" end="8"/>
-                                            </p:txEl>
-                                          </p:spTgt>
-                                        </p:tgtEl>
-                                        <p:attrNameLst>
-                                          <p:attrName>style.visibility</p:attrName>
-                                        </p:attrNameLst>
-                                      </p:cBhvr>
-                                      <p:to>
-                                        <p:strVal val="visible"/>
-                                      </p:to>
-                                    </p:set>
-                                  </p:childTnLst>
-                                </p:cTn>
-                              </p:par>
-                            </p:childTnLst>
-                          </p:cTn>
-                        </p:par>
-                      </p:childTnLst>
-                    </p:cTn>
-                  </p:par>
-                  <p:par>
-                    <p:cTn id="33" fill="hold">
-                      <p:stCondLst>
-                        <p:cond delay="indefinite"/>
-                      </p:stCondLst>
-                      <p:childTnLst>
-                        <p:par>
-                          <p:cTn id="34" fill="hold">
-                            <p:stCondLst>
-                              <p:cond delay="0"/>
-                            </p:stCondLst>
-                            <p:childTnLst>
-                              <p:par>
-                                <p:cTn id="35" presetID="1" presetClass="entr" presetSubtype="0" fill="hold" grpId="0" nodeType="clickEffect">
-                                  <p:stCondLst>
-                                    <p:cond delay="0"/>
-                                  </p:stCondLst>
-                                  <p:childTnLst>
-                                    <p:set>
-                                      <p:cBhvr>
-                                        <p:cTn id="36" dur="1" fill="hold">
-                                          <p:stCondLst>
-                                            <p:cond delay="0"/>
-                                          </p:stCondLst>
-                                        </p:cTn>
-                                        <p:tgtEl>
-                                          <p:spTgt spid="3">
-                                            <p:txEl>
-                                              <p:pRg st="9" end="9"/>
-                                            </p:txEl>
-                                          </p:spTgt>
-                                        </p:tgtEl>
-                                        <p:attrNameLst>
-                                          <p:attrName>style.visibility</p:attrName>
-                                        </p:attrNameLst>
-                                      </p:cBhvr>
-                                      <p:to>
-                                        <p:strVal val="visible"/>
-                                      </p:to>
-                                    </p:set>
-                                  </p:childTnLst>
-                                </p:cTn>
-                              </p:par>
-                            </p:childTnLst>
-                          </p:cTn>
-                        </p:par>
-                      </p:childTnLst>
-                    </p:cTn>
-                  </p:par>
-                  <p:par>
-                    <p:cTn id="37" fill="hold">
-                      <p:stCondLst>
-                        <p:cond delay="indefinite"/>
-                      </p:stCondLst>
-                      <p:childTnLst>
-                        <p:par>
-                          <p:cTn id="38" fill="hold">
-                            <p:stCondLst>
-                              <p:cond delay="0"/>
-                            </p:stCondLst>
-                            <p:childTnLst>
-                              <p:par>
-                                <p:cTn id="39" presetID="1" presetClass="entr" presetSubtype="0" fill="hold" grpId="0" nodeType="clickEffect">
-                                  <p:stCondLst>
-                                    <p:cond delay="0"/>
-                                  </p:stCondLst>
-                                  <p:childTnLst>
-                                    <p:set>
-                                      <p:cBhvr>
-                                        <p:cTn id="40" dur="1" fill="hold">
-                                          <p:stCondLst>
-                                            <p:cond delay="0"/>
-                                          </p:stCondLst>
-                                        </p:cTn>
-                                        <p:tgtEl>
-                                          <p:spTgt spid="3">
-                                            <p:txEl>
-                                              <p:pRg st="10" end="10"/>
-                                            </p:txEl>
-                                          </p:spTgt>
-                                        </p:tgtEl>
-                                        <p:attrNameLst>
-                                          <p:attrName>style.visibility</p:attrName>
-                                        </p:attrNameLst>
-                                      </p:cBhvr>
-                                      <p:to>
-                                        <p:strVal val="visible"/>
-                                      </p:to>
-                                    </p:set>
-                                  </p:childTnLst>
-                                </p:cTn>
-                              </p:par>
-                            </p:childTnLst>
-                          </p:cTn>
-                        </p:par>
-                      </p:childTnLst>
-                    </p:cTn>
-                  </p:par>
-                  <p:par>
-                    <p:cTn id="41" fill="hold">
-                      <p:stCondLst>
-                        <p:cond delay="indefinite"/>
-                      </p:stCondLst>
-                      <p:childTnLst>
-                        <p:par>
-                          <p:cTn id="42" fill="hold">
-                            <p:stCondLst>
-                              <p:cond delay="0"/>
-                            </p:stCondLst>
-                            <p:childTnLst>
-                              <p:par>
-                                <p:cTn id="43" presetID="1" presetClass="entr" presetSubtype="0" fill="hold" grpId="0" nodeType="clickEffect">
-                                  <p:stCondLst>
-                                    <p:cond delay="0"/>
-                                  </p:stCondLst>
-                                  <p:childTnLst>
-                                    <p:set>
-                                      <p:cBhvr>
-                                        <p:cTn id="44" dur="1" fill="hold">
-                                          <p:stCondLst>
-                                            <p:cond delay="0"/>
-                                          </p:stCondLst>
-                                        </p:cTn>
-                                        <p:tgtEl>
-                                          <p:spTgt spid="3">
-                                            <p:txEl>
-                                              <p:pRg st="11" end="11"/>
-                                            </p:txEl>
-                                          </p:spTgt>
-                                        </p:tgtEl>
-                                        <p:attrNameLst>
-                                          <p:attrName>style.visibility</p:attrName>
-                                        </p:attrNameLst>
-                                      </p:cBhvr>
-                                      <p:to>
-                                        <p:strVal val="visible"/>
-                                      </p:to>
-                                    </p:set>
-                                  </p:childTnLst>
-                                </p:cTn>
-                              </p:par>
-                            </p:childTnLst>
-                          </p:cTn>
-                        </p:par>
-                      </p:childTnLst>
-                    </p:cTn>
-                  </p:par>
-                  <p:par>
-                    <p:cTn id="45" fill="hold">
-                      <p:stCondLst>
-                        <p:cond delay="indefinite"/>
-                      </p:stCondLst>
-                      <p:childTnLst>
-                        <p:par>
-                          <p:cTn id="46" fill="hold">
-                            <p:stCondLst>
-                              <p:cond delay="0"/>
-                            </p:stCondLst>
-                            <p:childTnLst>
-                              <p:par>
-                                <p:cTn id="47" presetID="1" presetClass="entr" presetSubtype="0" fill="hold" grpId="0" nodeType="clickEffect">
-                                  <p:stCondLst>
-                                    <p:cond delay="0"/>
-                                  </p:stCondLst>
-                                  <p:childTnLst>
-                                    <p:set>
-                                      <p:cBhvr>
-                                        <p:cTn id="48" dur="1" fill="hold">
-                                          <p:stCondLst>
-                                            <p:cond delay="0"/>
-                                          </p:stCondLst>
-                                        </p:cTn>
-                                        <p:tgtEl>
-                                          <p:spTgt spid="3">
-                                            <p:txEl>
-                                              <p:pRg st="12" end="12"/>
-                                            </p:txEl>
-                                          </p:spTgt>
-                                        </p:tgtEl>
-                                        <p:attrNameLst>
-                                          <p:attrName>style.visibility</p:attrName>
-                                        </p:attrNameLst>
-                                      </p:cBhvr>
-                                      <p:to>
-                                        <p:strVal val="visible"/>
-                                      </p:to>
-                                    </p:set>
-                                  </p:childTnLst>
-                                </p:cTn>
-                              </p:par>
-                            </p:childTnLst>
-                          </p:cTn>
-                        </p:par>
-                      </p:childTnLst>
-                    </p:cTn>
-                  </p:par>
-                </p:childTnLst>
-              </p:cTn>
-              <p:prevCondLst>
-                <p:cond evt="onPrev" delay="0">
-                  <p:tgtEl>
-                    <p:sldTgt/>
-                  </p:tgtEl>
-                </p:cond>
-              </p:prevCondLst>
-              <p:nextCondLst>
-                <p:cond evt="onNext" delay="0">
-                  <p:tgtEl>
-                    <p:sldTgt/>
-                  </p:tgtEl>
-                </p:cond>
-              </p:nextCondLst>
-            </p:seq>
-          </p:childTnLst>
-        </p:cTn>
-      </p:par>
-    </p:tnLst>
-    <p:bldLst>
-      <p:bldP spid="3" grpId="0" uiExpand="1" build="p"/>
-    </p:bldLst>
-  </p:timing>
-</p:sld>
-</file>
-
-<file path=ppt/slides/slide17.xml><?xml version="1.0" encoding="utf-8"?>
+<file path=ppt/slides/slide18.xml><?xml version="1.0" encoding="utf-8"?>
 <p:sld xmlns:a="http://schemas.openxmlformats.org/drawingml/2006/main" xmlns:r="http://schemas.openxmlformats.org/officeDocument/2006/relationships" xmlns:p="http://schemas.openxmlformats.org/presentationml/2006/main">
   <p:cSld>
     <p:spTree>
@@ -10214,115 +10806,6 @@
       </p:par>
     </p:tnLst>
   </p:timing>
-</p:sld>
-</file>
-
-<file path=ppt/slides/slide18.xml><?xml version="1.0" encoding="utf-8"?>
-<p:sld xmlns:a="http://schemas.openxmlformats.org/drawingml/2006/main" xmlns:r="http://schemas.openxmlformats.org/officeDocument/2006/relationships" xmlns:p="http://schemas.openxmlformats.org/presentationml/2006/main">
-  <p:cSld>
-    <p:spTree>
-      <p:nvGrpSpPr>
-        <p:cNvPr id="1" name=""/>
-        <p:cNvGrpSpPr/>
-        <p:nvPr/>
-      </p:nvGrpSpPr>
-      <p:grpSpPr>
-        <a:xfrm>
-          <a:off x="0" y="0"/>
-          <a:ext cx="0" cy="0"/>
-          <a:chOff x="0" y="0"/>
-          <a:chExt cx="0" cy="0"/>
-        </a:xfrm>
-      </p:grpSpPr>
-      <p:sp>
-        <p:nvSpPr>
-          <p:cNvPr id="2" name="Title 1"/>
-          <p:cNvSpPr>
-            <a:spLocks noGrp="1"/>
-          </p:cNvSpPr>
-          <p:nvPr>
-            <p:ph type="title"/>
-          </p:nvPr>
-        </p:nvSpPr>
-        <p:spPr/>
-        <p:txBody>
-          <a:bodyPr/>
-          <a:lstStyle/>
-          <a:p>
-            <a:r>
-              <a:rPr lang="en-US" dirty="0"/>
-              <a:t>How </a:t>
-            </a:r>
-            <a:r>
-              <a:rPr lang="en-US"/>
-              <a:t>you Will be </a:t>
-            </a:r>
-            <a:r>
-              <a:rPr lang="en-US" dirty="0"/>
-              <a:t>Evaluated</a:t>
-            </a:r>
-          </a:p>
-        </p:txBody>
-      </p:sp>
-      <p:sp>
-        <p:nvSpPr>
-          <p:cNvPr id="3" name="Content Placeholder 2"/>
-          <p:cNvSpPr>
-            <a:spLocks noGrp="1"/>
-          </p:cNvSpPr>
-          <p:nvPr>
-            <p:ph sz="quarter" idx="13"/>
-          </p:nvPr>
-        </p:nvSpPr>
-        <p:spPr/>
-        <p:txBody>
-          <a:bodyPr/>
-          <a:lstStyle/>
-          <a:p>
-            <a:endParaRPr lang="en-US" dirty="0"/>
-          </a:p>
-        </p:txBody>
-      </p:sp>
-      <p:pic>
-        <p:nvPicPr>
-          <p:cNvPr id="4" name="Picture 3">
-            <a:extLst>
-              <a:ext uri="{FF2B5EF4-FFF2-40B4-BE49-F238E27FC236}">
-                <a16:creationId xmlns:a16="http://schemas.microsoft.com/office/drawing/2014/main" id="{06813497-7DE2-40BB-B746-735C2B2B1267}"/>
-              </a:ext>
-            </a:extLst>
-          </p:cNvPr>
-          <p:cNvPicPr>
-            <a:picLocks noChangeAspect="1"/>
-          </p:cNvPicPr>
-          <p:nvPr/>
-        </p:nvPicPr>
-        <p:blipFill>
-          <a:blip r:embed="rId2"/>
-          <a:stretch>
-            <a:fillRect/>
-          </a:stretch>
-        </p:blipFill>
-        <p:spPr>
-          <a:xfrm>
-            <a:off x="1600200" y="1600200"/>
-            <a:ext cx="6981825" cy="4793707"/>
-          </a:xfrm>
-          <a:prstGeom prst="rect">
-            <a:avLst/>
-          </a:prstGeom>
-        </p:spPr>
-      </p:pic>
-    </p:spTree>
-    <p:extLst>
-      <p:ext uri="{BB962C8B-B14F-4D97-AF65-F5344CB8AC3E}">
-        <p14:creationId xmlns:p14="http://schemas.microsoft.com/office/powerpoint/2010/main" val="125524613"/>
-      </p:ext>
-    </p:extLst>
-  </p:cSld>
-  <p:clrMapOvr>
-    <a:masterClrMapping/>
-  </p:clrMapOvr>
 </p:sld>
 </file>
 

</xml_diff>

<commit_message>
Update due assignment due times.
</commit_message>
<xml_diff>
--- a/PPT/Intro.pptx
+++ b/PPT/Intro.pptx
@@ -257,7 +257,7 @@
           <a:p>
             <a:fld id="{5578FD48-7BBA-4787-8980-5DFB65E0734D}" type="datetimeFigureOut">
               <a:rPr lang="en-US" smtClean="0"/>
-              <a:t>5/22/2022</a:t>
+              <a:t>5/23/2022</a:t>
             </a:fld>
             <a:endParaRPr lang="en-US"/>
           </a:p>
@@ -1195,7 +1195,7 @@
             <a:fld id="{1D8BD707-D9CF-40AE-B4C6-C98DA3205C09}" type="datetimeFigureOut">
               <a:rPr lang="en-US" smtClean="0"/>
               <a:pPr/>
-              <a:t>5/22/2022</a:t>
+              <a:t>5/23/2022</a:t>
             </a:fld>
             <a:endParaRPr lang="en-US"/>
           </a:p>
@@ -1512,7 +1512,7 @@
             <a:fld id="{1D8BD707-D9CF-40AE-B4C6-C98DA3205C09}" type="datetimeFigureOut">
               <a:rPr lang="en-US" smtClean="0"/>
               <a:pPr/>
-              <a:t>5/22/2022</a:t>
+              <a:t>5/23/2022</a:t>
             </a:fld>
             <a:endParaRPr lang="en-US"/>
           </a:p>
@@ -1688,7 +1688,7 @@
             <a:fld id="{1D8BD707-D9CF-40AE-B4C6-C98DA3205C09}" type="datetimeFigureOut">
               <a:rPr lang="en-US" smtClean="0"/>
               <a:pPr/>
-              <a:t>5/22/2022</a:t>
+              <a:t>5/23/2022</a:t>
             </a:fld>
             <a:endParaRPr lang="en-US"/>
           </a:p>
@@ -1808,7 +1808,7 @@
             <a:fld id="{1D8BD707-D9CF-40AE-B4C6-C98DA3205C09}" type="datetimeFigureOut">
               <a:rPr lang="en-US" smtClean="0"/>
               <a:pPr/>
-              <a:t>5/22/2022</a:t>
+              <a:t>5/23/2022</a:t>
             </a:fld>
             <a:endParaRPr lang="en-US"/>
           </a:p>
@@ -2108,7 +2108,7 @@
             <a:fld id="{1D8BD707-D9CF-40AE-B4C6-C98DA3205C09}" type="datetimeFigureOut">
               <a:rPr lang="en-US" smtClean="0"/>
               <a:pPr/>
-              <a:t>5/22/2022</a:t>
+              <a:t>5/23/2022</a:t>
             </a:fld>
             <a:endParaRPr lang="en-US"/>
           </a:p>
@@ -2403,7 +2403,7 @@
             <a:fld id="{1D8BD707-D9CF-40AE-B4C6-C98DA3205C09}" type="datetimeFigureOut">
               <a:rPr lang="en-US" smtClean="0"/>
               <a:pPr/>
-              <a:t>5/22/2022</a:t>
+              <a:t>5/23/2022</a:t>
             </a:fld>
             <a:endParaRPr lang="en-US"/>
           </a:p>
@@ -2833,7 +2833,7 @@
             <a:fld id="{1D8BD707-D9CF-40AE-B4C6-C98DA3205C09}" type="datetimeFigureOut">
               <a:rPr lang="en-US" smtClean="0"/>
               <a:pPr/>
-              <a:t>5/22/2022</a:t>
+              <a:t>5/23/2022</a:t>
             </a:fld>
             <a:endParaRPr lang="en-US"/>
           </a:p>
@@ -2953,7 +2953,7 @@
             <a:fld id="{1D8BD707-D9CF-40AE-B4C6-C98DA3205C09}" type="datetimeFigureOut">
               <a:rPr lang="en-US" smtClean="0"/>
               <a:pPr/>
-              <a:t>5/22/2022</a:t>
+              <a:t>5/23/2022</a:t>
             </a:fld>
             <a:endParaRPr lang="en-US"/>
           </a:p>
@@ -3045,7 +3045,7 @@
             <a:fld id="{1D8BD707-D9CF-40AE-B4C6-C98DA3205C09}" type="datetimeFigureOut">
               <a:rPr lang="en-US" smtClean="0"/>
               <a:pPr/>
-              <a:t>5/22/2022</a:t>
+              <a:t>5/23/2022</a:t>
             </a:fld>
             <a:endParaRPr lang="en-US"/>
           </a:p>
@@ -3297,7 +3297,7 @@
             <a:fld id="{1D8BD707-D9CF-40AE-B4C6-C98DA3205C09}" type="datetimeFigureOut">
               <a:rPr lang="en-US" smtClean="0"/>
               <a:pPr/>
-              <a:t>5/22/2022</a:t>
+              <a:t>5/23/2022</a:t>
             </a:fld>
             <a:endParaRPr lang="en-US"/>
           </a:p>
@@ -3815,7 +3815,7 @@
             <a:fld id="{1D8BD707-D9CF-40AE-B4C6-C98DA3205C09}" type="datetimeFigureOut">
               <a:rPr lang="en-US" smtClean="0"/>
               <a:pPr/>
-              <a:t>5/22/2022</a:t>
+              <a:t>5/23/2022</a:t>
             </a:fld>
             <a:endParaRPr lang="en-US"/>
           </a:p>
@@ -4047,7 +4047,7 @@
             <a:fld id="{1D8BD707-D9CF-40AE-B4C6-C98DA3205C09}" type="datetimeFigureOut">
               <a:rPr lang="en-US" smtClean="0"/>
               <a:pPr/>
-              <a:t>5/22/2022</a:t>
+              <a:t>5/23/2022</a:t>
             </a:fld>
             <a:endParaRPr lang="en-US"/>
           </a:p>
@@ -7486,15 +7486,15 @@
           <a:p>
             <a:r>
               <a:rPr lang="en-US" dirty="0"/>
-              <a:t>Assignment: due a week from today (1pm on Sunday 5</a:t>
+              <a:t>Assignment: due 11pm on Tuesday 31</a:t>
             </a:r>
             <a:r>
               <a:rPr lang="en-US" baseline="30000" dirty="0"/>
-              <a:t>th</a:t>
+              <a:t>st</a:t>
             </a:r>
             <a:r>
               <a:rPr lang="en-US" dirty="0"/>
-              <a:t> June)</a:t>
+              <a:t> May</a:t>
             </a:r>
           </a:p>
           <a:p>
@@ -7692,15 +7692,33 @@
                                   </p:childTnLst>
                                 </p:cTn>
                               </p:par>
+                            </p:childTnLst>
+                          </p:cTn>
+                        </p:par>
+                      </p:childTnLst>
+                    </p:cTn>
+                  </p:par>
+                  <p:par>
+                    <p:cTn id="11" fill="hold">
+                      <p:stCondLst>
+                        <p:cond delay="indefinite"/>
+                      </p:stCondLst>
+                      <p:childTnLst>
+                        <p:par>
+                          <p:cTn id="12" fill="hold">
+                            <p:stCondLst>
+                              <p:cond delay="0"/>
+                            </p:stCondLst>
+                            <p:childTnLst>
                               <p:par>
-                                <p:cTn id="11" presetID="1" presetClass="entr" presetSubtype="0" fill="hold" grpId="0" nodeType="withEffect">
+                                <p:cTn id="13" presetID="1" presetClass="entr" presetSubtype="0" fill="hold" grpId="0" nodeType="clickEffect">
                                   <p:stCondLst>
                                     <p:cond delay="0"/>
                                   </p:stCondLst>
                                   <p:childTnLst>
                                     <p:set>
                                       <p:cBhvr>
-                                        <p:cTn id="12" dur="1" fill="hold">
+                                        <p:cTn id="14" dur="1" fill="hold">
                                           <p:stCondLst>
                                             <p:cond delay="0"/>
                                           </p:stCondLst>
@@ -7723,15 +7741,33 @@
                                   </p:childTnLst>
                                 </p:cTn>
                               </p:par>
+                            </p:childTnLst>
+                          </p:cTn>
+                        </p:par>
+                      </p:childTnLst>
+                    </p:cTn>
+                  </p:par>
+                  <p:par>
+                    <p:cTn id="15" fill="hold">
+                      <p:stCondLst>
+                        <p:cond delay="indefinite"/>
+                      </p:stCondLst>
+                      <p:childTnLst>
+                        <p:par>
+                          <p:cTn id="16" fill="hold">
+                            <p:stCondLst>
+                              <p:cond delay="0"/>
+                            </p:stCondLst>
+                            <p:childTnLst>
                               <p:par>
-                                <p:cTn id="13" presetID="1" presetClass="entr" presetSubtype="0" fill="hold" grpId="0" nodeType="withEffect">
+                                <p:cTn id="17" presetID="1" presetClass="entr" presetSubtype="0" fill="hold" grpId="0" nodeType="clickEffect">
                                   <p:stCondLst>
                                     <p:cond delay="0"/>
                                   </p:stCondLst>
                                   <p:childTnLst>
                                     <p:set>
                                       <p:cBhvr>
-                                        <p:cTn id="14" dur="1" fill="hold">
+                                        <p:cTn id="18" dur="1" fill="hold">
                                           <p:stCondLst>
                                             <p:cond delay="0"/>
                                           </p:stCondLst>
@@ -7754,15 +7790,33 @@
                                   </p:childTnLst>
                                 </p:cTn>
                               </p:par>
+                            </p:childTnLst>
+                          </p:cTn>
+                        </p:par>
+                      </p:childTnLst>
+                    </p:cTn>
+                  </p:par>
+                  <p:par>
+                    <p:cTn id="19" fill="hold">
+                      <p:stCondLst>
+                        <p:cond delay="indefinite"/>
+                      </p:stCondLst>
+                      <p:childTnLst>
+                        <p:par>
+                          <p:cTn id="20" fill="hold">
+                            <p:stCondLst>
+                              <p:cond delay="0"/>
+                            </p:stCondLst>
+                            <p:childTnLst>
                               <p:par>
-                                <p:cTn id="15" presetID="1" presetClass="entr" presetSubtype="0" fill="hold" grpId="0" nodeType="withEffect">
+                                <p:cTn id="21" presetID="1" presetClass="entr" presetSubtype="0" fill="hold" grpId="0" nodeType="clickEffect">
                                   <p:stCondLst>
                                     <p:cond delay="0"/>
                                   </p:stCondLst>
                                   <p:childTnLst>
                                     <p:set>
                                       <p:cBhvr>
-                                        <p:cTn id="16" dur="1" fill="hold">
+                                        <p:cTn id="22" dur="1" fill="hold">
                                           <p:stCondLst>
                                             <p:cond delay="0"/>
                                           </p:stCondLst>
@@ -7785,15 +7839,33 @@
                                   </p:childTnLst>
                                 </p:cTn>
                               </p:par>
+                            </p:childTnLst>
+                          </p:cTn>
+                        </p:par>
+                      </p:childTnLst>
+                    </p:cTn>
+                  </p:par>
+                  <p:par>
+                    <p:cTn id="23" fill="hold">
+                      <p:stCondLst>
+                        <p:cond delay="indefinite"/>
+                      </p:stCondLst>
+                      <p:childTnLst>
+                        <p:par>
+                          <p:cTn id="24" fill="hold">
+                            <p:stCondLst>
+                              <p:cond delay="0"/>
+                            </p:stCondLst>
+                            <p:childTnLst>
                               <p:par>
-                                <p:cTn id="17" presetID="1" presetClass="entr" presetSubtype="0" fill="hold" grpId="0" nodeType="withEffect">
+                                <p:cTn id="25" presetID="1" presetClass="entr" presetSubtype="0" fill="hold" grpId="0" nodeType="clickEffect">
                                   <p:stCondLst>
                                     <p:cond delay="0"/>
                                   </p:stCondLst>
                                   <p:childTnLst>
                                     <p:set>
                                       <p:cBhvr>
-                                        <p:cTn id="18" dur="1" fill="hold">
+                                        <p:cTn id="26" dur="1" fill="hold">
                                           <p:stCondLst>
                                             <p:cond delay="0"/>
                                           </p:stCondLst>
@@ -7816,15 +7888,33 @@
                                   </p:childTnLst>
                                 </p:cTn>
                               </p:par>
+                            </p:childTnLst>
+                          </p:cTn>
+                        </p:par>
+                      </p:childTnLst>
+                    </p:cTn>
+                  </p:par>
+                  <p:par>
+                    <p:cTn id="27" fill="hold">
+                      <p:stCondLst>
+                        <p:cond delay="indefinite"/>
+                      </p:stCondLst>
+                      <p:childTnLst>
+                        <p:par>
+                          <p:cTn id="28" fill="hold">
+                            <p:stCondLst>
+                              <p:cond delay="0"/>
+                            </p:stCondLst>
+                            <p:childTnLst>
                               <p:par>
-                                <p:cTn id="19" presetID="1" presetClass="entr" presetSubtype="0" fill="hold" grpId="0" nodeType="withEffect">
+                                <p:cTn id="29" presetID="1" presetClass="entr" presetSubtype="0" fill="hold" grpId="0" nodeType="clickEffect">
                                   <p:stCondLst>
                                     <p:cond delay="0"/>
                                   </p:stCondLst>
                                   <p:childTnLst>
                                     <p:set>
                                       <p:cBhvr>
-                                        <p:cTn id="20" dur="1" fill="hold">
+                                        <p:cTn id="30" dur="1" fill="hold">
                                           <p:stCondLst>
                                             <p:cond delay="0"/>
                                           </p:stCondLst>
@@ -7854,26 +7944,26 @@
                     </p:cTn>
                   </p:par>
                   <p:par>
-                    <p:cTn id="21" fill="hold">
+                    <p:cTn id="31" fill="hold">
                       <p:stCondLst>
                         <p:cond delay="indefinite"/>
                       </p:stCondLst>
                       <p:childTnLst>
                         <p:par>
-                          <p:cTn id="22" fill="hold">
+                          <p:cTn id="32" fill="hold">
                             <p:stCondLst>
                               <p:cond delay="0"/>
                             </p:stCondLst>
                             <p:childTnLst>
                               <p:par>
-                                <p:cTn id="23" presetID="1" presetClass="entr" presetSubtype="0" fill="hold" grpId="0" nodeType="clickEffect">
+                                <p:cTn id="33" presetID="1" presetClass="entr" presetSubtype="0" fill="hold" grpId="0" nodeType="clickEffect">
                                   <p:stCondLst>
                                     <p:cond delay="0"/>
                                   </p:stCondLst>
                                   <p:childTnLst>
                                     <p:set>
                                       <p:cBhvr>
-                                        <p:cTn id="24" dur="1" fill="hold">
+                                        <p:cTn id="34" dur="1" fill="hold">
                                           <p:stCondLst>
                                             <p:cond delay="0"/>
                                           </p:stCondLst>
@@ -7979,10 +8069,15 @@
             <p:ph sz="quarter" idx="13"/>
           </p:nvPr>
         </p:nvSpPr>
-        <p:spPr/>
+        <p:spPr>
+          <a:xfrm>
+            <a:off x="812800" y="1600200"/>
+            <a:ext cx="10566400" cy="4419600"/>
+          </a:xfrm>
+        </p:spPr>
         <p:txBody>
           <a:bodyPr>
-            <a:normAutofit fontScale="62500" lnSpcReduction="20000"/>
+            <a:normAutofit fontScale="85000" lnSpcReduction="10000"/>
           </a:bodyPr>
           <a:lstStyle/>
           <a:p>
@@ -8086,21 +8181,7 @@
             <a:pPr lvl="2"/>
             <a:r>
               <a:rPr lang="en-US" dirty="0"/>
-              <a:t>Practice: </a:t>
-            </a:r>
-          </a:p>
-          <a:p>
-            <a:pPr lvl="3"/>
-            <a:r>
-              <a:rPr lang="en-US" dirty="0"/>
-              <a:t>Build a simple interactive application</a:t>
-            </a:r>
-          </a:p>
-          <a:p>
-            <a:pPr lvl="3"/>
-            <a:r>
-              <a:rPr lang="en-US" dirty="0"/>
-              <a:t>Build a simple game (group project)</a:t>
+              <a:t>Practice: a simple interactive application (individual), a simple game (group project)</a:t>
             </a:r>
           </a:p>
           <a:p>
@@ -8318,15 +8399,33 @@
                                   </p:childTnLst>
                                 </p:cTn>
                               </p:par>
+                            </p:childTnLst>
+                          </p:cTn>
+                        </p:par>
+                      </p:childTnLst>
+                    </p:cTn>
+                  </p:par>
+                  <p:par>
+                    <p:cTn id="11" fill="hold">
+                      <p:stCondLst>
+                        <p:cond delay="indefinite"/>
+                      </p:stCondLst>
+                      <p:childTnLst>
+                        <p:par>
+                          <p:cTn id="12" fill="hold">
+                            <p:stCondLst>
+                              <p:cond delay="0"/>
+                            </p:stCondLst>
+                            <p:childTnLst>
                               <p:par>
-                                <p:cTn id="11" presetID="1" presetClass="entr" presetSubtype="0" fill="hold" grpId="0" nodeType="withEffect">
+                                <p:cTn id="13" presetID="1" presetClass="entr" presetSubtype="0" fill="hold" grpId="0" nodeType="clickEffect">
                                   <p:stCondLst>
                                     <p:cond delay="0"/>
                                   </p:stCondLst>
                                   <p:childTnLst>
                                     <p:set>
                                       <p:cBhvr>
-                                        <p:cTn id="12" dur="1" fill="hold">
+                                        <p:cTn id="14" dur="1" fill="hold">
                                           <p:stCondLst>
                                             <p:cond delay="0"/>
                                           </p:stCondLst>
@@ -8349,15 +8448,33 @@
                                   </p:childTnLst>
                                 </p:cTn>
                               </p:par>
+                            </p:childTnLst>
+                          </p:cTn>
+                        </p:par>
+                      </p:childTnLst>
+                    </p:cTn>
+                  </p:par>
+                  <p:par>
+                    <p:cTn id="15" fill="hold">
+                      <p:stCondLst>
+                        <p:cond delay="indefinite"/>
+                      </p:stCondLst>
+                      <p:childTnLst>
+                        <p:par>
+                          <p:cTn id="16" fill="hold">
+                            <p:stCondLst>
+                              <p:cond delay="0"/>
+                            </p:stCondLst>
+                            <p:childTnLst>
                               <p:par>
-                                <p:cTn id="13" presetID="1" presetClass="entr" presetSubtype="0" fill="hold" grpId="0" nodeType="withEffect">
+                                <p:cTn id="17" presetID="1" presetClass="entr" presetSubtype="0" fill="hold" grpId="0" nodeType="clickEffect">
                                   <p:stCondLst>
                                     <p:cond delay="0"/>
                                   </p:stCondLst>
                                   <p:childTnLst>
                                     <p:set>
                                       <p:cBhvr>
-                                        <p:cTn id="14" dur="1" fill="hold">
+                                        <p:cTn id="18" dur="1" fill="hold">
                                           <p:stCondLst>
                                             <p:cond delay="0"/>
                                           </p:stCondLst>
@@ -8380,15 +8497,33 @@
                                   </p:childTnLst>
                                 </p:cTn>
                               </p:par>
+                            </p:childTnLst>
+                          </p:cTn>
+                        </p:par>
+                      </p:childTnLst>
+                    </p:cTn>
+                  </p:par>
+                  <p:par>
+                    <p:cTn id="19" fill="hold">
+                      <p:stCondLst>
+                        <p:cond delay="indefinite"/>
+                      </p:stCondLst>
+                      <p:childTnLst>
+                        <p:par>
+                          <p:cTn id="20" fill="hold">
+                            <p:stCondLst>
+                              <p:cond delay="0"/>
+                            </p:stCondLst>
+                            <p:childTnLst>
                               <p:par>
-                                <p:cTn id="15" presetID="1" presetClass="entr" presetSubtype="0" fill="hold" grpId="0" nodeType="withEffect">
+                                <p:cTn id="21" presetID="1" presetClass="entr" presetSubtype="0" fill="hold" grpId="0" nodeType="clickEffect">
                                   <p:stCondLst>
                                     <p:cond delay="0"/>
                                   </p:stCondLst>
                                   <p:childTnLst>
                                     <p:set>
                                       <p:cBhvr>
-                                        <p:cTn id="16" dur="1" fill="hold">
+                                        <p:cTn id="22" dur="1" fill="hold">
                                           <p:stCondLst>
                                             <p:cond delay="0"/>
                                           </p:stCondLst>
@@ -8411,15 +8546,33 @@
                                   </p:childTnLst>
                                 </p:cTn>
                               </p:par>
+                            </p:childTnLst>
+                          </p:cTn>
+                        </p:par>
+                      </p:childTnLst>
+                    </p:cTn>
+                  </p:par>
+                  <p:par>
+                    <p:cTn id="23" fill="hold">
+                      <p:stCondLst>
+                        <p:cond delay="indefinite"/>
+                      </p:stCondLst>
+                      <p:childTnLst>
+                        <p:par>
+                          <p:cTn id="24" fill="hold">
+                            <p:stCondLst>
+                              <p:cond delay="0"/>
+                            </p:stCondLst>
+                            <p:childTnLst>
                               <p:par>
-                                <p:cTn id="17" presetID="1" presetClass="entr" presetSubtype="0" fill="hold" grpId="0" nodeType="withEffect">
+                                <p:cTn id="25" presetID="1" presetClass="entr" presetSubtype="0" fill="hold" grpId="0" nodeType="clickEffect">
                                   <p:stCondLst>
                                     <p:cond delay="0"/>
                                   </p:stCondLst>
                                   <p:childTnLst>
                                     <p:set>
                                       <p:cBhvr>
-                                        <p:cTn id="18" dur="1" fill="hold">
+                                        <p:cTn id="26" dur="1" fill="hold">
                                           <p:stCondLst>
                                             <p:cond delay="0"/>
                                           </p:stCondLst>
@@ -8442,99 +8595,6 @@
                                   </p:childTnLst>
                                 </p:cTn>
                               </p:par>
-                              <p:par>
-                                <p:cTn id="19" presetID="1" presetClass="entr" presetSubtype="0" fill="hold" grpId="0" nodeType="withEffect">
-                                  <p:stCondLst>
-                                    <p:cond delay="0"/>
-                                  </p:stCondLst>
-                                  <p:childTnLst>
-                                    <p:set>
-                                      <p:cBhvr>
-                                        <p:cTn id="20" dur="1" fill="hold">
-                                          <p:stCondLst>
-                                            <p:cond delay="0"/>
-                                          </p:stCondLst>
-                                        </p:cTn>
-                                        <p:tgtEl>
-                                          <p:spTgt spid="3">
-                                            <p:txEl>
-                                              <p:pRg st="6" end="6"/>
-                                            </p:txEl>
-                                          </p:spTgt>
-                                        </p:tgtEl>
-                                        <p:attrNameLst>
-                                          <p:attrName>style.visibility</p:attrName>
-                                        </p:attrNameLst>
-                                      </p:cBhvr>
-                                      <p:to>
-                                        <p:strVal val="visible"/>
-                                      </p:to>
-                                    </p:set>
-                                  </p:childTnLst>
-                                </p:cTn>
-                              </p:par>
-                              <p:par>
-                                <p:cTn id="21" presetID="1" presetClass="entr" presetSubtype="0" fill="hold" grpId="0" nodeType="withEffect">
-                                  <p:stCondLst>
-                                    <p:cond delay="0"/>
-                                  </p:stCondLst>
-                                  <p:childTnLst>
-                                    <p:set>
-                                      <p:cBhvr>
-                                        <p:cTn id="22" dur="1" fill="hold">
-                                          <p:stCondLst>
-                                            <p:cond delay="0"/>
-                                          </p:stCondLst>
-                                        </p:cTn>
-                                        <p:tgtEl>
-                                          <p:spTgt spid="3">
-                                            <p:txEl>
-                                              <p:pRg st="7" end="7"/>
-                                            </p:txEl>
-                                          </p:spTgt>
-                                        </p:tgtEl>
-                                        <p:attrNameLst>
-                                          <p:attrName>style.visibility</p:attrName>
-                                        </p:attrNameLst>
-                                      </p:cBhvr>
-                                      <p:to>
-                                        <p:strVal val="visible"/>
-                                      </p:to>
-                                    </p:set>
-                                  </p:childTnLst>
-                                </p:cTn>
-                              </p:par>
-                              <p:par>
-                                <p:cTn id="23" presetID="1" presetClass="entr" presetSubtype="0" fill="hold" grpId="0" nodeType="withEffect">
-                                  <p:stCondLst>
-                                    <p:cond delay="0"/>
-                                  </p:stCondLst>
-                                  <p:childTnLst>
-                                    <p:set>
-                                      <p:cBhvr>
-                                        <p:cTn id="24" dur="1" fill="hold">
-                                          <p:stCondLst>
-                                            <p:cond delay="0"/>
-                                          </p:stCondLst>
-                                        </p:cTn>
-                                        <p:tgtEl>
-                                          <p:spTgt spid="3">
-                                            <p:txEl>
-                                              <p:pRg st="8" end="8"/>
-                                            </p:txEl>
-                                          </p:spTgt>
-                                        </p:tgtEl>
-                                        <p:attrNameLst>
-                                          <p:attrName>style.visibility</p:attrName>
-                                        </p:attrNameLst>
-                                      </p:cBhvr>
-                                      <p:to>
-                                        <p:strVal val="visible"/>
-                                      </p:to>
-                                    </p:set>
-                                  </p:childTnLst>
-                                </p:cTn>
-                              </p:par>
                             </p:childTnLst>
                           </p:cTn>
                         </p:par>
@@ -8542,50 +8602,19 @@
                     </p:cTn>
                   </p:par>
                   <p:par>
-                    <p:cTn id="25" fill="hold">
+                    <p:cTn id="27" fill="hold">
                       <p:stCondLst>
                         <p:cond delay="indefinite"/>
                       </p:stCondLst>
                       <p:childTnLst>
                         <p:par>
-                          <p:cTn id="26" fill="hold">
+                          <p:cTn id="28" fill="hold">
                             <p:stCondLst>
                               <p:cond delay="0"/>
                             </p:stCondLst>
                             <p:childTnLst>
                               <p:par>
-                                <p:cTn id="27" presetID="1" presetClass="entr" presetSubtype="0" fill="hold" grpId="0" nodeType="clickEffect">
-                                  <p:stCondLst>
-                                    <p:cond delay="0"/>
-                                  </p:stCondLst>
-                                  <p:childTnLst>
-                                    <p:set>
-                                      <p:cBhvr>
-                                        <p:cTn id="28" dur="1" fill="hold">
-                                          <p:stCondLst>
-                                            <p:cond delay="0"/>
-                                          </p:stCondLst>
-                                        </p:cTn>
-                                        <p:tgtEl>
-                                          <p:spTgt spid="3">
-                                            <p:txEl>
-                                              <p:pRg st="9" end="9"/>
-                                            </p:txEl>
-                                          </p:spTgt>
-                                        </p:tgtEl>
-                                        <p:attrNameLst>
-                                          <p:attrName>style.visibility</p:attrName>
-                                        </p:attrNameLst>
-                                      </p:cBhvr>
-                                      <p:to>
-                                        <p:strVal val="visible"/>
-                                      </p:to>
-                                    </p:set>
-                                  </p:childTnLst>
-                                </p:cTn>
-                              </p:par>
-                              <p:par>
-                                <p:cTn id="29" presetID="1" presetClass="entr" presetSubtype="0" fill="hold" grpId="0" nodeType="withEffect">
+                                <p:cTn id="29" presetID="1" presetClass="entr" presetSubtype="0" fill="hold" grpId="0" nodeType="clickEffect">
                                   <p:stCondLst>
                                     <p:cond delay="0"/>
                                   </p:stCondLst>
@@ -8600,7 +8629,7 @@
                                         <p:tgtEl>
                                           <p:spTgt spid="3">
                                             <p:txEl>
-                                              <p:pRg st="10" end="10"/>
+                                              <p:pRg st="6" end="6"/>
                                             </p:txEl>
                                           </p:spTgt>
                                         </p:tgtEl>
@@ -8649,7 +8678,7 @@
                                         <p:tgtEl>
                                           <p:spTgt spid="3">
                                             <p:txEl>
-                                              <p:pRg st="11" end="11"/>
+                                              <p:pRg st="7" end="7"/>
                                             </p:txEl>
                                           </p:spTgt>
                                         </p:tgtEl>
@@ -8698,7 +8727,7 @@
                                         <p:tgtEl>
                                           <p:spTgt spid="3">
                                             <p:txEl>
-                                              <p:pRg st="12" end="12"/>
+                                              <p:pRg st="8" end="8"/>
                                             </p:txEl>
                                           </p:spTgt>
                                         </p:tgtEl>
@@ -8747,7 +8776,7 @@
                                         <p:tgtEl>
                                           <p:spTgt spid="3">
                                             <p:txEl>
-                                              <p:pRg st="13" end="13"/>
+                                              <p:pRg st="9" end="9"/>
                                             </p:txEl>
                                           </p:spTgt>
                                         </p:tgtEl>
@@ -8796,7 +8825,7 @@
                                         <p:tgtEl>
                                           <p:spTgt spid="3">
                                             <p:txEl>
-                                              <p:pRg st="14" end="14"/>
+                                              <p:pRg st="10" end="10"/>
                                             </p:txEl>
                                           </p:spTgt>
                                         </p:tgtEl>
@@ -8845,7 +8874,105 @@
                                         <p:tgtEl>
                                           <p:spTgt spid="3">
                                             <p:txEl>
-                                              <p:pRg st="15" end="15"/>
+                                              <p:pRg st="11" end="11"/>
+                                            </p:txEl>
+                                          </p:spTgt>
+                                        </p:tgtEl>
+                                        <p:attrNameLst>
+                                          <p:attrName>style.visibility</p:attrName>
+                                        </p:attrNameLst>
+                                      </p:cBhvr>
+                                      <p:to>
+                                        <p:strVal val="visible"/>
+                                      </p:to>
+                                    </p:set>
+                                  </p:childTnLst>
+                                </p:cTn>
+                              </p:par>
+                            </p:childTnLst>
+                          </p:cTn>
+                        </p:par>
+                      </p:childTnLst>
+                    </p:cTn>
+                  </p:par>
+                  <p:par>
+                    <p:cTn id="51" fill="hold">
+                      <p:stCondLst>
+                        <p:cond delay="indefinite"/>
+                      </p:stCondLst>
+                      <p:childTnLst>
+                        <p:par>
+                          <p:cTn id="52" fill="hold">
+                            <p:stCondLst>
+                              <p:cond delay="0"/>
+                            </p:stCondLst>
+                            <p:childTnLst>
+                              <p:par>
+                                <p:cTn id="53" presetID="1" presetClass="entr" presetSubtype="0" fill="hold" grpId="0" nodeType="clickEffect">
+                                  <p:stCondLst>
+                                    <p:cond delay="0"/>
+                                  </p:stCondLst>
+                                  <p:childTnLst>
+                                    <p:set>
+                                      <p:cBhvr>
+                                        <p:cTn id="54" dur="1" fill="hold">
+                                          <p:stCondLst>
+                                            <p:cond delay="0"/>
+                                          </p:stCondLst>
+                                        </p:cTn>
+                                        <p:tgtEl>
+                                          <p:spTgt spid="3">
+                                            <p:txEl>
+                                              <p:pRg st="12" end="12"/>
+                                            </p:txEl>
+                                          </p:spTgt>
+                                        </p:tgtEl>
+                                        <p:attrNameLst>
+                                          <p:attrName>style.visibility</p:attrName>
+                                        </p:attrNameLst>
+                                      </p:cBhvr>
+                                      <p:to>
+                                        <p:strVal val="visible"/>
+                                      </p:to>
+                                    </p:set>
+                                  </p:childTnLst>
+                                </p:cTn>
+                              </p:par>
+                            </p:childTnLst>
+                          </p:cTn>
+                        </p:par>
+                      </p:childTnLst>
+                    </p:cTn>
+                  </p:par>
+                  <p:par>
+                    <p:cTn id="55" fill="hold">
+                      <p:stCondLst>
+                        <p:cond delay="indefinite"/>
+                      </p:stCondLst>
+                      <p:childTnLst>
+                        <p:par>
+                          <p:cTn id="56" fill="hold">
+                            <p:stCondLst>
+                              <p:cond delay="0"/>
+                            </p:stCondLst>
+                            <p:childTnLst>
+                              <p:par>
+                                <p:cTn id="57" presetID="1" presetClass="entr" presetSubtype="0" fill="hold" grpId="0" nodeType="clickEffect">
+                                  <p:stCondLst>
+                                    <p:cond delay="0"/>
+                                  </p:stCondLst>
+                                  <p:childTnLst>
+                                    <p:set>
+                                      <p:cBhvr>
+                                        <p:cTn id="58" dur="1" fill="hold">
+                                          <p:stCondLst>
+                                            <p:cond delay="0"/>
+                                          </p:stCondLst>
+                                        </p:cTn>
+                                        <p:tgtEl>
+                                          <p:spTgt spid="3">
+                                            <p:txEl>
+                                              <p:pRg st="13" end="13"/>
                                             </p:txEl>
                                           </p:spTgt>
                                         </p:tgtEl>
@@ -8911,42 +9038,12 @@
           <a:chExt cx="0" cy="0"/>
         </a:xfrm>
       </p:grpSpPr>
-      <p:sp>
-        <p:nvSpPr>
-          <p:cNvPr id="2" name="Title 1"/>
-          <p:cNvSpPr>
-            <a:spLocks noGrp="1"/>
-          </p:cNvSpPr>
-          <p:nvPr>
-            <p:ph type="title"/>
-          </p:nvPr>
-        </p:nvSpPr>
-        <p:spPr/>
-        <p:txBody>
-          <a:bodyPr/>
-          <a:lstStyle/>
-          <a:p>
-            <a:r>
-              <a:rPr lang="en-US" dirty="0"/>
-              <a:t>How </a:t>
-            </a:r>
-            <a:r>
-              <a:rPr lang="en-US"/>
-              <a:t>you Will be </a:t>
-            </a:r>
-            <a:r>
-              <a:rPr lang="en-US" dirty="0"/>
-              <a:t>Evaluated</a:t>
-            </a:r>
-          </a:p>
-        </p:txBody>
-      </p:sp>
       <p:pic>
         <p:nvPicPr>
-          <p:cNvPr id="5" name="Picture 4">
+          <p:cNvPr id="3" name="Picture 2">
             <a:extLst>
               <a:ext uri="{FF2B5EF4-FFF2-40B4-BE49-F238E27FC236}">
-                <a16:creationId xmlns:a16="http://schemas.microsoft.com/office/drawing/2014/main" id="{7109FDA6-2876-46A5-B7D7-758666AFF5EA}"/>
+                <a16:creationId xmlns:a16="http://schemas.microsoft.com/office/drawing/2014/main" id="{534B6B39-1E50-4035-9B47-D54394C1F3C1}"/>
               </a:ext>
             </a:extLst>
           </p:cNvPr>
@@ -8963,14 +9060,36 @@
         </p:blipFill>
         <p:spPr>
           <a:xfrm>
-            <a:off x="1219200" y="1401804"/>
-            <a:ext cx="6898562" cy="5395842"/>
+            <a:off x="1447800" y="1524000"/>
+            <a:ext cx="5005274" cy="5313861"/>
           </a:xfrm>
           <a:prstGeom prst="rect">
             <a:avLst/>
           </a:prstGeom>
         </p:spPr>
       </p:pic>
+      <p:sp>
+        <p:nvSpPr>
+          <p:cNvPr id="2" name="Title 1"/>
+          <p:cNvSpPr>
+            <a:spLocks noGrp="1"/>
+          </p:cNvSpPr>
+          <p:nvPr>
+            <p:ph type="title"/>
+          </p:nvPr>
+        </p:nvSpPr>
+        <p:spPr/>
+        <p:txBody>
+          <a:bodyPr/>
+          <a:lstStyle/>
+          <a:p>
+            <a:r>
+              <a:rPr lang="en-US" dirty="0"/>
+              <a:t>How you Will be Evaluated</a:t>
+            </a:r>
+          </a:p>
+        </p:txBody>
+      </p:sp>
       <p:sp>
         <p:nvSpPr>
           <p:cNvPr id="6" name="Rectangle 5">
@@ -8985,7 +9104,7 @@
         </p:nvSpPr>
         <p:spPr>
           <a:xfrm>
-            <a:off x="5029200" y="4114800"/>
+            <a:off x="5242110" y="4180930"/>
             <a:ext cx="533400" cy="1828800"/>
           </a:xfrm>
           <a:prstGeom prst="rect">
@@ -9037,8 +9156,8 @@
         </p:nvSpPr>
         <p:spPr>
           <a:xfrm>
-            <a:off x="1219200" y="1524000"/>
-            <a:ext cx="6898562" cy="914400"/>
+            <a:off x="1447800" y="1549772"/>
+            <a:ext cx="3094336" cy="858466"/>
           </a:xfrm>
           <a:prstGeom prst="rect">
             <a:avLst/>
@@ -9089,8 +9208,8 @@
         </p:nvSpPr>
         <p:spPr>
           <a:xfrm>
-            <a:off x="2590800" y="2819400"/>
-            <a:ext cx="1981200" cy="746166"/>
+            <a:off x="1524000" y="2759034"/>
+            <a:ext cx="2971800" cy="746166"/>
           </a:xfrm>
           <a:prstGeom prst="rect">
             <a:avLst/>
@@ -9141,7 +9260,7 @@
         </p:nvSpPr>
         <p:spPr>
           <a:xfrm>
-            <a:off x="1981200" y="6051480"/>
+            <a:off x="2286000" y="6058411"/>
             <a:ext cx="2209800" cy="746166"/>
           </a:xfrm>
           <a:prstGeom prst="rect">
@@ -9193,7 +9312,7 @@
         </p:nvSpPr>
         <p:spPr>
           <a:xfrm>
-            <a:off x="3733800" y="3810000"/>
+            <a:off x="4008736" y="3855996"/>
             <a:ext cx="533400" cy="2135459"/>
           </a:xfrm>
           <a:prstGeom prst="rect">

</xml_diff>

<commit_message>
First pass update for 2023
</commit_message>
<xml_diff>
--- a/PPT/Intro.pptx
+++ b/PPT/Intro.pptx
@@ -5,7 +5,7 @@
     <p:sldMasterId id="2147483768" r:id="rId1"/>
   </p:sldMasterIdLst>
   <p:notesMasterIdLst>
-    <p:notesMasterId r:id="rId23"/>
+    <p:notesMasterId r:id="rId24"/>
   </p:notesMasterIdLst>
   <p:sldIdLst>
     <p:sldId id="256" r:id="rId2"/>
@@ -18,17 +18,18 @@
     <p:sldId id="273" r:id="rId9"/>
     <p:sldId id="280" r:id="rId10"/>
     <p:sldId id="274" r:id="rId11"/>
-    <p:sldId id="258" r:id="rId12"/>
-    <p:sldId id="302" r:id="rId13"/>
-    <p:sldId id="288" r:id="rId14"/>
-    <p:sldId id="277" r:id="rId15"/>
-    <p:sldId id="291" r:id="rId16"/>
-    <p:sldId id="292" r:id="rId17"/>
-    <p:sldId id="290" r:id="rId18"/>
-    <p:sldId id="279" r:id="rId19"/>
-    <p:sldId id="281" r:id="rId20"/>
-    <p:sldId id="283" r:id="rId21"/>
-    <p:sldId id="282" r:id="rId22"/>
+    <p:sldId id="305" r:id="rId12"/>
+    <p:sldId id="258" r:id="rId13"/>
+    <p:sldId id="302" r:id="rId14"/>
+    <p:sldId id="288" r:id="rId15"/>
+    <p:sldId id="277" r:id="rId16"/>
+    <p:sldId id="291" r:id="rId17"/>
+    <p:sldId id="292" r:id="rId18"/>
+    <p:sldId id="290" r:id="rId19"/>
+    <p:sldId id="279" r:id="rId20"/>
+    <p:sldId id="281" r:id="rId21"/>
+    <p:sldId id="283" r:id="rId22"/>
+    <p:sldId id="282" r:id="rId23"/>
   </p:sldIdLst>
   <p:sldSz cx="12192000" cy="6858000"/>
   <p:notesSz cx="6858000" cy="9144000"/>
@@ -142,6 +143,7 @@
             <p14:sldId id="273"/>
             <p14:sldId id="280"/>
             <p14:sldId id="274"/>
+            <p14:sldId id="305"/>
             <p14:sldId id="258"/>
             <p14:sldId id="302"/>
             <p14:sldId id="288"/>
@@ -173,6 +175,32 @@
     </p:ext>
   </p:extLst>
 </p:presentation>
+</file>
+
+<file path=ppt/commentAuthors.xml><?xml version="1.0" encoding="utf-8"?>
+<p:cmAuthorLst xmlns:a="http://schemas.openxmlformats.org/drawingml/2006/main" xmlns:r="http://schemas.openxmlformats.org/officeDocument/2006/relationships" xmlns:p="http://schemas.openxmlformats.org/presentationml/2006/main">
+  <p:cmAuthor id="1" name="Kelvin Sung" initials="KS" lastIdx="1" clrIdx="0">
+    <p:extLst>
+      <p:ext uri="{19B8F6BF-5375-455C-9EA6-DF929625EA0E}">
+        <p15:presenceInfo xmlns:p15="http://schemas.microsoft.com/office/powerpoint/2012/main" userId="Kelvin Sung" providerId="None"/>
+      </p:ext>
+    </p:extLst>
+  </p:cmAuthor>
+</p:cmAuthorLst>
+</file>
+
+<file path=ppt/comments/comment1.xml><?xml version="1.0" encoding="utf-8"?>
+<p:cmLst xmlns:a="http://schemas.openxmlformats.org/drawingml/2006/main" xmlns:r="http://schemas.openxmlformats.org/officeDocument/2006/relationships" xmlns:p="http://schemas.openxmlformats.org/presentationml/2006/main">
+  <p:cm authorId="1" dt="2023-05-22T15:54:04.980" idx="1">
+    <p:pos x="5740" y="1596"/>
+    <p:text>Update with 2022 intro!</p:text>
+    <p:extLst>
+      <p:ext uri="{C676402C-5697-4E1C-873F-D02D1690AC5C}">
+        <p15:threadingInfo xmlns:p15="http://schemas.microsoft.com/office/powerpoint/2012/main" timeZoneBias="420"/>
+      </p:ext>
+    </p:extLst>
+  </p:cm>
+</p:cmLst>
 </file>
 
 <file path=ppt/notesMasters/notesMaster1.xml><?xml version="1.0" encoding="utf-8"?>
@@ -257,7 +285,7 @@
           <a:p>
             <a:fld id="{5578FD48-7BBA-4787-8980-5DFB65E0734D}" type="datetimeFigureOut">
               <a:rPr lang="en-US" smtClean="0"/>
-              <a:t>5/28/2022</a:t>
+              <a:t>5/22/2023</a:t>
             </a:fld>
             <a:endParaRPr lang="en-US"/>
           </a:p>
@@ -1181,7 +1209,7 @@
           <a:p>
             <a:r>
               <a:rPr lang="en-US" dirty="0"/>
-              <a:t>Games: subjectivity, an Art for others, TESTs + Feedback</a:t>
+              <a:t>Games: subjectivity, an Art for others, TESTs + Feedback   (Engaging your players in activities)</a:t>
             </a:r>
           </a:p>
         </p:txBody>
@@ -1203,7 +1231,7 @@
           <a:p>
             <a:fld id="{F7DB80D0-0163-4942-8F25-71DA65E50049}" type="slidenum">
               <a:rPr lang="en-US" smtClean="0"/>
-              <a:t>11</a:t>
+              <a:t>12</a:t>
             </a:fld>
             <a:endParaRPr lang="en-US"/>
           </a:p>
@@ -1282,7 +1310,7 @@
             <a:fld id="{1D8BD707-D9CF-40AE-B4C6-C98DA3205C09}" type="datetimeFigureOut">
               <a:rPr lang="en-US" smtClean="0"/>
               <a:pPr/>
-              <a:t>5/28/2022</a:t>
+              <a:t>5/22/2023</a:t>
             </a:fld>
             <a:endParaRPr lang="en-US"/>
           </a:p>
@@ -1599,7 +1627,7 @@
             <a:fld id="{1D8BD707-D9CF-40AE-B4C6-C98DA3205C09}" type="datetimeFigureOut">
               <a:rPr lang="en-US" smtClean="0"/>
               <a:pPr/>
-              <a:t>5/28/2022</a:t>
+              <a:t>5/22/2023</a:t>
             </a:fld>
             <a:endParaRPr lang="en-US"/>
           </a:p>
@@ -1775,7 +1803,7 @@
             <a:fld id="{1D8BD707-D9CF-40AE-B4C6-C98DA3205C09}" type="datetimeFigureOut">
               <a:rPr lang="en-US" smtClean="0"/>
               <a:pPr/>
-              <a:t>5/28/2022</a:t>
+              <a:t>5/22/2023</a:t>
             </a:fld>
             <a:endParaRPr lang="en-US"/>
           </a:p>
@@ -1895,7 +1923,7 @@
             <a:fld id="{1D8BD707-D9CF-40AE-B4C6-C98DA3205C09}" type="datetimeFigureOut">
               <a:rPr lang="en-US" smtClean="0"/>
               <a:pPr/>
-              <a:t>5/28/2022</a:t>
+              <a:t>5/22/2023</a:t>
             </a:fld>
             <a:endParaRPr lang="en-US"/>
           </a:p>
@@ -2195,7 +2223,7 @@
             <a:fld id="{1D8BD707-D9CF-40AE-B4C6-C98DA3205C09}" type="datetimeFigureOut">
               <a:rPr lang="en-US" smtClean="0"/>
               <a:pPr/>
-              <a:t>5/28/2022</a:t>
+              <a:t>5/22/2023</a:t>
             </a:fld>
             <a:endParaRPr lang="en-US"/>
           </a:p>
@@ -2490,7 +2518,7 @@
             <a:fld id="{1D8BD707-D9CF-40AE-B4C6-C98DA3205C09}" type="datetimeFigureOut">
               <a:rPr lang="en-US" smtClean="0"/>
               <a:pPr/>
-              <a:t>5/28/2022</a:t>
+              <a:t>5/22/2023</a:t>
             </a:fld>
             <a:endParaRPr lang="en-US"/>
           </a:p>
@@ -2920,7 +2948,7 @@
             <a:fld id="{1D8BD707-D9CF-40AE-B4C6-C98DA3205C09}" type="datetimeFigureOut">
               <a:rPr lang="en-US" smtClean="0"/>
               <a:pPr/>
-              <a:t>5/28/2022</a:t>
+              <a:t>5/22/2023</a:t>
             </a:fld>
             <a:endParaRPr lang="en-US"/>
           </a:p>
@@ -3040,7 +3068,7 @@
             <a:fld id="{1D8BD707-D9CF-40AE-B4C6-C98DA3205C09}" type="datetimeFigureOut">
               <a:rPr lang="en-US" smtClean="0"/>
               <a:pPr/>
-              <a:t>5/28/2022</a:t>
+              <a:t>5/22/2023</a:t>
             </a:fld>
             <a:endParaRPr lang="en-US"/>
           </a:p>
@@ -3132,7 +3160,7 @@
             <a:fld id="{1D8BD707-D9CF-40AE-B4C6-C98DA3205C09}" type="datetimeFigureOut">
               <a:rPr lang="en-US" smtClean="0"/>
               <a:pPr/>
-              <a:t>5/28/2022</a:t>
+              <a:t>5/22/2023</a:t>
             </a:fld>
             <a:endParaRPr lang="en-US"/>
           </a:p>
@@ -3384,7 +3412,7 @@
             <a:fld id="{1D8BD707-D9CF-40AE-B4C6-C98DA3205C09}" type="datetimeFigureOut">
               <a:rPr lang="en-US" smtClean="0"/>
               <a:pPr/>
-              <a:t>5/28/2022</a:t>
+              <a:t>5/22/2023</a:t>
             </a:fld>
             <a:endParaRPr lang="en-US"/>
           </a:p>
@@ -3902,7 +3930,7 @@
             <a:fld id="{1D8BD707-D9CF-40AE-B4C6-C98DA3205C09}" type="datetimeFigureOut">
               <a:rPr lang="en-US" smtClean="0"/>
               <a:pPr/>
-              <a:t>5/28/2022</a:t>
+              <a:t>5/22/2023</a:t>
             </a:fld>
             <a:endParaRPr lang="en-US"/>
           </a:p>
@@ -4134,7 +4162,7 @@
             <a:fld id="{1D8BD707-D9CF-40AE-B4C6-C98DA3205C09}" type="datetimeFigureOut">
               <a:rPr lang="en-US" smtClean="0"/>
               <a:pPr/>
-              <a:t>5/28/2022</a:t>
+              <a:t>5/22/2023</a:t>
             </a:fld>
             <a:endParaRPr lang="en-US"/>
           </a:p>
@@ -4678,7 +4706,7 @@
           <a:p>
             <a:r>
               <a:rPr lang="en-US" dirty="0"/>
-              <a:t>Summer 2022</a:t>
+              <a:t>Summer 2023</a:t>
             </a:r>
           </a:p>
         </p:txBody>
@@ -4830,7 +4858,7 @@
             <a:pPr lvl="1"/>
             <a:r>
               <a:rPr lang="en-US" altLang="zh-TW" dirty="0"/>
-              <a:t>Grew up in Singapore (since 6)		</a:t>
+              <a:t>Grew up in Singapore (since I was 6)	</a:t>
             </a:r>
             <a:r>
               <a:rPr lang="zh-CN" altLang="en-US" dirty="0">
@@ -4867,8 +4895,15 @@
           <a:p>
             <a:r>
               <a:rPr lang="en-US" altLang="zh-TW" dirty="0"/>
-              <a:t>Experience and Areas of Research</a:t>
-            </a:r>
+              <a:t>Experience and </a:t>
+            </a:r>
+            <a:r>
+              <a:rPr lang="en-US" altLang="zh-TW" dirty="0">
+                <a:hlinkClick r:id="rId3"/>
+              </a:rPr>
+              <a:t>Areas of Research</a:t>
+            </a:r>
+            <a:endParaRPr lang="en-US" altLang="zh-TW" dirty="0"/>
           </a:p>
           <a:p>
             <a:pPr lvl="1"/>
@@ -5355,6 +5390,145 @@
       </p:grpSpPr>
       <p:sp>
         <p:nvSpPr>
+          <p:cNvPr id="2" name="Title 1">
+            <a:extLst>
+              <a:ext uri="{FF2B5EF4-FFF2-40B4-BE49-F238E27FC236}">
+                <a16:creationId xmlns:a16="http://schemas.microsoft.com/office/drawing/2014/main" id="{A4E3FDF5-7787-4A07-B490-BDDD6C7A5229}"/>
+              </a:ext>
+            </a:extLst>
+          </p:cNvPr>
+          <p:cNvSpPr>
+            <a:spLocks noGrp="1"/>
+          </p:cNvSpPr>
+          <p:nvPr>
+            <p:ph type="title"/>
+          </p:nvPr>
+        </p:nvSpPr>
+        <p:spPr/>
+        <p:txBody>
+          <a:bodyPr/>
+          <a:lstStyle/>
+          <a:p>
+            <a:r>
+              <a:rPr lang="en-US" dirty="0"/>
+              <a:t>Summary of you and I</a:t>
+            </a:r>
+          </a:p>
+        </p:txBody>
+      </p:sp>
+      <p:sp>
+        <p:nvSpPr>
+          <p:cNvPr id="3" name="Content Placeholder 2">
+            <a:extLst>
+              <a:ext uri="{FF2B5EF4-FFF2-40B4-BE49-F238E27FC236}">
+                <a16:creationId xmlns:a16="http://schemas.microsoft.com/office/drawing/2014/main" id="{C74DF839-B02B-492A-A58F-D84BAAE72201}"/>
+              </a:ext>
+            </a:extLst>
+          </p:cNvPr>
+          <p:cNvSpPr>
+            <a:spLocks noGrp="1"/>
+          </p:cNvSpPr>
+          <p:nvPr>
+            <p:ph sz="quarter" idx="13"/>
+          </p:nvPr>
+        </p:nvSpPr>
+        <p:spPr/>
+        <p:txBody>
+          <a:bodyPr/>
+          <a:lstStyle/>
+          <a:p>
+            <a:r>
+              <a:rPr lang="en-US" dirty="0"/>
+              <a:t>Your motivations match the goals of this class</a:t>
+            </a:r>
+          </a:p>
+          <a:p>
+            <a:pPr lvl="1"/>
+            <a:r>
+              <a:rPr lang="en-US" dirty="0"/>
+              <a:t>Learn/apply knowledge</a:t>
+            </a:r>
+          </a:p>
+          <a:p>
+            <a:pPr lvl="1"/>
+            <a:r>
+              <a:rPr lang="en-US" dirty="0"/>
+              <a:t>Teaching and Learning from a different culture</a:t>
+            </a:r>
+          </a:p>
+          <a:p>
+            <a:pPr lvl="1"/>
+            <a:r>
+              <a:rPr lang="en-US" dirty="0"/>
+              <a:t>Fun</a:t>
+            </a:r>
+          </a:p>
+          <a:p>
+            <a:r>
+              <a:rPr lang="en-US" dirty="0"/>
+              <a:t>You have proper backgrounds</a:t>
+            </a:r>
+          </a:p>
+          <a:p>
+            <a:pPr lvl="1"/>
+            <a:r>
+              <a:rPr lang="en-US" dirty="0"/>
+              <a:t>Programming languages, technical background (OO + data structures)</a:t>
+            </a:r>
+          </a:p>
+          <a:p>
+            <a:r>
+              <a:rPr lang="en-US" dirty="0"/>
+              <a:t>You know a little about who I am</a:t>
+            </a:r>
+          </a:p>
+          <a:p>
+            <a:pPr lvl="1"/>
+            <a:endParaRPr lang="en-US" dirty="0"/>
+          </a:p>
+          <a:p>
+            <a:pPr marL="0" indent="0">
+              <a:buNone/>
+            </a:pPr>
+            <a:r>
+              <a:rPr lang="en-US" dirty="0"/>
+              <a:t>We are well-positioned to begin!</a:t>
+            </a:r>
+          </a:p>
+        </p:txBody>
+      </p:sp>
+    </p:spTree>
+    <p:extLst>
+      <p:ext uri="{BB962C8B-B14F-4D97-AF65-F5344CB8AC3E}">
+        <p14:creationId xmlns:p14="http://schemas.microsoft.com/office/powerpoint/2010/main" val="2165346807"/>
+      </p:ext>
+    </p:extLst>
+  </p:cSld>
+  <p:clrMapOvr>
+    <a:masterClrMapping/>
+  </p:clrMapOvr>
+</p:sld>
+</file>
+
+<file path=ppt/slides/slide12.xml><?xml version="1.0" encoding="utf-8"?>
+<p:sld xmlns:a="http://schemas.openxmlformats.org/drawingml/2006/main" xmlns:r="http://schemas.openxmlformats.org/officeDocument/2006/relationships" xmlns:p="http://schemas.openxmlformats.org/presentationml/2006/main">
+  <p:cSld>
+    <p:spTree>
+      <p:nvGrpSpPr>
+        <p:cNvPr id="1" name=""/>
+        <p:cNvGrpSpPr/>
+        <p:nvPr/>
+      </p:nvGrpSpPr>
+      <p:grpSpPr>
+        <a:xfrm>
+          <a:off x="0" y="0"/>
+          <a:ext cx="0" cy="0"/>
+          <a:chOff x="0" y="0"/>
+          <a:chExt cx="0" cy="0"/>
+        </a:xfrm>
+      </p:grpSpPr>
+      <p:sp>
+        <p:nvSpPr>
           <p:cNvPr id="2" name="Title 1"/>
           <p:cNvSpPr>
             <a:spLocks noGrp="1"/>
@@ -5393,7 +5567,7 @@
         </p:spPr>
         <p:txBody>
           <a:bodyPr>
-            <a:normAutofit/>
+            <a:normAutofit lnSpcReduction="10000"/>
           </a:bodyPr>
           <a:lstStyle/>
           <a:p>
@@ -5454,6 +5628,13 @@
             <a:r>
               <a:rPr lang="en-US" dirty="0"/>
               <a:t>Fundamentals of building a game</a:t>
+            </a:r>
+          </a:p>
+          <a:p>
+            <a:pPr lvl="2"/>
+            <a:r>
+              <a:rPr lang="en-US" dirty="0"/>
+              <a:t>Presentation of idea, prototypes to demo feasibility, vertical slice to sell the idea, and, PLAY TESTS</a:t>
             </a:r>
           </a:p>
           <a:p>
@@ -5973,6 +6154,55 @@
                       </p:childTnLst>
                     </p:cTn>
                   </p:par>
+                  <p:par>
+                    <p:cTn id="43" fill="hold">
+                      <p:stCondLst>
+                        <p:cond delay="indefinite"/>
+                      </p:stCondLst>
+                      <p:childTnLst>
+                        <p:par>
+                          <p:cTn id="44" fill="hold">
+                            <p:stCondLst>
+                              <p:cond delay="0"/>
+                            </p:stCondLst>
+                            <p:childTnLst>
+                              <p:par>
+                                <p:cTn id="45" presetID="1" presetClass="entr" presetSubtype="0" fill="hold" nodeType="clickEffect">
+                                  <p:stCondLst>
+                                    <p:cond delay="0"/>
+                                  </p:stCondLst>
+                                  <p:childTnLst>
+                                    <p:set>
+                                      <p:cBhvr>
+                                        <p:cTn id="46" dur="1" fill="hold">
+                                          <p:stCondLst>
+                                            <p:cond delay="0"/>
+                                          </p:stCondLst>
+                                        </p:cTn>
+                                        <p:tgtEl>
+                                          <p:spTgt spid="3">
+                                            <p:txEl>
+                                              <p:pRg st="10" end="10"/>
+                                            </p:txEl>
+                                          </p:spTgt>
+                                        </p:tgtEl>
+                                        <p:attrNameLst>
+                                          <p:attrName>style.visibility</p:attrName>
+                                        </p:attrNameLst>
+                                      </p:cBhvr>
+                                      <p:to>
+                                        <p:strVal val="visible"/>
+                                      </p:to>
+                                    </p:set>
+                                  </p:childTnLst>
+                                </p:cTn>
+                              </p:par>
+                            </p:childTnLst>
+                          </p:cTn>
+                        </p:par>
+                      </p:childTnLst>
+                    </p:cTn>
+                  </p:par>
                 </p:childTnLst>
               </p:cTn>
               <p:prevCondLst>
@@ -5998,7 +6228,7 @@
 </p:sld>
 </file>
 
-<file path=ppt/slides/slide12.xml><?xml version="1.0" encoding="utf-8"?>
+<file path=ppt/slides/slide13.xml><?xml version="1.0" encoding="utf-8"?>
 <p:sld xmlns:a="http://schemas.openxmlformats.org/drawingml/2006/main" xmlns:r="http://schemas.openxmlformats.org/officeDocument/2006/relationships" xmlns:p="http://schemas.openxmlformats.org/presentationml/2006/main">
   <p:cSld>
     <p:spTree>
@@ -6062,7 +6292,7 @@
             <a:pPr lvl="0"/>
             <a:r>
               <a:rPr lang="en-US" sz="1800" dirty="0"/>
-              <a:t>Part I (29</a:t>
+              <a:t>Part I (28</a:t>
             </a:r>
             <a:r>
               <a:rPr lang="en-US" sz="1800" baseline="30000" dirty="0"/>
@@ -6070,7 +6300,7 @@
             </a:r>
             <a:r>
               <a:rPr lang="en-US" sz="1800" dirty="0"/>
-              <a:t> May 2022): </a:t>
+              <a:t> May 2023): </a:t>
             </a:r>
           </a:p>
           <a:p>
@@ -6104,7 +6334,7 @@
           <a:p>
             <a:r>
               <a:rPr lang="en-US" sz="1800" dirty="0"/>
-              <a:t>Part II (July 2022): </a:t>
+              <a:t>Part II (July 2023): </a:t>
             </a:r>
           </a:p>
           <a:p>
@@ -6570,7 +6800,7 @@
 </p:sld>
 </file>
 
-<file path=ppt/slides/slide13.xml><?xml version="1.0" encoding="utf-8"?>
+<file path=ppt/slides/slide14.xml><?xml version="1.0" encoding="utf-8"?>
 <p:sld xmlns:a="http://schemas.openxmlformats.org/drawingml/2006/main" xmlns:r="http://schemas.openxmlformats.org/officeDocument/2006/relationships" xmlns:p="http://schemas.openxmlformats.org/presentationml/2006/main">
   <p:cSld>
     <p:spTree>
@@ -6634,7 +6864,7 @@
             <a:pPr lvl="0"/>
             <a:r>
               <a:rPr lang="en-US" sz="1800" dirty="0"/>
-              <a:t>Part I (29</a:t>
+              <a:t>Part I (28</a:t>
             </a:r>
             <a:r>
               <a:rPr lang="en-US" sz="1800" baseline="30000" dirty="0"/>
@@ -6642,7 +6872,7 @@
             </a:r>
             <a:r>
               <a:rPr lang="en-US" sz="1800" dirty="0"/>
-              <a:t> May 2022): </a:t>
+              <a:t> May 2023): </a:t>
             </a:r>
           </a:p>
           <a:p>
@@ -6676,7 +6906,7 @@
           <a:p>
             <a:r>
               <a:rPr lang="en-US" sz="1800" dirty="0"/>
-              <a:t>Part II (July 2022): </a:t>
+              <a:t>Part II (July 2023): </a:t>
             </a:r>
           </a:p>
           <a:p>
@@ -6977,6 +7207,26 @@
             <a:r>
               <a:rPr lang="en-US" sz="1800" dirty="0"/>
               <a:t>Work hard with everyone in class</a:t>
+            </a:r>
+          </a:p>
+          <a:p>
+            <a:r>
+              <a:rPr lang="en-US" sz="1800" dirty="0"/>
+              <a:t>You want to decide, if </a:t>
+            </a:r>
+          </a:p>
+          <a:p>
+            <a:pPr lvl="1"/>
+            <a:r>
+              <a:rPr lang="en-US" sz="1800" dirty="0"/>
+              <a:t>you want to learn with me, or </a:t>
+            </a:r>
+          </a:p>
+          <a:p>
+            <a:pPr lvl="1"/>
+            <a:r>
+              <a:rPr lang="en-US" sz="1800" dirty="0"/>
+              <a:t>You are able to learn from me</a:t>
             </a:r>
           </a:p>
         </p:txBody>
@@ -7464,6 +7714,153 @@
                       </p:childTnLst>
                     </p:cTn>
                   </p:par>
+                  <p:par>
+                    <p:cTn id="37" fill="hold">
+                      <p:stCondLst>
+                        <p:cond delay="indefinite"/>
+                      </p:stCondLst>
+                      <p:childTnLst>
+                        <p:par>
+                          <p:cTn id="38" fill="hold">
+                            <p:stCondLst>
+                              <p:cond delay="0"/>
+                            </p:stCondLst>
+                            <p:childTnLst>
+                              <p:par>
+                                <p:cTn id="39" presetID="1" presetClass="entr" presetSubtype="0" fill="hold" nodeType="clickEffect">
+                                  <p:stCondLst>
+                                    <p:cond delay="0"/>
+                                  </p:stCondLst>
+                                  <p:childTnLst>
+                                    <p:set>
+                                      <p:cBhvr>
+                                        <p:cTn id="40" dur="1" fill="hold">
+                                          <p:stCondLst>
+                                            <p:cond delay="0"/>
+                                          </p:stCondLst>
+                                        </p:cTn>
+                                        <p:tgtEl>
+                                          <p:spTgt spid="4">
+                                            <p:txEl>
+                                              <p:pRg st="4" end="4"/>
+                                            </p:txEl>
+                                          </p:spTgt>
+                                        </p:tgtEl>
+                                        <p:attrNameLst>
+                                          <p:attrName>style.visibility</p:attrName>
+                                        </p:attrNameLst>
+                                      </p:cBhvr>
+                                      <p:to>
+                                        <p:strVal val="visible"/>
+                                      </p:to>
+                                    </p:set>
+                                  </p:childTnLst>
+                                </p:cTn>
+                              </p:par>
+                            </p:childTnLst>
+                          </p:cTn>
+                        </p:par>
+                      </p:childTnLst>
+                    </p:cTn>
+                  </p:par>
+                  <p:par>
+                    <p:cTn id="41" fill="hold">
+                      <p:stCondLst>
+                        <p:cond delay="indefinite"/>
+                      </p:stCondLst>
+                      <p:childTnLst>
+                        <p:par>
+                          <p:cTn id="42" fill="hold">
+                            <p:stCondLst>
+                              <p:cond delay="0"/>
+                            </p:stCondLst>
+                            <p:childTnLst>
+                              <p:par>
+                                <p:cTn id="43" presetID="1" presetClass="entr" presetSubtype="0" fill="hold" nodeType="clickEffect">
+                                  <p:stCondLst>
+                                    <p:cond delay="0"/>
+                                  </p:stCondLst>
+                                  <p:childTnLst>
+                                    <p:set>
+                                      <p:cBhvr>
+                                        <p:cTn id="44" dur="1" fill="hold">
+                                          <p:stCondLst>
+                                            <p:cond delay="0"/>
+                                          </p:stCondLst>
+                                        </p:cTn>
+                                        <p:tgtEl>
+                                          <p:spTgt spid="4">
+                                            <p:txEl>
+                                              <p:pRg st="5" end="5"/>
+                                            </p:txEl>
+                                          </p:spTgt>
+                                        </p:tgtEl>
+                                        <p:attrNameLst>
+                                          <p:attrName>style.visibility</p:attrName>
+                                        </p:attrNameLst>
+                                      </p:cBhvr>
+                                      <p:to>
+                                        <p:strVal val="visible"/>
+                                      </p:to>
+                                    </p:set>
+                                  </p:childTnLst>
+                                </p:cTn>
+                              </p:par>
+                            </p:childTnLst>
+                          </p:cTn>
+                        </p:par>
+                      </p:childTnLst>
+                    </p:cTn>
+                  </p:par>
+                  <p:par>
+                    <p:cTn id="45" fill="hold">
+                      <p:stCondLst>
+                        <p:cond delay="indefinite"/>
+                      </p:stCondLst>
+                      <p:childTnLst>
+                        <p:par>
+                          <p:cTn id="46" fill="hold">
+                            <p:stCondLst>
+                              <p:cond delay="0"/>
+                            </p:stCondLst>
+                            <p:childTnLst>
+                              <p:par>
+                                <p:cTn id="47" presetID="1" presetClass="entr" presetSubtype="0" fill="hold" nodeType="clickEffect">
+                                  <p:stCondLst>
+                                    <p:cond delay="0"/>
+                                  </p:stCondLst>
+                                  <p:childTnLst>
+                                    <p:set>
+                                      <p:cBhvr>
+                                        <p:cTn id="48" dur="1" fill="hold">
+                                          <p:stCondLst>
+                                            <p:cond delay="0"/>
+                                          </p:stCondLst>
+                                        </p:cTn>
+                                        <p:tgtEl>
+                                          <p:spTgt spid="4">
+                                            <p:txEl>
+                                              <p:pRg st="6" end="6"/>
+                                            </p:txEl>
+                                          </p:spTgt>
+                                        </p:tgtEl>
+                                        <p:attrNameLst>
+                                          <p:attrName>style.visibility</p:attrName>
+                                        </p:attrNameLst>
+                                      </p:cBhvr>
+                                      <p:to>
+                                        <p:strVal val="visible"/>
+                                      </p:to>
+                                    </p:set>
+                                  </p:childTnLst>
+                                </p:cTn>
+                              </p:par>
+                            </p:childTnLst>
+                          </p:cTn>
+                        </p:par>
+                      </p:childTnLst>
+                    </p:cTn>
+                  </p:par>
                 </p:childTnLst>
               </p:cTn>
               <p:prevCondLst>
@@ -7489,7 +7886,7 @@
 </p:sld>
 </file>
 
-<file path=ppt/slides/slide14.xml><?xml version="1.0" encoding="utf-8"?>
+<file path=ppt/slides/slide15.xml><?xml version="1.0" encoding="utf-8"?>
 <p:sld xmlns:a="http://schemas.openxmlformats.org/drawingml/2006/main" xmlns:r="http://schemas.openxmlformats.org/officeDocument/2006/relationships" xmlns:p="http://schemas.openxmlformats.org/presentationml/2006/main">
   <p:cSld>
     <p:spTree>
@@ -7523,23 +7920,15 @@
           <a:p>
             <a:r>
               <a:rPr lang="en-US" dirty="0"/>
-              <a:t>Part </a:t>
-            </a:r>
-            <a:r>
-              <a:rPr lang="en-US"/>
-              <a:t>I (29</a:t>
-            </a:r>
-            <a:r>
-              <a:rPr lang="en-US" baseline="30000"/>
+              <a:t>Part I (28</a:t>
+            </a:r>
+            <a:r>
+              <a:rPr lang="en-US" baseline="30000" dirty="0"/>
               <a:t>th</a:t>
             </a:r>
             <a:r>
-              <a:rPr lang="en-US"/>
-              <a:t> </a:t>
-            </a:r>
-            <a:r>
               <a:rPr lang="en-US" dirty="0"/>
-              <a:t>May): Game Engine and Game Components</a:t>
+              <a:t> May): Game Engine and Game Components</a:t>
             </a:r>
           </a:p>
         </p:txBody>
@@ -7573,11 +7962,11 @@
           <a:p>
             <a:r>
               <a:rPr lang="en-US" dirty="0"/>
-              <a:t>Assignment: due 11pm on Tuesday 31</a:t>
+              <a:t>Assignment: due 11pm on Monday 30</a:t>
             </a:r>
             <a:r>
               <a:rPr lang="en-US" baseline="30000" dirty="0"/>
-              <a:t>st</a:t>
+              <a:t>th</a:t>
             </a:r>
             <a:r>
               <a:rPr lang="en-US" dirty="0"/>
@@ -7603,15 +7992,7 @@
             <a:pPr lvl="2"/>
             <a:r>
               <a:rPr lang="en-US" dirty="0"/>
-              <a:t>Quiz on </a:t>
-            </a:r>
-            <a:r>
-              <a:rPr lang="en-US" dirty="0" err="1"/>
-              <a:t>LumiNUS</a:t>
-            </a:r>
-            <a:r>
-              <a:rPr lang="en-US" dirty="0"/>
-              <a:t> to be open after today’s class.</a:t>
+              <a:t>Quiz on Canvas to be open after today’s class.</a:t>
             </a:r>
           </a:p>
           <a:p>
@@ -7633,13 +8014,8 @@
             <a:pPr lvl="2"/>
             <a:r>
               <a:rPr lang="en-US" dirty="0"/>
-              <a:t>Submit to </a:t>
-            </a:r>
-            <a:r>
-              <a:rPr lang="en-US" dirty="0" err="1"/>
-              <a:t>LumiNUS</a:t>
-            </a:r>
-            <a:endParaRPr lang="en-US" dirty="0"/>
+              <a:t>Submit to Canvas</a:t>
+            </a:r>
           </a:p>
           <a:p>
             <a:pPr lvl="2"/>
@@ -7660,6 +8036,20 @@
             <a:r>
               <a:rPr lang="en-US" dirty="0"/>
               <a:t>If you don’t practice, you won’t learn, really!</a:t>
+            </a:r>
+          </a:p>
+          <a:p>
+            <a:r>
+              <a:rPr lang="en-US" b="1" dirty="0">
+                <a:solidFill>
+                  <a:srgbClr val="FFFF00"/>
+                </a:solidFill>
+              </a:rPr>
+              <a:t>Very short turnaround! </a:t>
+            </a:r>
+            <a:r>
+              <a:rPr lang="en-US" dirty="0"/>
+              <a:t>Gives you some sense of the pace for Part II</a:t>
             </a:r>
             <a:endParaRPr lang="en-US" b="1" dirty="0">
               <a:solidFill>
@@ -8079,6 +8469,55 @@
                       </p:childTnLst>
                     </p:cTn>
                   </p:par>
+                  <p:par>
+                    <p:cTn id="35" fill="hold">
+                      <p:stCondLst>
+                        <p:cond delay="indefinite"/>
+                      </p:stCondLst>
+                      <p:childTnLst>
+                        <p:par>
+                          <p:cTn id="36" fill="hold">
+                            <p:stCondLst>
+                              <p:cond delay="0"/>
+                            </p:stCondLst>
+                            <p:childTnLst>
+                              <p:par>
+                                <p:cTn id="37" presetID="1" presetClass="entr" presetSubtype="0" fill="hold" grpId="0" nodeType="clickEffect">
+                                  <p:stCondLst>
+                                    <p:cond delay="0"/>
+                                  </p:stCondLst>
+                                  <p:childTnLst>
+                                    <p:set>
+                                      <p:cBhvr>
+                                        <p:cTn id="38" dur="1" fill="hold">
+                                          <p:stCondLst>
+                                            <p:cond delay="0"/>
+                                          </p:stCondLst>
+                                        </p:cTn>
+                                        <p:tgtEl>
+                                          <p:spTgt spid="3">
+                                            <p:txEl>
+                                              <p:pRg st="8" end="8"/>
+                                            </p:txEl>
+                                          </p:spTgt>
+                                        </p:tgtEl>
+                                        <p:attrNameLst>
+                                          <p:attrName>style.visibility</p:attrName>
+                                        </p:attrNameLst>
+                                      </p:cBhvr>
+                                      <p:to>
+                                        <p:strVal val="visible"/>
+                                      </p:to>
+                                    </p:set>
+                                  </p:childTnLst>
+                                </p:cTn>
+                              </p:par>
+                            </p:childTnLst>
+                          </p:cTn>
+                        </p:par>
+                      </p:childTnLst>
+                    </p:cTn>
+                  </p:par>
                 </p:childTnLst>
               </p:cTn>
               <p:prevCondLst>
@@ -8107,7 +8546,7 @@
 </p:sld>
 </file>
 
-<file path=ppt/slides/slide15.xml><?xml version="1.0" encoding="utf-8"?>
+<file path=ppt/slides/slide16.xml><?xml version="1.0" encoding="utf-8"?>
 <p:sld xmlns:a="http://schemas.openxmlformats.org/drawingml/2006/main" xmlns:r="http://schemas.openxmlformats.org/officeDocument/2006/relationships" xmlns:p="http://schemas.openxmlformats.org/presentationml/2006/main">
   <p:cSld>
     <p:spTree>
@@ -8141,7 +8580,7 @@
           <a:p>
             <a:r>
               <a:rPr lang="en-US" dirty="0"/>
-              <a:t>Part II (July 2022): Build an Awesome Game</a:t>
+              <a:t>Part II (July 2023): Build an Awesome Game</a:t>
             </a:r>
           </a:p>
         </p:txBody>
@@ -8187,27 +8626,19 @@
           <a:p>
             <a:pPr lvl="1"/>
             <a:r>
-              <a:rPr lang="en-US" b="1" dirty="0" err="1">
-                <a:solidFill>
-                  <a:srgbClr val="FFFF00"/>
-                </a:solidFill>
-              </a:rPr>
-              <a:t>Matery</a:t>
-            </a:r>
-            <a:r>
               <a:rPr lang="en-US" b="1" dirty="0">
                 <a:solidFill>
                   <a:srgbClr val="FFFF00"/>
                 </a:solidFill>
               </a:rPr>
-              <a:t> of game engine  + Familiarity with real-time interactive applications + Form Teams!! </a:t>
+              <a:t>Mastery of game engine  + Familiarity with real-time interactive applications + Form Teams!! </a:t>
             </a:r>
           </a:p>
           <a:p>
             <a:pPr lvl="2"/>
             <a:r>
               <a:rPr lang="en-US" dirty="0"/>
-              <a:t>Intro to yourself and your interests for forming groups (e.g., from 2019: </a:t>
+              <a:t>Intro to yourself and your interests for forming groups (e.g., from 2022: </a:t>
             </a:r>
             <a:r>
               <a:rPr lang="en-US" dirty="0">
@@ -8300,7 +8731,7 @@
             </a:r>
             <a:r>
               <a:rPr lang="en-US" dirty="0"/>
-              <a:t>Your final game</a:t>
+              <a:t>Your final game proposal</a:t>
             </a:r>
             <a:endParaRPr lang="en-US" b="1" dirty="0">
               <a:solidFill>
@@ -9108,7 +9539,7 @@
 </p:sld>
 </file>
 
-<file path=ppt/slides/slide16.xml><?xml version="1.0" encoding="utf-8"?>
+<file path=ppt/slides/slide17.xml><?xml version="1.0" encoding="utf-8"?>
 <p:sld xmlns:a="http://schemas.openxmlformats.org/drawingml/2006/main" xmlns:r="http://schemas.openxmlformats.org/officeDocument/2006/relationships" xmlns:p="http://schemas.openxmlformats.org/presentationml/2006/main">
   <p:cSld>
     <p:spTree>
@@ -9712,7 +10143,7 @@
 </p:sld>
 </file>
 
-<file path=ppt/slides/slide17.xml><?xml version="1.0" encoding="utf-8"?>
+<file path=ppt/slides/slide18.xml><?xml version="1.0" encoding="utf-8"?>
 <p:sld xmlns:a="http://schemas.openxmlformats.org/drawingml/2006/main" xmlns:r="http://schemas.openxmlformats.org/officeDocument/2006/relationships" xmlns:p="http://schemas.openxmlformats.org/presentationml/2006/main">
   <p:cSld>
     <p:spTree>
@@ -10261,7 +10692,7 @@
 </p:sld>
 </file>
 
-<file path=ppt/slides/slide18.xml><?xml version="1.0" encoding="utf-8"?>
+<file path=ppt/slides/slide19.xml><?xml version="1.0" encoding="utf-8"?>
 <p:sld xmlns:a="http://schemas.openxmlformats.org/drawingml/2006/main" xmlns:r="http://schemas.openxmlformats.org/officeDocument/2006/relationships" xmlns:p="http://schemas.openxmlformats.org/presentationml/2006/main">
   <p:cSld>
     <p:spTree>
@@ -11015,447 +11446,6 @@
 </p:sld>
 </file>
 
-<file path=ppt/slides/slide19.xml><?xml version="1.0" encoding="utf-8"?>
-<p:sld xmlns:a="http://schemas.openxmlformats.org/drawingml/2006/main" xmlns:r="http://schemas.openxmlformats.org/officeDocument/2006/relationships" xmlns:p="http://schemas.openxmlformats.org/presentationml/2006/main">
-  <p:cSld>
-    <p:spTree>
-      <p:nvGrpSpPr>
-        <p:cNvPr id="1" name=""/>
-        <p:cNvGrpSpPr/>
-        <p:nvPr/>
-      </p:nvGrpSpPr>
-      <p:grpSpPr>
-        <a:xfrm>
-          <a:off x="0" y="0"/>
-          <a:ext cx="0" cy="0"/>
-          <a:chOff x="0" y="0"/>
-          <a:chExt cx="0" cy="0"/>
-        </a:xfrm>
-      </p:grpSpPr>
-      <p:sp>
-        <p:nvSpPr>
-          <p:cNvPr id="3" name="Content Placeholder 2"/>
-          <p:cNvSpPr>
-            <a:spLocks noGrp="1"/>
-          </p:cNvSpPr>
-          <p:nvPr>
-            <p:ph sz="quarter" idx="13"/>
-          </p:nvPr>
-        </p:nvSpPr>
-        <p:spPr/>
-        <p:txBody>
-          <a:bodyPr/>
-          <a:lstStyle/>
-          <a:p>
-            <a:pPr marL="0" indent="0">
-              <a:buNone/>
-            </a:pPr>
-            <a:endParaRPr lang="en-US" dirty="0"/>
-          </a:p>
-          <a:p>
-            <a:pPr marL="0" indent="0">
-              <a:buNone/>
-            </a:pPr>
-            <a:endParaRPr lang="en-US" dirty="0"/>
-          </a:p>
-          <a:p>
-            <a:pPr marL="0" indent="0">
-              <a:buNone/>
-            </a:pPr>
-            <a:endParaRPr lang="en-US" dirty="0"/>
-          </a:p>
-          <a:p>
-            <a:pPr marL="0" indent="0">
-              <a:buNone/>
-            </a:pPr>
-            <a:endParaRPr lang="en-US" dirty="0"/>
-          </a:p>
-          <a:p>
-            <a:pPr marL="0" indent="0" algn="ctr">
-              <a:buNone/>
-            </a:pPr>
-            <a:r>
-              <a:rPr lang="en-US" sz="4400" dirty="0"/>
-              <a:t>Questions?</a:t>
-            </a:r>
-          </a:p>
-        </p:txBody>
-      </p:sp>
-      <p:sp>
-        <p:nvSpPr>
-          <p:cNvPr id="6" name="Content Placeholder 2">
-            <a:extLst>
-              <a:ext uri="{FF2B5EF4-FFF2-40B4-BE49-F238E27FC236}">
-                <a16:creationId xmlns:a16="http://schemas.microsoft.com/office/drawing/2014/main" id="{E0D93341-7C0E-4E7C-9045-A7415A69B793}"/>
-              </a:ext>
-            </a:extLst>
-          </p:cNvPr>
-          <p:cNvSpPr txBox="1">
-            <a:spLocks/>
-          </p:cNvSpPr>
-          <p:nvPr/>
-        </p:nvSpPr>
-        <p:spPr>
-          <a:xfrm>
-            <a:off x="1524000" y="3625850"/>
-            <a:ext cx="8382000" cy="2362200"/>
-          </a:xfrm>
-          <a:prstGeom prst="rect">
-            <a:avLst/>
-          </a:prstGeom>
-        </p:spPr>
-        <p:txBody>
-          <a:bodyPr vert="horz" lIns="91440" tIns="45720" rIns="91440" bIns="45720" rtlCol="0">
-            <a:normAutofit/>
-          </a:bodyPr>
-          <a:lstStyle>
-            <a:lvl1pPr marL="342900" indent="-342900" algn="l" defTabSz="914400" rtl="0" eaLnBrk="1" latinLnBrk="0" hangingPunct="1">
-              <a:lnSpc>
-                <a:spcPct val="100000"/>
-              </a:lnSpc>
-              <a:spcBef>
-                <a:spcPct val="20000"/>
-              </a:spcBef>
-              <a:spcAft>
-                <a:spcPts val="600"/>
-              </a:spcAft>
-              <a:buClr>
-                <a:schemeClr val="tx2"/>
-              </a:buClr>
-              <a:buFont typeface="Arial" pitchFamily="34" charset="0"/>
-              <a:buChar char="•"/>
-              <a:defRPr sz="1700" kern="1200" spc="30" baseline="0">
-                <a:solidFill>
-                  <a:schemeClr val="tx1"/>
-                </a:solidFill>
-                <a:latin typeface="+mn-lt"/>
-                <a:ea typeface="+mn-ea"/>
-                <a:cs typeface="+mn-cs"/>
-              </a:defRPr>
-            </a:lvl1pPr>
-            <a:lvl2pPr marL="742950" indent="-285750" algn="l" defTabSz="914400" rtl="0" eaLnBrk="1" latinLnBrk="0" hangingPunct="1">
-              <a:lnSpc>
-                <a:spcPct val="100000"/>
-              </a:lnSpc>
-              <a:spcBef>
-                <a:spcPct val="20000"/>
-              </a:spcBef>
-              <a:spcAft>
-                <a:spcPts val="600"/>
-              </a:spcAft>
-              <a:buClr>
-                <a:schemeClr val="tx2"/>
-              </a:buClr>
-              <a:buFont typeface="Arial" pitchFamily="34" charset="0"/>
-              <a:buChar char="•"/>
-              <a:defRPr sz="1700" kern="1200" spc="30" baseline="0">
-                <a:solidFill>
-                  <a:schemeClr val="tx1"/>
-                </a:solidFill>
-                <a:latin typeface="+mn-lt"/>
-                <a:ea typeface="+mn-ea"/>
-                <a:cs typeface="+mn-cs"/>
-              </a:defRPr>
-            </a:lvl2pPr>
-            <a:lvl3pPr marL="1143000" indent="-228600" algn="l" defTabSz="914400" rtl="0" eaLnBrk="1" latinLnBrk="0" hangingPunct="1">
-              <a:lnSpc>
-                <a:spcPct val="100000"/>
-              </a:lnSpc>
-              <a:spcBef>
-                <a:spcPct val="20000"/>
-              </a:spcBef>
-              <a:spcAft>
-                <a:spcPts val="600"/>
-              </a:spcAft>
-              <a:buClr>
-                <a:schemeClr val="tx2"/>
-              </a:buClr>
-              <a:buFont typeface="Arial" pitchFamily="34" charset="0"/>
-              <a:buChar char="•"/>
-              <a:defRPr sz="1700" kern="1200" spc="30" baseline="0">
-                <a:solidFill>
-                  <a:schemeClr val="tx1"/>
-                </a:solidFill>
-                <a:latin typeface="+mn-lt"/>
-                <a:ea typeface="+mn-ea"/>
-                <a:cs typeface="+mn-cs"/>
-              </a:defRPr>
-            </a:lvl3pPr>
-            <a:lvl4pPr marL="1600200" indent="-228600" algn="l" defTabSz="914400" rtl="0" eaLnBrk="1" latinLnBrk="0" hangingPunct="1">
-              <a:lnSpc>
-                <a:spcPct val="100000"/>
-              </a:lnSpc>
-              <a:spcBef>
-                <a:spcPct val="20000"/>
-              </a:spcBef>
-              <a:spcAft>
-                <a:spcPts val="600"/>
-              </a:spcAft>
-              <a:buClr>
-                <a:schemeClr val="tx2"/>
-              </a:buClr>
-              <a:buFont typeface="Arial" pitchFamily="34" charset="0"/>
-              <a:buChar char="•"/>
-              <a:defRPr sz="1700" kern="1200" spc="30" baseline="0">
-                <a:solidFill>
-                  <a:schemeClr val="tx1"/>
-                </a:solidFill>
-                <a:latin typeface="+mn-lt"/>
-                <a:ea typeface="+mn-ea"/>
-                <a:cs typeface="+mn-cs"/>
-              </a:defRPr>
-            </a:lvl4pPr>
-            <a:lvl5pPr marL="2057400" indent="-228600" algn="l" defTabSz="914400" rtl="0" eaLnBrk="1" latinLnBrk="0" hangingPunct="1">
-              <a:lnSpc>
-                <a:spcPct val="100000"/>
-              </a:lnSpc>
-              <a:spcBef>
-                <a:spcPct val="20000"/>
-              </a:spcBef>
-              <a:spcAft>
-                <a:spcPts val="600"/>
-              </a:spcAft>
-              <a:buClr>
-                <a:schemeClr val="tx2"/>
-              </a:buClr>
-              <a:buFont typeface="Arial" pitchFamily="34" charset="0"/>
-              <a:buChar char="•"/>
-              <a:defRPr sz="1700" kern="1200" spc="30" baseline="0">
-                <a:solidFill>
-                  <a:schemeClr val="tx1"/>
-                </a:solidFill>
-                <a:latin typeface="+mn-lt"/>
-                <a:ea typeface="+mn-ea"/>
-                <a:cs typeface="+mn-cs"/>
-              </a:defRPr>
-            </a:lvl5pPr>
-            <a:lvl6pPr marL="2514600" indent="-228600" algn="l" defTabSz="914400" rtl="0" eaLnBrk="1" latinLnBrk="0" hangingPunct="1">
-              <a:lnSpc>
-                <a:spcPct val="100000"/>
-              </a:lnSpc>
-              <a:spcBef>
-                <a:spcPct val="20000"/>
-              </a:spcBef>
-              <a:spcAft>
-                <a:spcPts val="600"/>
-              </a:spcAft>
-              <a:buClr>
-                <a:schemeClr val="tx2"/>
-              </a:buClr>
-              <a:buFont typeface="Arial" pitchFamily="34" charset="0"/>
-              <a:buChar char="•"/>
-              <a:defRPr sz="1700" kern="1200">
-                <a:solidFill>
-                  <a:schemeClr val="tx1"/>
-                </a:solidFill>
-                <a:latin typeface="+mn-lt"/>
-                <a:ea typeface="+mn-ea"/>
-                <a:cs typeface="+mn-cs"/>
-              </a:defRPr>
-            </a:lvl6pPr>
-            <a:lvl7pPr marL="2971800" indent="-228600" algn="l" defTabSz="914400" rtl="0" eaLnBrk="1" latinLnBrk="0" hangingPunct="1">
-              <a:lnSpc>
-                <a:spcPct val="100000"/>
-              </a:lnSpc>
-              <a:spcBef>
-                <a:spcPct val="20000"/>
-              </a:spcBef>
-              <a:spcAft>
-                <a:spcPts val="600"/>
-              </a:spcAft>
-              <a:buClr>
-                <a:schemeClr val="tx2"/>
-              </a:buClr>
-              <a:buFont typeface="Arial" pitchFamily="34" charset="0"/>
-              <a:buChar char="•"/>
-              <a:defRPr sz="1700" kern="1200">
-                <a:solidFill>
-                  <a:schemeClr val="tx1"/>
-                </a:solidFill>
-                <a:latin typeface="+mn-lt"/>
-                <a:ea typeface="+mn-ea"/>
-                <a:cs typeface="+mn-cs"/>
-              </a:defRPr>
-            </a:lvl7pPr>
-            <a:lvl8pPr marL="3429000" indent="-228600" algn="l" defTabSz="914400" rtl="0" eaLnBrk="1" latinLnBrk="0" hangingPunct="1">
-              <a:lnSpc>
-                <a:spcPct val="100000"/>
-              </a:lnSpc>
-              <a:spcBef>
-                <a:spcPct val="20000"/>
-              </a:spcBef>
-              <a:spcAft>
-                <a:spcPts val="600"/>
-              </a:spcAft>
-              <a:buClr>
-                <a:schemeClr val="tx2"/>
-              </a:buClr>
-              <a:buFont typeface="Arial" pitchFamily="34" charset="0"/>
-              <a:buChar char="•"/>
-              <a:defRPr sz="1700" kern="1200">
-                <a:solidFill>
-                  <a:schemeClr val="tx1"/>
-                </a:solidFill>
-                <a:latin typeface="+mn-lt"/>
-                <a:ea typeface="+mn-ea"/>
-                <a:cs typeface="+mn-cs"/>
-              </a:defRPr>
-            </a:lvl8pPr>
-            <a:lvl9pPr marL="3886200" indent="-228600" algn="l" defTabSz="914400" rtl="0" eaLnBrk="1" latinLnBrk="0" hangingPunct="1">
-              <a:lnSpc>
-                <a:spcPct val="100000"/>
-              </a:lnSpc>
-              <a:spcBef>
-                <a:spcPct val="20000"/>
-              </a:spcBef>
-              <a:spcAft>
-                <a:spcPts val="600"/>
-              </a:spcAft>
-              <a:buClr>
-                <a:schemeClr val="tx2"/>
-              </a:buClr>
-              <a:buFont typeface="Arial" pitchFamily="34" charset="0"/>
-              <a:buChar char="•"/>
-              <a:defRPr sz="1700" kern="1200">
-                <a:solidFill>
-                  <a:schemeClr val="tx1"/>
-                </a:solidFill>
-                <a:latin typeface="+mn-lt"/>
-                <a:ea typeface="+mn-ea"/>
-                <a:cs typeface="+mn-cs"/>
-              </a:defRPr>
-            </a:lvl9pPr>
-          </a:lstStyle>
-          <a:p>
-            <a:pPr marL="0" indent="0">
-              <a:buFont typeface="Arial" pitchFamily="34" charset="0"/>
-              <a:buNone/>
-            </a:pPr>
-            <a:endParaRPr lang="en-US" dirty="0"/>
-          </a:p>
-          <a:p>
-            <a:pPr marL="0" indent="0">
-              <a:buFont typeface="Arial" pitchFamily="34" charset="0"/>
-              <a:buNone/>
-            </a:pPr>
-            <a:r>
-              <a:rPr lang="en-US" dirty="0"/>
-              <a:t>My questions for you: … so far in our class …</a:t>
-            </a:r>
-          </a:p>
-          <a:p>
-            <a:pPr marL="0" indent="0">
-              <a:buFont typeface="Arial" pitchFamily="34" charset="0"/>
-              <a:buNone/>
-            </a:pPr>
-            <a:r>
-              <a:rPr lang="en-US" dirty="0"/>
-              <a:t>	What have you learned? </a:t>
-            </a:r>
-          </a:p>
-          <a:p>
-            <a:pPr marL="0" indent="0">
-              <a:buFont typeface="Arial" pitchFamily="34" charset="0"/>
-              <a:buNone/>
-            </a:pPr>
-            <a:r>
-              <a:rPr lang="en-US" dirty="0"/>
-              <a:t>	What is the single most important thing you have learned?</a:t>
-            </a:r>
-          </a:p>
-        </p:txBody>
-      </p:sp>
-    </p:spTree>
-    <p:extLst>
-      <p:ext uri="{BB962C8B-B14F-4D97-AF65-F5344CB8AC3E}">
-        <p14:creationId xmlns:p14="http://schemas.microsoft.com/office/powerpoint/2010/main" val="158663417"/>
-      </p:ext>
-    </p:extLst>
-  </p:cSld>
-  <p:clrMapOvr>
-    <a:masterClrMapping/>
-  </p:clrMapOvr>
-  <p:timing>
-    <p:tnLst>
-      <p:par>
-        <p:cTn id="1" dur="indefinite" restart="never" nodeType="tmRoot">
-          <p:childTnLst>
-            <p:seq concurrent="1" nextAc="seek">
-              <p:cTn id="2" dur="indefinite" nodeType="mainSeq">
-                <p:childTnLst>
-                  <p:par>
-                    <p:cTn id="3" fill="hold">
-                      <p:stCondLst>
-                        <p:cond delay="indefinite"/>
-                      </p:stCondLst>
-                      <p:childTnLst>
-                        <p:par>
-                          <p:cTn id="4" fill="hold">
-                            <p:stCondLst>
-                              <p:cond delay="0"/>
-                            </p:stCondLst>
-                            <p:childTnLst>
-                              <p:par>
-                                <p:cTn id="5" presetID="1" presetClass="entr" presetSubtype="0" fill="hold" grpId="0" nodeType="clickEffect">
-                                  <p:stCondLst>
-                                    <p:cond delay="0"/>
-                                  </p:stCondLst>
-                                  <p:childTnLst>
-                                    <p:set>
-                                      <p:cBhvr>
-                                        <p:cTn id="6" dur="1" fill="hold">
-                                          <p:stCondLst>
-                                            <p:cond delay="0"/>
-                                          </p:stCondLst>
-                                        </p:cTn>
-                                        <p:tgtEl>
-                                          <p:spTgt spid="6"/>
-                                        </p:tgtEl>
-                                        <p:attrNameLst>
-                                          <p:attrName>style.visibility</p:attrName>
-                                        </p:attrNameLst>
-                                      </p:cBhvr>
-                                      <p:to>
-                                        <p:strVal val="visible"/>
-                                      </p:to>
-                                    </p:set>
-                                  </p:childTnLst>
-                                </p:cTn>
-                              </p:par>
-                            </p:childTnLst>
-                          </p:cTn>
-                        </p:par>
-                      </p:childTnLst>
-                    </p:cTn>
-                  </p:par>
-                </p:childTnLst>
-              </p:cTn>
-              <p:prevCondLst>
-                <p:cond evt="onPrev" delay="0">
-                  <p:tgtEl>
-                    <p:sldTgt/>
-                  </p:tgtEl>
-                </p:cond>
-              </p:prevCondLst>
-              <p:nextCondLst>
-                <p:cond evt="onNext" delay="0">
-                  <p:tgtEl>
-                    <p:sldTgt/>
-                  </p:tgtEl>
-                </p:cond>
-              </p:nextCondLst>
-            </p:seq>
-          </p:childTnLst>
-        </p:cTn>
-      </p:par>
-    </p:tnLst>
-    <p:bldLst>
-      <p:bldP spid="6" grpId="0"/>
-    </p:bldLst>
-  </p:timing>
-</p:sld>
-</file>
-
 <file path=ppt/slides/slide2.xml><?xml version="1.0" encoding="utf-8"?>
 <p:sld xmlns:a="http://schemas.openxmlformats.org/drawingml/2006/main" xmlns:r="http://schemas.openxmlformats.org/officeDocument/2006/relationships" xmlns:p="http://schemas.openxmlformats.org/presentationml/2006/main">
   <p:cSld>
@@ -12315,6 +12305,447 @@
       </p:grpSpPr>
       <p:sp>
         <p:nvSpPr>
+          <p:cNvPr id="3" name="Content Placeholder 2"/>
+          <p:cNvSpPr>
+            <a:spLocks noGrp="1"/>
+          </p:cNvSpPr>
+          <p:nvPr>
+            <p:ph sz="quarter" idx="13"/>
+          </p:nvPr>
+        </p:nvSpPr>
+        <p:spPr/>
+        <p:txBody>
+          <a:bodyPr/>
+          <a:lstStyle/>
+          <a:p>
+            <a:pPr marL="0" indent="0">
+              <a:buNone/>
+            </a:pPr>
+            <a:endParaRPr lang="en-US" dirty="0"/>
+          </a:p>
+          <a:p>
+            <a:pPr marL="0" indent="0">
+              <a:buNone/>
+            </a:pPr>
+            <a:endParaRPr lang="en-US" dirty="0"/>
+          </a:p>
+          <a:p>
+            <a:pPr marL="0" indent="0">
+              <a:buNone/>
+            </a:pPr>
+            <a:endParaRPr lang="en-US" dirty="0"/>
+          </a:p>
+          <a:p>
+            <a:pPr marL="0" indent="0">
+              <a:buNone/>
+            </a:pPr>
+            <a:endParaRPr lang="en-US" dirty="0"/>
+          </a:p>
+          <a:p>
+            <a:pPr marL="0" indent="0" algn="ctr">
+              <a:buNone/>
+            </a:pPr>
+            <a:r>
+              <a:rPr lang="en-US" sz="4400" dirty="0"/>
+              <a:t>Questions?</a:t>
+            </a:r>
+          </a:p>
+        </p:txBody>
+      </p:sp>
+      <p:sp>
+        <p:nvSpPr>
+          <p:cNvPr id="6" name="Content Placeholder 2">
+            <a:extLst>
+              <a:ext uri="{FF2B5EF4-FFF2-40B4-BE49-F238E27FC236}">
+                <a16:creationId xmlns:a16="http://schemas.microsoft.com/office/drawing/2014/main" id="{E0D93341-7C0E-4E7C-9045-A7415A69B793}"/>
+              </a:ext>
+            </a:extLst>
+          </p:cNvPr>
+          <p:cNvSpPr txBox="1">
+            <a:spLocks/>
+          </p:cNvSpPr>
+          <p:nvPr/>
+        </p:nvSpPr>
+        <p:spPr>
+          <a:xfrm>
+            <a:off x="1524000" y="3625850"/>
+            <a:ext cx="8382000" cy="2362200"/>
+          </a:xfrm>
+          <a:prstGeom prst="rect">
+            <a:avLst/>
+          </a:prstGeom>
+        </p:spPr>
+        <p:txBody>
+          <a:bodyPr vert="horz" lIns="91440" tIns="45720" rIns="91440" bIns="45720" rtlCol="0">
+            <a:normAutofit/>
+          </a:bodyPr>
+          <a:lstStyle>
+            <a:lvl1pPr marL="342900" indent="-342900" algn="l" defTabSz="914400" rtl="0" eaLnBrk="1" latinLnBrk="0" hangingPunct="1">
+              <a:lnSpc>
+                <a:spcPct val="100000"/>
+              </a:lnSpc>
+              <a:spcBef>
+                <a:spcPct val="20000"/>
+              </a:spcBef>
+              <a:spcAft>
+                <a:spcPts val="600"/>
+              </a:spcAft>
+              <a:buClr>
+                <a:schemeClr val="tx2"/>
+              </a:buClr>
+              <a:buFont typeface="Arial" pitchFamily="34" charset="0"/>
+              <a:buChar char="•"/>
+              <a:defRPr sz="1700" kern="1200" spc="30" baseline="0">
+                <a:solidFill>
+                  <a:schemeClr val="tx1"/>
+                </a:solidFill>
+                <a:latin typeface="+mn-lt"/>
+                <a:ea typeface="+mn-ea"/>
+                <a:cs typeface="+mn-cs"/>
+              </a:defRPr>
+            </a:lvl1pPr>
+            <a:lvl2pPr marL="742950" indent="-285750" algn="l" defTabSz="914400" rtl="0" eaLnBrk="1" latinLnBrk="0" hangingPunct="1">
+              <a:lnSpc>
+                <a:spcPct val="100000"/>
+              </a:lnSpc>
+              <a:spcBef>
+                <a:spcPct val="20000"/>
+              </a:spcBef>
+              <a:spcAft>
+                <a:spcPts val="600"/>
+              </a:spcAft>
+              <a:buClr>
+                <a:schemeClr val="tx2"/>
+              </a:buClr>
+              <a:buFont typeface="Arial" pitchFamily="34" charset="0"/>
+              <a:buChar char="•"/>
+              <a:defRPr sz="1700" kern="1200" spc="30" baseline="0">
+                <a:solidFill>
+                  <a:schemeClr val="tx1"/>
+                </a:solidFill>
+                <a:latin typeface="+mn-lt"/>
+                <a:ea typeface="+mn-ea"/>
+                <a:cs typeface="+mn-cs"/>
+              </a:defRPr>
+            </a:lvl2pPr>
+            <a:lvl3pPr marL="1143000" indent="-228600" algn="l" defTabSz="914400" rtl="0" eaLnBrk="1" latinLnBrk="0" hangingPunct="1">
+              <a:lnSpc>
+                <a:spcPct val="100000"/>
+              </a:lnSpc>
+              <a:spcBef>
+                <a:spcPct val="20000"/>
+              </a:spcBef>
+              <a:spcAft>
+                <a:spcPts val="600"/>
+              </a:spcAft>
+              <a:buClr>
+                <a:schemeClr val="tx2"/>
+              </a:buClr>
+              <a:buFont typeface="Arial" pitchFamily="34" charset="0"/>
+              <a:buChar char="•"/>
+              <a:defRPr sz="1700" kern="1200" spc="30" baseline="0">
+                <a:solidFill>
+                  <a:schemeClr val="tx1"/>
+                </a:solidFill>
+                <a:latin typeface="+mn-lt"/>
+                <a:ea typeface="+mn-ea"/>
+                <a:cs typeface="+mn-cs"/>
+              </a:defRPr>
+            </a:lvl3pPr>
+            <a:lvl4pPr marL="1600200" indent="-228600" algn="l" defTabSz="914400" rtl="0" eaLnBrk="1" latinLnBrk="0" hangingPunct="1">
+              <a:lnSpc>
+                <a:spcPct val="100000"/>
+              </a:lnSpc>
+              <a:spcBef>
+                <a:spcPct val="20000"/>
+              </a:spcBef>
+              <a:spcAft>
+                <a:spcPts val="600"/>
+              </a:spcAft>
+              <a:buClr>
+                <a:schemeClr val="tx2"/>
+              </a:buClr>
+              <a:buFont typeface="Arial" pitchFamily="34" charset="0"/>
+              <a:buChar char="•"/>
+              <a:defRPr sz="1700" kern="1200" spc="30" baseline="0">
+                <a:solidFill>
+                  <a:schemeClr val="tx1"/>
+                </a:solidFill>
+                <a:latin typeface="+mn-lt"/>
+                <a:ea typeface="+mn-ea"/>
+                <a:cs typeface="+mn-cs"/>
+              </a:defRPr>
+            </a:lvl4pPr>
+            <a:lvl5pPr marL="2057400" indent="-228600" algn="l" defTabSz="914400" rtl="0" eaLnBrk="1" latinLnBrk="0" hangingPunct="1">
+              <a:lnSpc>
+                <a:spcPct val="100000"/>
+              </a:lnSpc>
+              <a:spcBef>
+                <a:spcPct val="20000"/>
+              </a:spcBef>
+              <a:spcAft>
+                <a:spcPts val="600"/>
+              </a:spcAft>
+              <a:buClr>
+                <a:schemeClr val="tx2"/>
+              </a:buClr>
+              <a:buFont typeface="Arial" pitchFamily="34" charset="0"/>
+              <a:buChar char="•"/>
+              <a:defRPr sz="1700" kern="1200" spc="30" baseline="0">
+                <a:solidFill>
+                  <a:schemeClr val="tx1"/>
+                </a:solidFill>
+                <a:latin typeface="+mn-lt"/>
+                <a:ea typeface="+mn-ea"/>
+                <a:cs typeface="+mn-cs"/>
+              </a:defRPr>
+            </a:lvl5pPr>
+            <a:lvl6pPr marL="2514600" indent="-228600" algn="l" defTabSz="914400" rtl="0" eaLnBrk="1" latinLnBrk="0" hangingPunct="1">
+              <a:lnSpc>
+                <a:spcPct val="100000"/>
+              </a:lnSpc>
+              <a:spcBef>
+                <a:spcPct val="20000"/>
+              </a:spcBef>
+              <a:spcAft>
+                <a:spcPts val="600"/>
+              </a:spcAft>
+              <a:buClr>
+                <a:schemeClr val="tx2"/>
+              </a:buClr>
+              <a:buFont typeface="Arial" pitchFamily="34" charset="0"/>
+              <a:buChar char="•"/>
+              <a:defRPr sz="1700" kern="1200">
+                <a:solidFill>
+                  <a:schemeClr val="tx1"/>
+                </a:solidFill>
+                <a:latin typeface="+mn-lt"/>
+                <a:ea typeface="+mn-ea"/>
+                <a:cs typeface="+mn-cs"/>
+              </a:defRPr>
+            </a:lvl6pPr>
+            <a:lvl7pPr marL="2971800" indent="-228600" algn="l" defTabSz="914400" rtl="0" eaLnBrk="1" latinLnBrk="0" hangingPunct="1">
+              <a:lnSpc>
+                <a:spcPct val="100000"/>
+              </a:lnSpc>
+              <a:spcBef>
+                <a:spcPct val="20000"/>
+              </a:spcBef>
+              <a:spcAft>
+                <a:spcPts val="600"/>
+              </a:spcAft>
+              <a:buClr>
+                <a:schemeClr val="tx2"/>
+              </a:buClr>
+              <a:buFont typeface="Arial" pitchFamily="34" charset="0"/>
+              <a:buChar char="•"/>
+              <a:defRPr sz="1700" kern="1200">
+                <a:solidFill>
+                  <a:schemeClr val="tx1"/>
+                </a:solidFill>
+                <a:latin typeface="+mn-lt"/>
+                <a:ea typeface="+mn-ea"/>
+                <a:cs typeface="+mn-cs"/>
+              </a:defRPr>
+            </a:lvl7pPr>
+            <a:lvl8pPr marL="3429000" indent="-228600" algn="l" defTabSz="914400" rtl="0" eaLnBrk="1" latinLnBrk="0" hangingPunct="1">
+              <a:lnSpc>
+                <a:spcPct val="100000"/>
+              </a:lnSpc>
+              <a:spcBef>
+                <a:spcPct val="20000"/>
+              </a:spcBef>
+              <a:spcAft>
+                <a:spcPts val="600"/>
+              </a:spcAft>
+              <a:buClr>
+                <a:schemeClr val="tx2"/>
+              </a:buClr>
+              <a:buFont typeface="Arial" pitchFamily="34" charset="0"/>
+              <a:buChar char="•"/>
+              <a:defRPr sz="1700" kern="1200">
+                <a:solidFill>
+                  <a:schemeClr val="tx1"/>
+                </a:solidFill>
+                <a:latin typeface="+mn-lt"/>
+                <a:ea typeface="+mn-ea"/>
+                <a:cs typeface="+mn-cs"/>
+              </a:defRPr>
+            </a:lvl8pPr>
+            <a:lvl9pPr marL="3886200" indent="-228600" algn="l" defTabSz="914400" rtl="0" eaLnBrk="1" latinLnBrk="0" hangingPunct="1">
+              <a:lnSpc>
+                <a:spcPct val="100000"/>
+              </a:lnSpc>
+              <a:spcBef>
+                <a:spcPct val="20000"/>
+              </a:spcBef>
+              <a:spcAft>
+                <a:spcPts val="600"/>
+              </a:spcAft>
+              <a:buClr>
+                <a:schemeClr val="tx2"/>
+              </a:buClr>
+              <a:buFont typeface="Arial" pitchFamily="34" charset="0"/>
+              <a:buChar char="•"/>
+              <a:defRPr sz="1700" kern="1200">
+                <a:solidFill>
+                  <a:schemeClr val="tx1"/>
+                </a:solidFill>
+                <a:latin typeface="+mn-lt"/>
+                <a:ea typeface="+mn-ea"/>
+                <a:cs typeface="+mn-cs"/>
+              </a:defRPr>
+            </a:lvl9pPr>
+          </a:lstStyle>
+          <a:p>
+            <a:pPr marL="0" indent="0">
+              <a:buFont typeface="Arial" pitchFamily="34" charset="0"/>
+              <a:buNone/>
+            </a:pPr>
+            <a:endParaRPr lang="en-US" dirty="0"/>
+          </a:p>
+          <a:p>
+            <a:pPr marL="0" indent="0">
+              <a:buFont typeface="Arial" pitchFamily="34" charset="0"/>
+              <a:buNone/>
+            </a:pPr>
+            <a:r>
+              <a:rPr lang="en-US" dirty="0"/>
+              <a:t>My questions for you: … so far in our class …</a:t>
+            </a:r>
+          </a:p>
+          <a:p>
+            <a:pPr marL="0" indent="0">
+              <a:buFont typeface="Arial" pitchFamily="34" charset="0"/>
+              <a:buNone/>
+            </a:pPr>
+            <a:r>
+              <a:rPr lang="en-US" dirty="0"/>
+              <a:t>	What have you learned? </a:t>
+            </a:r>
+          </a:p>
+          <a:p>
+            <a:pPr marL="0" indent="0">
+              <a:buFont typeface="Arial" pitchFamily="34" charset="0"/>
+              <a:buNone/>
+            </a:pPr>
+            <a:r>
+              <a:rPr lang="en-US" dirty="0"/>
+              <a:t>	What is the single most important thing you have learned?</a:t>
+            </a:r>
+          </a:p>
+        </p:txBody>
+      </p:sp>
+    </p:spTree>
+    <p:extLst>
+      <p:ext uri="{BB962C8B-B14F-4D97-AF65-F5344CB8AC3E}">
+        <p14:creationId xmlns:p14="http://schemas.microsoft.com/office/powerpoint/2010/main" val="158663417"/>
+      </p:ext>
+    </p:extLst>
+  </p:cSld>
+  <p:clrMapOvr>
+    <a:masterClrMapping/>
+  </p:clrMapOvr>
+  <p:timing>
+    <p:tnLst>
+      <p:par>
+        <p:cTn id="1" dur="indefinite" restart="never" nodeType="tmRoot">
+          <p:childTnLst>
+            <p:seq concurrent="1" nextAc="seek">
+              <p:cTn id="2" dur="indefinite" nodeType="mainSeq">
+                <p:childTnLst>
+                  <p:par>
+                    <p:cTn id="3" fill="hold">
+                      <p:stCondLst>
+                        <p:cond delay="indefinite"/>
+                      </p:stCondLst>
+                      <p:childTnLst>
+                        <p:par>
+                          <p:cTn id="4" fill="hold">
+                            <p:stCondLst>
+                              <p:cond delay="0"/>
+                            </p:stCondLst>
+                            <p:childTnLst>
+                              <p:par>
+                                <p:cTn id="5" presetID="1" presetClass="entr" presetSubtype="0" fill="hold" grpId="0" nodeType="clickEffect">
+                                  <p:stCondLst>
+                                    <p:cond delay="0"/>
+                                  </p:stCondLst>
+                                  <p:childTnLst>
+                                    <p:set>
+                                      <p:cBhvr>
+                                        <p:cTn id="6" dur="1" fill="hold">
+                                          <p:stCondLst>
+                                            <p:cond delay="0"/>
+                                          </p:stCondLst>
+                                        </p:cTn>
+                                        <p:tgtEl>
+                                          <p:spTgt spid="6"/>
+                                        </p:tgtEl>
+                                        <p:attrNameLst>
+                                          <p:attrName>style.visibility</p:attrName>
+                                        </p:attrNameLst>
+                                      </p:cBhvr>
+                                      <p:to>
+                                        <p:strVal val="visible"/>
+                                      </p:to>
+                                    </p:set>
+                                  </p:childTnLst>
+                                </p:cTn>
+                              </p:par>
+                            </p:childTnLst>
+                          </p:cTn>
+                        </p:par>
+                      </p:childTnLst>
+                    </p:cTn>
+                  </p:par>
+                </p:childTnLst>
+              </p:cTn>
+              <p:prevCondLst>
+                <p:cond evt="onPrev" delay="0">
+                  <p:tgtEl>
+                    <p:sldTgt/>
+                  </p:tgtEl>
+                </p:cond>
+              </p:prevCondLst>
+              <p:nextCondLst>
+                <p:cond evt="onNext" delay="0">
+                  <p:tgtEl>
+                    <p:sldTgt/>
+                  </p:tgtEl>
+                </p:cond>
+              </p:nextCondLst>
+            </p:seq>
+          </p:childTnLst>
+        </p:cTn>
+      </p:par>
+    </p:tnLst>
+    <p:bldLst>
+      <p:bldP spid="6" grpId="0"/>
+    </p:bldLst>
+  </p:timing>
+</p:sld>
+</file>
+
+<file path=ppt/slides/slide21.xml><?xml version="1.0" encoding="utf-8"?>
+<p:sld xmlns:a="http://schemas.openxmlformats.org/drawingml/2006/main" xmlns:r="http://schemas.openxmlformats.org/officeDocument/2006/relationships" xmlns:p="http://schemas.openxmlformats.org/presentationml/2006/main">
+  <p:cSld>
+    <p:spTree>
+      <p:nvGrpSpPr>
+        <p:cNvPr id="1" name=""/>
+        <p:cNvGrpSpPr/>
+        <p:nvPr/>
+      </p:nvGrpSpPr>
+      <p:grpSpPr>
+        <a:xfrm>
+          <a:off x="0" y="0"/>
+          <a:ext cx="0" cy="0"/>
+          <a:chOff x="0" y="0"/>
+          <a:chExt cx="0" cy="0"/>
+        </a:xfrm>
+      </p:grpSpPr>
+      <p:sp>
+        <p:nvSpPr>
           <p:cNvPr id="2" name="Title 1"/>
           <p:cNvSpPr>
             <a:spLocks noGrp="1"/>
@@ -12394,7 +12825,7 @@
 </p:sld>
 </file>
 
-<file path=ppt/slides/slide21.xml><?xml version="1.0" encoding="utf-8"?>
+<file path=ppt/slides/slide22.xml><?xml version="1.0" encoding="utf-8"?>
 <p:sld xmlns:a="http://schemas.openxmlformats.org/drawingml/2006/main" xmlns:r="http://schemas.openxmlformats.org/officeDocument/2006/relationships" xmlns:p="http://schemas.openxmlformats.org/presentationml/2006/main">
   <p:cSld>
     <p:spTree>
@@ -15929,7 +16360,7 @@
             <a:pPr lvl="1"/>
             <a:r>
               <a:rPr lang="en-US" dirty="0"/>
-              <a:t>Videogames and game engine development?</a:t>
+              <a:t>Videogames development and something about game engine?</a:t>
             </a:r>
           </a:p>
           <a:p>
@@ -18040,7 +18471,7 @@
                   <a:srgbClr val="FFFF00"/>
                 </a:solidFill>
               </a:rPr>
-              <a:t>C++    C#    Java</a:t>
+              <a:t>C++    C#    Java    Python</a:t>
             </a:r>
             <a:endParaRPr lang="en-US" dirty="0"/>
           </a:p>

</xml_diff>

<commit_message>
Link to proper self-intros
</commit_message>
<xml_diff>
--- a/PPT/Intro.pptx
+++ b/PPT/Intro.pptx
@@ -285,7 +285,7 @@
           <a:p>
             <a:fld id="{5578FD48-7BBA-4787-8980-5DFB65E0734D}" type="datetimeFigureOut">
               <a:rPr lang="en-US" smtClean="0"/>
-              <a:t>5/22/2023</a:t>
+              <a:t>5/23/2023</a:t>
             </a:fld>
             <a:endParaRPr lang="en-US"/>
           </a:p>
@@ -1310,7 +1310,7 @@
             <a:fld id="{1D8BD707-D9CF-40AE-B4C6-C98DA3205C09}" type="datetimeFigureOut">
               <a:rPr lang="en-US" smtClean="0"/>
               <a:pPr/>
-              <a:t>5/22/2023</a:t>
+              <a:t>5/23/2023</a:t>
             </a:fld>
             <a:endParaRPr lang="en-US"/>
           </a:p>
@@ -1627,7 +1627,7 @@
             <a:fld id="{1D8BD707-D9CF-40AE-B4C6-C98DA3205C09}" type="datetimeFigureOut">
               <a:rPr lang="en-US" smtClean="0"/>
               <a:pPr/>
-              <a:t>5/22/2023</a:t>
+              <a:t>5/23/2023</a:t>
             </a:fld>
             <a:endParaRPr lang="en-US"/>
           </a:p>
@@ -1803,7 +1803,7 @@
             <a:fld id="{1D8BD707-D9CF-40AE-B4C6-C98DA3205C09}" type="datetimeFigureOut">
               <a:rPr lang="en-US" smtClean="0"/>
               <a:pPr/>
-              <a:t>5/22/2023</a:t>
+              <a:t>5/23/2023</a:t>
             </a:fld>
             <a:endParaRPr lang="en-US"/>
           </a:p>
@@ -1923,7 +1923,7 @@
             <a:fld id="{1D8BD707-D9CF-40AE-B4C6-C98DA3205C09}" type="datetimeFigureOut">
               <a:rPr lang="en-US" smtClean="0"/>
               <a:pPr/>
-              <a:t>5/22/2023</a:t>
+              <a:t>5/23/2023</a:t>
             </a:fld>
             <a:endParaRPr lang="en-US"/>
           </a:p>
@@ -2223,7 +2223,7 @@
             <a:fld id="{1D8BD707-D9CF-40AE-B4C6-C98DA3205C09}" type="datetimeFigureOut">
               <a:rPr lang="en-US" smtClean="0"/>
               <a:pPr/>
-              <a:t>5/22/2023</a:t>
+              <a:t>5/23/2023</a:t>
             </a:fld>
             <a:endParaRPr lang="en-US"/>
           </a:p>
@@ -2518,7 +2518,7 @@
             <a:fld id="{1D8BD707-D9CF-40AE-B4C6-C98DA3205C09}" type="datetimeFigureOut">
               <a:rPr lang="en-US" smtClean="0"/>
               <a:pPr/>
-              <a:t>5/22/2023</a:t>
+              <a:t>5/23/2023</a:t>
             </a:fld>
             <a:endParaRPr lang="en-US"/>
           </a:p>
@@ -2948,7 +2948,7 @@
             <a:fld id="{1D8BD707-D9CF-40AE-B4C6-C98DA3205C09}" type="datetimeFigureOut">
               <a:rPr lang="en-US" smtClean="0"/>
               <a:pPr/>
-              <a:t>5/22/2023</a:t>
+              <a:t>5/23/2023</a:t>
             </a:fld>
             <a:endParaRPr lang="en-US"/>
           </a:p>
@@ -3068,7 +3068,7 @@
             <a:fld id="{1D8BD707-D9CF-40AE-B4C6-C98DA3205C09}" type="datetimeFigureOut">
               <a:rPr lang="en-US" smtClean="0"/>
               <a:pPr/>
-              <a:t>5/22/2023</a:t>
+              <a:t>5/23/2023</a:t>
             </a:fld>
             <a:endParaRPr lang="en-US"/>
           </a:p>
@@ -3160,7 +3160,7 @@
             <a:fld id="{1D8BD707-D9CF-40AE-B4C6-C98DA3205C09}" type="datetimeFigureOut">
               <a:rPr lang="en-US" smtClean="0"/>
               <a:pPr/>
-              <a:t>5/22/2023</a:t>
+              <a:t>5/23/2023</a:t>
             </a:fld>
             <a:endParaRPr lang="en-US"/>
           </a:p>
@@ -3412,7 +3412,7 @@
             <a:fld id="{1D8BD707-D9CF-40AE-B4C6-C98DA3205C09}" type="datetimeFigureOut">
               <a:rPr lang="en-US" smtClean="0"/>
               <a:pPr/>
-              <a:t>5/22/2023</a:t>
+              <a:t>5/23/2023</a:t>
             </a:fld>
             <a:endParaRPr lang="en-US"/>
           </a:p>
@@ -3930,7 +3930,7 @@
             <a:fld id="{1D8BD707-D9CF-40AE-B4C6-C98DA3205C09}" type="datetimeFigureOut">
               <a:rPr lang="en-US" smtClean="0"/>
               <a:pPr/>
-              <a:t>5/22/2023</a:t>
+              <a:t>5/23/2023</a:t>
             </a:fld>
             <a:endParaRPr lang="en-US"/>
           </a:p>
@@ -4162,7 +4162,7 @@
             <a:fld id="{1D8BD707-D9CF-40AE-B4C6-C98DA3205C09}" type="datetimeFigureOut">
               <a:rPr lang="en-US" smtClean="0"/>
               <a:pPr/>
-              <a:t>5/22/2023</a:t>
+              <a:t>5/23/2023</a:t>
             </a:fld>
             <a:endParaRPr lang="en-US"/>
           </a:p>
@@ -8603,7 +8603,7 @@
         </p:spPr>
         <p:txBody>
           <a:bodyPr>
-            <a:normAutofit fontScale="85000" lnSpcReduction="10000"/>
+            <a:normAutofit fontScale="85000" lnSpcReduction="20000"/>
           </a:bodyPr>
           <a:lstStyle/>
           <a:p>
@@ -8614,6 +8614,17 @@
             <a:r>
               <a:rPr lang="en-US" dirty="0"/>
               <a:t>Every day at 9:00am, until we are done.</a:t>
+            </a:r>
+          </a:p>
+          <a:p>
+            <a:pPr lvl="1"/>
+            <a:r>
+              <a:rPr lang="en-US" b="1" dirty="0"/>
+              <a:t>Exception: </a:t>
+            </a:r>
+            <a:r>
+              <a:rPr lang="en-US" dirty="0"/>
+              <a:t>July 15 (Friday): 8-11am class time</a:t>
             </a:r>
             <a:endParaRPr lang="en-US" b="1" dirty="0"/>
           </a:p>
@@ -8638,37 +8649,41 @@
             <a:pPr lvl="2"/>
             <a:r>
               <a:rPr lang="en-US" dirty="0"/>
-              <a:t>Intro to yourself and your interests for forming groups (e.g., from 2022: </a:t>
+              <a:t>Intro to yourself and your interests for forming groups e.g., </a:t>
             </a:r>
             <a:r>
               <a:rPr lang="en-US" dirty="0">
-                <a:hlinkClick r:id="rId2"/>
+                <a:hlinkClick r:id="rId2" action="ppaction://hlinkpres?slideindex=1&amp;slidetitle="/>
               </a:rPr>
               <a:t>Student-1</a:t>
             </a:r>
             <a:r>
               <a:rPr lang="en-US" dirty="0"/>
-              <a:t>, </a:t>
+              <a:t> (good coverage), </a:t>
             </a:r>
             <a:r>
               <a:rPr lang="en-US" dirty="0">
-                <a:hlinkClick r:id="rId3"/>
+                <a:hlinkClick r:id="rId3" action="ppaction://hlinkpres?slideindex=1&amp;slidetitle="/>
               </a:rPr>
               <a:t>Student-2</a:t>
             </a:r>
             <a:r>
               <a:rPr lang="en-US" dirty="0"/>
-              <a:t>, </a:t>
+              <a:t> (simplicity), </a:t>
             </a:r>
             <a:r>
               <a:rPr lang="en-US" dirty="0">
-                <a:hlinkClick r:id="rId4"/>
+                <a:hlinkClick r:id="rId4" action="ppaction://hlinkpres?slideindex=1&amp;slidetitle="/>
               </a:rPr>
               <a:t>Student-3</a:t>
             </a:r>
             <a:r>
               <a:rPr lang="en-US" dirty="0"/>
-              <a:t>)</a:t>
+              <a:t> (</a:t>
+            </a:r>
+            <a:r>
+              <a:rPr lang="en-US"/>
+              <a:t>the art!)</a:t>
             </a:r>
             <a:endParaRPr lang="en-US" b="1" dirty="0">
               <a:solidFill>
@@ -8868,33 +8883,15 @@
                                   </p:childTnLst>
                                 </p:cTn>
                               </p:par>
-                            </p:childTnLst>
-                          </p:cTn>
-                        </p:par>
-                      </p:childTnLst>
-                    </p:cTn>
-                  </p:par>
-                  <p:par>
-                    <p:cTn id="7" fill="hold">
-                      <p:stCondLst>
-                        <p:cond delay="indefinite"/>
-                      </p:stCondLst>
-                      <p:childTnLst>
-                        <p:par>
-                          <p:cTn id="8" fill="hold">
-                            <p:stCondLst>
-                              <p:cond delay="0"/>
-                            </p:stCondLst>
-                            <p:childTnLst>
                               <p:par>
-                                <p:cTn id="9" presetID="1" presetClass="entr" presetSubtype="0" fill="hold" grpId="0" nodeType="clickEffect">
+                                <p:cTn id="7" presetID="1" presetClass="entr" presetSubtype="0" fill="hold" grpId="0" nodeType="withEffect">
                                   <p:stCondLst>
                                     <p:cond delay="0"/>
                                   </p:stCondLst>
                                   <p:childTnLst>
                                     <p:set>
                                       <p:cBhvr>
-                                        <p:cTn id="10" dur="1" fill="hold">
+                                        <p:cTn id="8" dur="1" fill="hold">
                                           <p:stCondLst>
                                             <p:cond delay="0"/>
                                           </p:stCondLst>
@@ -8924,26 +8921,26 @@
                     </p:cTn>
                   </p:par>
                   <p:par>
-                    <p:cTn id="11" fill="hold">
+                    <p:cTn id="9" fill="hold">
                       <p:stCondLst>
                         <p:cond delay="indefinite"/>
                       </p:stCondLst>
                       <p:childTnLst>
                         <p:par>
-                          <p:cTn id="12" fill="hold">
+                          <p:cTn id="10" fill="hold">
                             <p:stCondLst>
                               <p:cond delay="0"/>
                             </p:stCondLst>
                             <p:childTnLst>
                               <p:par>
-                                <p:cTn id="13" presetID="1" presetClass="entr" presetSubtype="0" fill="hold" grpId="0" nodeType="clickEffect">
+                                <p:cTn id="11" presetID="1" presetClass="entr" presetSubtype="0" fill="hold" grpId="0" nodeType="clickEffect">
                                   <p:stCondLst>
                                     <p:cond delay="0"/>
                                   </p:stCondLst>
                                   <p:childTnLst>
                                     <p:set>
                                       <p:cBhvr>
-                                        <p:cTn id="14" dur="1" fill="hold">
+                                        <p:cTn id="12" dur="1" fill="hold">
                                           <p:stCondLst>
                                             <p:cond delay="0"/>
                                           </p:stCondLst>
@@ -8973,26 +8970,26 @@
                     </p:cTn>
                   </p:par>
                   <p:par>
-                    <p:cTn id="15" fill="hold">
+                    <p:cTn id="13" fill="hold">
                       <p:stCondLst>
                         <p:cond delay="indefinite"/>
                       </p:stCondLst>
                       <p:childTnLst>
                         <p:par>
-                          <p:cTn id="16" fill="hold">
+                          <p:cTn id="14" fill="hold">
                             <p:stCondLst>
                               <p:cond delay="0"/>
                             </p:stCondLst>
                             <p:childTnLst>
                               <p:par>
-                                <p:cTn id="17" presetID="1" presetClass="entr" presetSubtype="0" fill="hold" grpId="0" nodeType="clickEffect">
+                                <p:cTn id="15" presetID="1" presetClass="entr" presetSubtype="0" fill="hold" grpId="0" nodeType="clickEffect">
                                   <p:stCondLst>
                                     <p:cond delay="0"/>
                                   </p:stCondLst>
                                   <p:childTnLst>
                                     <p:set>
                                       <p:cBhvr>
-                                        <p:cTn id="18" dur="1" fill="hold">
+                                        <p:cTn id="16" dur="1" fill="hold">
                                           <p:stCondLst>
                                             <p:cond delay="0"/>
                                           </p:stCondLst>
@@ -9022,26 +9019,26 @@
                     </p:cTn>
                   </p:par>
                   <p:par>
-                    <p:cTn id="19" fill="hold">
+                    <p:cTn id="17" fill="hold">
                       <p:stCondLst>
                         <p:cond delay="indefinite"/>
                       </p:stCondLst>
                       <p:childTnLst>
                         <p:par>
-                          <p:cTn id="20" fill="hold">
+                          <p:cTn id="18" fill="hold">
                             <p:stCondLst>
                               <p:cond delay="0"/>
                             </p:stCondLst>
                             <p:childTnLst>
                               <p:par>
-                                <p:cTn id="21" presetID="1" presetClass="entr" presetSubtype="0" fill="hold" grpId="0" nodeType="clickEffect">
+                                <p:cTn id="19" presetID="1" presetClass="entr" presetSubtype="0" fill="hold" grpId="0" nodeType="clickEffect">
                                   <p:stCondLst>
                                     <p:cond delay="0"/>
                                   </p:stCondLst>
                                   <p:childTnLst>
                                     <p:set>
                                       <p:cBhvr>
-                                        <p:cTn id="22" dur="1" fill="hold">
+                                        <p:cTn id="20" dur="1" fill="hold">
                                           <p:stCondLst>
                                             <p:cond delay="0"/>
                                           </p:stCondLst>
@@ -9071,26 +9068,26 @@
                     </p:cTn>
                   </p:par>
                   <p:par>
-                    <p:cTn id="23" fill="hold">
+                    <p:cTn id="21" fill="hold">
                       <p:stCondLst>
                         <p:cond delay="indefinite"/>
                       </p:stCondLst>
                       <p:childTnLst>
                         <p:par>
-                          <p:cTn id="24" fill="hold">
+                          <p:cTn id="22" fill="hold">
                             <p:stCondLst>
                               <p:cond delay="0"/>
                             </p:stCondLst>
                             <p:childTnLst>
                               <p:par>
-                                <p:cTn id="25" presetID="1" presetClass="entr" presetSubtype="0" fill="hold" grpId="0" nodeType="clickEffect">
+                                <p:cTn id="23" presetID="1" presetClass="entr" presetSubtype="0" fill="hold" grpId="0" nodeType="clickEffect">
                                   <p:stCondLst>
                                     <p:cond delay="0"/>
                                   </p:stCondLst>
                                   <p:childTnLst>
                                     <p:set>
                                       <p:cBhvr>
-                                        <p:cTn id="26" dur="1" fill="hold">
+                                        <p:cTn id="24" dur="1" fill="hold">
                                           <p:stCondLst>
                                             <p:cond delay="0"/>
                                           </p:stCondLst>
@@ -9120,26 +9117,26 @@
                     </p:cTn>
                   </p:par>
                   <p:par>
-                    <p:cTn id="27" fill="hold">
+                    <p:cTn id="25" fill="hold">
                       <p:stCondLst>
                         <p:cond delay="indefinite"/>
                       </p:stCondLst>
                       <p:childTnLst>
                         <p:par>
-                          <p:cTn id="28" fill="hold">
+                          <p:cTn id="26" fill="hold">
                             <p:stCondLst>
                               <p:cond delay="0"/>
                             </p:stCondLst>
                             <p:childTnLst>
                               <p:par>
-                                <p:cTn id="29" presetID="1" presetClass="entr" presetSubtype="0" fill="hold" grpId="0" nodeType="clickEffect">
+                                <p:cTn id="27" presetID="1" presetClass="entr" presetSubtype="0" fill="hold" grpId="0" nodeType="clickEffect">
                                   <p:stCondLst>
                                     <p:cond delay="0"/>
                                   </p:stCondLst>
                                   <p:childTnLst>
                                     <p:set>
                                       <p:cBhvr>
-                                        <p:cTn id="30" dur="1" fill="hold">
+                                        <p:cTn id="28" dur="1" fill="hold">
                                           <p:stCondLst>
                                             <p:cond delay="0"/>
                                           </p:stCondLst>
@@ -9169,26 +9166,26 @@
                     </p:cTn>
                   </p:par>
                   <p:par>
-                    <p:cTn id="31" fill="hold">
+                    <p:cTn id="29" fill="hold">
                       <p:stCondLst>
                         <p:cond delay="indefinite"/>
                       </p:stCondLst>
                       <p:childTnLst>
                         <p:par>
-                          <p:cTn id="32" fill="hold">
+                          <p:cTn id="30" fill="hold">
                             <p:stCondLst>
                               <p:cond delay="0"/>
                             </p:stCondLst>
                             <p:childTnLst>
                               <p:par>
-                                <p:cTn id="33" presetID="1" presetClass="entr" presetSubtype="0" fill="hold" grpId="0" nodeType="clickEffect">
+                                <p:cTn id="31" presetID="1" presetClass="entr" presetSubtype="0" fill="hold" grpId="0" nodeType="clickEffect">
                                   <p:stCondLst>
                                     <p:cond delay="0"/>
                                   </p:stCondLst>
                                   <p:childTnLst>
                                     <p:set>
                                       <p:cBhvr>
-                                        <p:cTn id="34" dur="1" fill="hold">
+                                        <p:cTn id="32" dur="1" fill="hold">
                                           <p:stCondLst>
                                             <p:cond delay="0"/>
                                           </p:stCondLst>
@@ -9218,26 +9215,26 @@
                     </p:cTn>
                   </p:par>
                   <p:par>
-                    <p:cTn id="35" fill="hold">
+                    <p:cTn id="33" fill="hold">
                       <p:stCondLst>
                         <p:cond delay="indefinite"/>
                       </p:stCondLst>
                       <p:childTnLst>
                         <p:par>
-                          <p:cTn id="36" fill="hold">
+                          <p:cTn id="34" fill="hold">
                             <p:stCondLst>
                               <p:cond delay="0"/>
                             </p:stCondLst>
                             <p:childTnLst>
                               <p:par>
-                                <p:cTn id="37" presetID="1" presetClass="entr" presetSubtype="0" fill="hold" grpId="0" nodeType="clickEffect">
+                                <p:cTn id="35" presetID="1" presetClass="entr" presetSubtype="0" fill="hold" grpId="0" nodeType="clickEffect">
                                   <p:stCondLst>
                                     <p:cond delay="0"/>
                                   </p:stCondLst>
                                   <p:childTnLst>
                                     <p:set>
                                       <p:cBhvr>
-                                        <p:cTn id="38" dur="1" fill="hold">
+                                        <p:cTn id="36" dur="1" fill="hold">
                                           <p:stCondLst>
                                             <p:cond delay="0"/>
                                           </p:stCondLst>
@@ -9267,26 +9264,26 @@
                     </p:cTn>
                   </p:par>
                   <p:par>
-                    <p:cTn id="39" fill="hold">
+                    <p:cTn id="37" fill="hold">
                       <p:stCondLst>
                         <p:cond delay="indefinite"/>
                       </p:stCondLst>
                       <p:childTnLst>
                         <p:par>
-                          <p:cTn id="40" fill="hold">
+                          <p:cTn id="38" fill="hold">
                             <p:stCondLst>
                               <p:cond delay="0"/>
                             </p:stCondLst>
                             <p:childTnLst>
                               <p:par>
-                                <p:cTn id="41" presetID="1" presetClass="entr" presetSubtype="0" fill="hold" grpId="0" nodeType="clickEffect">
+                                <p:cTn id="39" presetID="1" presetClass="entr" presetSubtype="0" fill="hold" grpId="0" nodeType="clickEffect">
                                   <p:stCondLst>
                                     <p:cond delay="0"/>
                                   </p:stCondLst>
                                   <p:childTnLst>
                                     <p:set>
                                       <p:cBhvr>
-                                        <p:cTn id="42" dur="1" fill="hold">
+                                        <p:cTn id="40" dur="1" fill="hold">
                                           <p:stCondLst>
                                             <p:cond delay="0"/>
                                           </p:stCondLst>
@@ -9316,26 +9313,26 @@
                     </p:cTn>
                   </p:par>
                   <p:par>
-                    <p:cTn id="43" fill="hold">
+                    <p:cTn id="41" fill="hold">
                       <p:stCondLst>
                         <p:cond delay="indefinite"/>
                       </p:stCondLst>
                       <p:childTnLst>
                         <p:par>
-                          <p:cTn id="44" fill="hold">
+                          <p:cTn id="42" fill="hold">
                             <p:stCondLst>
                               <p:cond delay="0"/>
                             </p:stCondLst>
                             <p:childTnLst>
                               <p:par>
-                                <p:cTn id="45" presetID="1" presetClass="entr" presetSubtype="0" fill="hold" grpId="0" nodeType="clickEffect">
+                                <p:cTn id="43" presetID="1" presetClass="entr" presetSubtype="0" fill="hold" grpId="0" nodeType="clickEffect">
                                   <p:stCondLst>
                                     <p:cond delay="0"/>
                                   </p:stCondLst>
                                   <p:childTnLst>
                                     <p:set>
                                       <p:cBhvr>
-                                        <p:cTn id="46" dur="1" fill="hold">
+                                        <p:cTn id="44" dur="1" fill="hold">
                                           <p:stCondLst>
                                             <p:cond delay="0"/>
                                           </p:stCondLst>
@@ -9365,26 +9362,26 @@
                     </p:cTn>
                   </p:par>
                   <p:par>
-                    <p:cTn id="47" fill="hold">
+                    <p:cTn id="45" fill="hold">
                       <p:stCondLst>
                         <p:cond delay="indefinite"/>
                       </p:stCondLst>
                       <p:childTnLst>
                         <p:par>
-                          <p:cTn id="48" fill="hold">
+                          <p:cTn id="46" fill="hold">
                             <p:stCondLst>
                               <p:cond delay="0"/>
                             </p:stCondLst>
                             <p:childTnLst>
                               <p:par>
-                                <p:cTn id="49" presetID="1" presetClass="entr" presetSubtype="0" fill="hold" grpId="0" nodeType="clickEffect">
+                                <p:cTn id="47" presetID="1" presetClass="entr" presetSubtype="0" fill="hold" grpId="0" nodeType="clickEffect">
                                   <p:stCondLst>
                                     <p:cond delay="0"/>
                                   </p:stCondLst>
                                   <p:childTnLst>
                                     <p:set>
                                       <p:cBhvr>
-                                        <p:cTn id="50" dur="1" fill="hold">
+                                        <p:cTn id="48" dur="1" fill="hold">
                                           <p:stCondLst>
                                             <p:cond delay="0"/>
                                           </p:stCondLst>
@@ -9414,26 +9411,26 @@
                     </p:cTn>
                   </p:par>
                   <p:par>
-                    <p:cTn id="51" fill="hold">
+                    <p:cTn id="49" fill="hold">
                       <p:stCondLst>
                         <p:cond delay="indefinite"/>
                       </p:stCondLst>
                       <p:childTnLst>
                         <p:par>
-                          <p:cTn id="52" fill="hold">
+                          <p:cTn id="50" fill="hold">
                             <p:stCondLst>
                               <p:cond delay="0"/>
                             </p:stCondLst>
                             <p:childTnLst>
                               <p:par>
-                                <p:cTn id="53" presetID="1" presetClass="entr" presetSubtype="0" fill="hold" grpId="0" nodeType="clickEffect">
+                                <p:cTn id="51" presetID="1" presetClass="entr" presetSubtype="0" fill="hold" grpId="0" nodeType="clickEffect">
                                   <p:stCondLst>
                                     <p:cond delay="0"/>
                                   </p:stCondLst>
                                   <p:childTnLst>
                                     <p:set>
                                       <p:cBhvr>
-                                        <p:cTn id="54" dur="1" fill="hold">
+                                        <p:cTn id="52" dur="1" fill="hold">
                                           <p:stCondLst>
                                             <p:cond delay="0"/>
                                           </p:stCondLst>
@@ -9463,26 +9460,26 @@
                     </p:cTn>
                   </p:par>
                   <p:par>
-                    <p:cTn id="55" fill="hold">
+                    <p:cTn id="53" fill="hold">
                       <p:stCondLst>
                         <p:cond delay="indefinite"/>
                       </p:stCondLst>
                       <p:childTnLst>
                         <p:par>
-                          <p:cTn id="56" fill="hold">
+                          <p:cTn id="54" fill="hold">
                             <p:stCondLst>
                               <p:cond delay="0"/>
                             </p:stCondLst>
                             <p:childTnLst>
                               <p:par>
-                                <p:cTn id="57" presetID="1" presetClass="entr" presetSubtype="0" fill="hold" grpId="0" nodeType="clickEffect">
+                                <p:cTn id="55" presetID="1" presetClass="entr" presetSubtype="0" fill="hold" grpId="0" nodeType="clickEffect">
                                   <p:stCondLst>
                                     <p:cond delay="0"/>
                                   </p:stCondLst>
                                   <p:childTnLst>
                                     <p:set>
                                       <p:cBhvr>
-                                        <p:cTn id="58" dur="1" fill="hold">
+                                        <p:cTn id="56" dur="1" fill="hold">
                                           <p:stCondLst>
                                             <p:cond delay="0"/>
                                           </p:stCondLst>
@@ -9491,6 +9488,55 @@
                                           <p:spTgt spid="3">
                                             <p:txEl>
                                               <p:pRg st="13" end="13"/>
+                                            </p:txEl>
+                                          </p:spTgt>
+                                        </p:tgtEl>
+                                        <p:attrNameLst>
+                                          <p:attrName>style.visibility</p:attrName>
+                                        </p:attrNameLst>
+                                      </p:cBhvr>
+                                      <p:to>
+                                        <p:strVal val="visible"/>
+                                      </p:to>
+                                    </p:set>
+                                  </p:childTnLst>
+                                </p:cTn>
+                              </p:par>
+                            </p:childTnLst>
+                          </p:cTn>
+                        </p:par>
+                      </p:childTnLst>
+                    </p:cTn>
+                  </p:par>
+                  <p:par>
+                    <p:cTn id="57" fill="hold">
+                      <p:stCondLst>
+                        <p:cond delay="indefinite"/>
+                      </p:stCondLst>
+                      <p:childTnLst>
+                        <p:par>
+                          <p:cTn id="58" fill="hold">
+                            <p:stCondLst>
+                              <p:cond delay="0"/>
+                            </p:stCondLst>
+                            <p:childTnLst>
+                              <p:par>
+                                <p:cTn id="59" presetID="1" presetClass="entr" presetSubtype="0" fill="hold" grpId="0" nodeType="clickEffect">
+                                  <p:stCondLst>
+                                    <p:cond delay="0"/>
+                                  </p:stCondLst>
+                                  <p:childTnLst>
+                                    <p:set>
+                                      <p:cBhvr>
+                                        <p:cTn id="60" dur="1" fill="hold">
+                                          <p:stCondLst>
+                                            <p:cond delay="0"/>
+                                          </p:stCondLst>
+                                        </p:cTn>
+                                        <p:tgtEl>
+                                          <p:spTgt spid="3">
+                                            <p:txEl>
+                                              <p:pRg st="14" end="14"/>
                                             </p:txEl>
                                           </p:spTgt>
                                         </p:tgtEl>

</xml_diff>